<commit_message>
Till day 12 completed.
</commit_message>
<xml_diff>
--- a/Weekly Status Update -Dilna Dileep.pptx
+++ b/Weekly Status Update -Dilna Dileep.pptx
@@ -8,8 +8,8 @@
     <p:sldId id="258" r:id="rId2"/>
     <p:sldId id="297" r:id="rId3"/>
     <p:sldId id="260" r:id="rId4"/>
-    <p:sldId id="299" r:id="rId5"/>
-    <p:sldId id="298" r:id="rId6"/>
+    <p:sldId id="300" r:id="rId5"/>
+    <p:sldId id="299" r:id="rId6"/>
   </p:sldIdLst>
   <p:sldSz cx="12192000" cy="6858000"/>
   <p:notesSz cx="6858000" cy="9144000"/>
@@ -369,7 +369,7 @@
           <a:p>
             <a:fld id="{93B38562-6E7D-48A0-9E59-3F9BE1BF3686}" type="datetimeFigureOut">
               <a:rPr lang="en-GB" smtClean="0"/>
-              <a:t>17/10/2024</a:t>
+              <a:t>25/10/2024</a:t>
             </a:fld>
             <a:endParaRPr lang="en-GB"/>
           </a:p>
@@ -569,7 +569,7 @@
           <a:p>
             <a:fld id="{93B38562-6E7D-48A0-9E59-3F9BE1BF3686}" type="datetimeFigureOut">
               <a:rPr lang="en-GB" smtClean="0"/>
-              <a:t>17/10/2024</a:t>
+              <a:t>25/10/2024</a:t>
             </a:fld>
             <a:endParaRPr lang="en-GB"/>
           </a:p>
@@ -779,7 +779,7 @@
           <a:p>
             <a:fld id="{93B38562-6E7D-48A0-9E59-3F9BE1BF3686}" type="datetimeFigureOut">
               <a:rPr lang="en-GB" smtClean="0"/>
-              <a:t>17/10/2024</a:t>
+              <a:t>25/10/2024</a:t>
             </a:fld>
             <a:endParaRPr lang="en-GB"/>
           </a:p>
@@ -979,7 +979,7 @@
           <a:p>
             <a:fld id="{93B38562-6E7D-48A0-9E59-3F9BE1BF3686}" type="datetimeFigureOut">
               <a:rPr lang="en-GB" smtClean="0"/>
-              <a:t>17/10/2024</a:t>
+              <a:t>25/10/2024</a:t>
             </a:fld>
             <a:endParaRPr lang="en-GB"/>
           </a:p>
@@ -1255,7 +1255,7 @@
           <a:p>
             <a:fld id="{93B38562-6E7D-48A0-9E59-3F9BE1BF3686}" type="datetimeFigureOut">
               <a:rPr lang="en-GB" smtClean="0"/>
-              <a:t>17/10/2024</a:t>
+              <a:t>25/10/2024</a:t>
             </a:fld>
             <a:endParaRPr lang="en-GB"/>
           </a:p>
@@ -1523,7 +1523,7 @@
           <a:p>
             <a:fld id="{93B38562-6E7D-48A0-9E59-3F9BE1BF3686}" type="datetimeFigureOut">
               <a:rPr lang="en-GB" smtClean="0"/>
-              <a:t>17/10/2024</a:t>
+              <a:t>25/10/2024</a:t>
             </a:fld>
             <a:endParaRPr lang="en-GB"/>
           </a:p>
@@ -1938,7 +1938,7 @@
           <a:p>
             <a:fld id="{93B38562-6E7D-48A0-9E59-3F9BE1BF3686}" type="datetimeFigureOut">
               <a:rPr lang="en-GB" smtClean="0"/>
-              <a:t>17/10/2024</a:t>
+              <a:t>25/10/2024</a:t>
             </a:fld>
             <a:endParaRPr lang="en-GB"/>
           </a:p>
@@ -2080,7 +2080,7 @@
           <a:p>
             <a:fld id="{93B38562-6E7D-48A0-9E59-3F9BE1BF3686}" type="datetimeFigureOut">
               <a:rPr lang="en-GB" smtClean="0"/>
-              <a:t>17/10/2024</a:t>
+              <a:t>25/10/2024</a:t>
             </a:fld>
             <a:endParaRPr lang="en-GB"/>
           </a:p>
@@ -2193,7 +2193,7 @@
           <a:p>
             <a:fld id="{93B38562-6E7D-48A0-9E59-3F9BE1BF3686}" type="datetimeFigureOut">
               <a:rPr lang="en-GB" smtClean="0"/>
-              <a:t>17/10/2024</a:t>
+              <a:t>25/10/2024</a:t>
             </a:fld>
             <a:endParaRPr lang="en-GB"/>
           </a:p>
@@ -2506,7 +2506,7 @@
           <a:p>
             <a:fld id="{93B38562-6E7D-48A0-9E59-3F9BE1BF3686}" type="datetimeFigureOut">
               <a:rPr lang="en-GB" smtClean="0"/>
-              <a:t>17/10/2024</a:t>
+              <a:t>25/10/2024</a:t>
             </a:fld>
             <a:endParaRPr lang="en-GB"/>
           </a:p>
@@ -2795,7 +2795,7 @@
           <a:p>
             <a:fld id="{93B38562-6E7D-48A0-9E59-3F9BE1BF3686}" type="datetimeFigureOut">
               <a:rPr lang="en-GB" smtClean="0"/>
-              <a:t>17/10/2024</a:t>
+              <a:t>25/10/2024</a:t>
             </a:fld>
             <a:endParaRPr lang="en-GB"/>
           </a:p>
@@ -3038,7 +3038,7 @@
           <a:p>
             <a:fld id="{93B38562-6E7D-48A0-9E59-3F9BE1BF3686}" type="datetimeFigureOut">
               <a:rPr lang="en-GB" smtClean="0"/>
-              <a:t>17/10/2024</a:t>
+              <a:t>25/10/2024</a:t>
             </a:fld>
             <a:endParaRPr lang="en-GB"/>
           </a:p>
@@ -3919,7 +3919,7 @@
                   <a:srgbClr val="0070C0"/>
                 </a:solidFill>
               </a:rPr>
-              <a:t>Week 2 (14/10/2024-11/10/2024)</a:t>
+              <a:t>Week 3 (21/10/2024 - 25/10/2024)</a:t>
             </a:r>
           </a:p>
           <a:p>
@@ -4277,7 +4277,7 @@
         <p:spPr>
           <a:xfrm>
             <a:off x="446694" y="1537918"/>
-            <a:ext cx="5290010" cy="3508653"/>
+            <a:ext cx="5290010" cy="5509200"/>
           </a:xfrm>
           <a:prstGeom prst="rect">
             <a:avLst/>
@@ -4318,7 +4318,7 @@
                   <a:srgbClr val="385D8A"/>
                 </a:solidFill>
               </a:rPr>
-              <a:t>14/10/2024 – Session focused on SCSS basics and task submission</a:t>
+              <a:t>21/10/2024 – JavaScript Day 1 started , session focused on  		                 variables , functions , scop , etc. And task submission.</a:t>
             </a:r>
           </a:p>
           <a:p>
@@ -4349,7 +4349,7 @@
                   <a:srgbClr val="385D8A"/>
                 </a:solidFill>
               </a:rPr>
-              <a:t>15/10/2024 – Session focused on Bootstrap font, and task submission</a:t>
+              <a:t>22/10/2024 – Session focused Array and Object methods , and task submission.</a:t>
             </a:r>
           </a:p>
           <a:p>
@@ -4380,16 +4380,48 @@
                   <a:srgbClr val="385D8A"/>
                 </a:solidFill>
               </a:rPr>
-              <a:t>16/10/2024 – Final class of HTML , CSS, </a:t>
-            </a:r>
-            <a:r>
-              <a:rPr lang="en-US" sz="1300">
+              <a:t>23/10/2024 – Session is about error handling and debugging , Also Task submission.</a:t>
+            </a:r>
+          </a:p>
+          <a:p>
+            <a:pPr marL="534987" lvl="2" defTabSz="839694">
+              <a:buClr>
+                <a:srgbClr val="00B0F0"/>
+              </a:buClr>
+              <a:buSzPct val="75000"/>
+              <a:defRPr/>
+            </a:pPr>
+            <a:endParaRPr lang="en-US" sz="1300" dirty="0">
+              <a:solidFill>
+                <a:srgbClr val="385D8A"/>
+              </a:solidFill>
+            </a:endParaRPr>
+          </a:p>
+          <a:p>
+            <a:pPr marL="534987" lvl="2" defTabSz="839694">
+              <a:buClr>
+                <a:srgbClr val="00B0F0"/>
+              </a:buClr>
+              <a:buSzPct val="75000"/>
+              <a:defRPr/>
+            </a:pPr>
+            <a:r>
+              <a:rPr lang="en-US" sz="1300" dirty="0">
                 <a:solidFill>
                   <a:srgbClr val="385D8A"/>
                 </a:solidFill>
               </a:rPr>
-              <a:t>Bootstrap .</a:t>
-            </a:r>
+              <a:t>24/10/2024 – Session is about DOM and Task submission.</a:t>
+            </a:r>
+          </a:p>
+          <a:p>
+            <a:pPr marL="534987" lvl="2" defTabSz="839694">
+              <a:buClr>
+                <a:srgbClr val="00B0F0"/>
+              </a:buClr>
+              <a:buSzPct val="75000"/>
+              <a:defRPr/>
+            </a:pPr>
             <a:endParaRPr lang="en-US" sz="1300" dirty="0">
               <a:solidFill>
                 <a:srgbClr val="385D8A"/>
@@ -4410,8 +4442,78 @@
                   <a:srgbClr val="385D8A"/>
                 </a:solidFill>
               </a:rPr>
-              <a:t>17/10/2024 – Task completed and submitted.</a:t>
-            </a:r>
+              <a:t>25/10/2024 – Session is about Event handling and Task submission.</a:t>
+            </a:r>
+          </a:p>
+          <a:p>
+            <a:pPr marL="534987" lvl="2" defTabSz="839694">
+              <a:buClr>
+                <a:srgbClr val="00B0F0"/>
+              </a:buClr>
+              <a:buSzPct val="75000"/>
+              <a:defRPr/>
+            </a:pPr>
+            <a:endParaRPr lang="en-US" sz="1300" dirty="0">
+              <a:solidFill>
+                <a:srgbClr val="385D8A"/>
+              </a:solidFill>
+            </a:endParaRPr>
+          </a:p>
+          <a:p>
+            <a:pPr marL="534987" lvl="2" defTabSz="839694">
+              <a:buClr>
+                <a:srgbClr val="00B0F0"/>
+              </a:buClr>
+              <a:buSzPct val="75000"/>
+              <a:defRPr/>
+            </a:pPr>
+            <a:endParaRPr lang="en-US" sz="1300" dirty="0">
+              <a:solidFill>
+                <a:srgbClr val="385D8A"/>
+              </a:solidFill>
+            </a:endParaRPr>
+          </a:p>
+          <a:p>
+            <a:pPr marL="534987" lvl="2" defTabSz="839694">
+              <a:buClr>
+                <a:srgbClr val="00B0F0"/>
+              </a:buClr>
+              <a:buSzPct val="75000"/>
+              <a:defRPr/>
+            </a:pPr>
+            <a:endParaRPr lang="en-US" sz="1300" dirty="0">
+              <a:solidFill>
+                <a:srgbClr val="385D8A"/>
+              </a:solidFill>
+            </a:endParaRPr>
+          </a:p>
+          <a:p>
+            <a:pPr marL="534987" lvl="2" defTabSz="839694">
+              <a:buClr>
+                <a:srgbClr val="00B0F0"/>
+              </a:buClr>
+              <a:buSzPct val="75000"/>
+              <a:defRPr/>
+            </a:pPr>
+            <a:endParaRPr lang="en-US" sz="1300" dirty="0">
+              <a:solidFill>
+                <a:srgbClr val="385D8A"/>
+              </a:solidFill>
+            </a:endParaRPr>
+          </a:p>
+          <a:p>
+            <a:pPr marL="534987" lvl="2" defTabSz="839694">
+              <a:buClr>
+                <a:srgbClr val="00B0F0"/>
+              </a:buClr>
+              <a:buSzPct val="75000"/>
+              <a:defRPr/>
+            </a:pPr>
+            <a:endParaRPr lang="en-US" sz="1300" dirty="0">
+              <a:solidFill>
+                <a:srgbClr val="385D8A"/>
+              </a:solidFill>
+            </a:endParaRPr>
           </a:p>
           <a:p>
             <a:pPr marL="534987" lvl="2" defTabSz="839694">
@@ -4558,7 +4660,7 @@
         <p:spPr>
           <a:xfrm>
             <a:off x="6286894" y="1273660"/>
-            <a:ext cx="5290010" cy="1092607"/>
+            <a:ext cx="5290010" cy="1692771"/>
           </a:xfrm>
           <a:prstGeom prst="rect">
             <a:avLst/>
@@ -4599,8 +4701,37 @@
                   <a:srgbClr val="385D8A"/>
                 </a:solidFill>
               </a:rPr>
-              <a:t>14/10/2024 – Manu Martin</a:t>
-            </a:r>
+              <a:t>21/10/2024 – </a:t>
+            </a:r>
+            <a:r>
+              <a:rPr lang="en-US" sz="1300" dirty="0" err="1">
+                <a:solidFill>
+                  <a:srgbClr val="385D8A"/>
+                </a:solidFill>
+              </a:rPr>
+              <a:t>Dhanya</a:t>
+            </a:r>
+            <a:r>
+              <a:rPr lang="en-US" sz="1300" dirty="0">
+                <a:solidFill>
+                  <a:srgbClr val="385D8A"/>
+                </a:solidFill>
+              </a:rPr>
+              <a:t> </a:t>
+            </a:r>
+            <a:r>
+              <a:rPr lang="en-US" sz="1300" dirty="0" err="1">
+                <a:solidFill>
+                  <a:srgbClr val="385D8A"/>
+                </a:solidFill>
+              </a:rPr>
+              <a:t>Sethu</a:t>
+            </a:r>
+            <a:endParaRPr lang="en-US" sz="1300" dirty="0">
+              <a:solidFill>
+                <a:srgbClr val="385D8A"/>
+              </a:solidFill>
+            </a:endParaRPr>
           </a:p>
           <a:p>
             <a:pPr marL="723900" lvl="2" indent="-188913" defTabSz="839694">
@@ -4618,7 +4749,7 @@
                   <a:srgbClr val="385D8A"/>
                 </a:solidFill>
               </a:rPr>
-              <a:t>15/10/2024 – Manu Martin</a:t>
+              <a:t>22/10/2024 – Ajay K J</a:t>
             </a:r>
           </a:p>
           <a:p>
@@ -4637,7 +4768,26 @@
                   <a:srgbClr val="385D8A"/>
                 </a:solidFill>
               </a:rPr>
-              <a:t>16/10/1024 – Stanly Baby &amp; </a:t>
+              <a:t>23/10/2024 – Ajay K J</a:t>
+            </a:r>
+          </a:p>
+          <a:p>
+            <a:pPr marL="723900" lvl="2" indent="-188913" defTabSz="839694">
+              <a:buClr>
+                <a:srgbClr val="00B0F0"/>
+              </a:buClr>
+              <a:buSzPct val="75000"/>
+              <a:buFont typeface="Wingdings 3" panose="05040102010807070707" pitchFamily="18" charset="2"/>
+              <a:buChar char="u"/>
+              <a:defRPr/>
+            </a:pPr>
+            <a:r>
+              <a:rPr lang="en-US" sz="1300" dirty="0">
+                <a:solidFill>
+                  <a:srgbClr val="385D8A"/>
+                </a:solidFill>
+              </a:rPr>
+              <a:t>24/10/2024 - Madhu </a:t>
             </a:r>
             <a:r>
               <a:rPr lang="en-US" sz="1300" dirty="0" err="1">
@@ -4645,16 +4795,61 @@
                   <a:srgbClr val="385D8A"/>
                 </a:solidFill>
               </a:rPr>
-              <a:t>Ribin</a:t>
-            </a:r>
+              <a:t>Pandikkadu</a:t>
+            </a:r>
+            <a:endParaRPr lang="en-US" sz="1300" dirty="0">
+              <a:solidFill>
+                <a:srgbClr val="385D8A"/>
+              </a:solidFill>
+            </a:endParaRPr>
+          </a:p>
+          <a:p>
+            <a:pPr marL="723900" lvl="2" indent="-188913" defTabSz="839694">
+              <a:buClr>
+                <a:srgbClr val="00B0F0"/>
+              </a:buClr>
+              <a:buSzPct val="75000"/>
+              <a:buFont typeface="Wingdings 3" panose="05040102010807070707" pitchFamily="18" charset="2"/>
+              <a:buChar char="u"/>
+              <a:defRPr/>
+            </a:pPr>
             <a:r>
               <a:rPr lang="en-US" sz="1300" dirty="0">
                 <a:solidFill>
                   <a:srgbClr val="385D8A"/>
                 </a:solidFill>
               </a:rPr>
-              <a:t> Joseph</a:t>
-            </a:r>
+              <a:t>25/10/2024 - Madhu </a:t>
+            </a:r>
+            <a:r>
+              <a:rPr lang="en-US" sz="1300" dirty="0" err="1">
+                <a:solidFill>
+                  <a:srgbClr val="385D8A"/>
+                </a:solidFill>
+              </a:rPr>
+              <a:t>Pandikkadu</a:t>
+            </a:r>
+            <a:endParaRPr lang="en-US" sz="1300" dirty="0">
+              <a:solidFill>
+                <a:srgbClr val="385D8A"/>
+              </a:solidFill>
+            </a:endParaRPr>
+          </a:p>
+          <a:p>
+            <a:pPr marL="723900" lvl="2" indent="-188913" defTabSz="839694">
+              <a:buClr>
+                <a:srgbClr val="00B0F0"/>
+              </a:buClr>
+              <a:buSzPct val="75000"/>
+              <a:buFont typeface="Wingdings 3" panose="05040102010807070707" pitchFamily="18" charset="2"/>
+              <a:buChar char="u"/>
+              <a:defRPr/>
+            </a:pPr>
+            <a:endParaRPr lang="en-US" sz="1300" dirty="0">
+              <a:solidFill>
+                <a:srgbClr val="385D8A"/>
+              </a:solidFill>
+            </a:endParaRPr>
           </a:p>
           <a:p>
             <a:pPr marL="77787" lvl="1" defTabSz="839694">
@@ -4690,7 +4885,7 @@
         <p:spPr>
           <a:xfrm>
             <a:off x="6076649" y="3672218"/>
-            <a:ext cx="5480904" cy="2292935"/>
+            <a:ext cx="5480904" cy="3200876"/>
           </a:xfrm>
           <a:prstGeom prst="rect">
             <a:avLst/>
@@ -4726,15 +4921,15 @@
               <a:defRPr/>
             </a:pPr>
             <a:r>
-              <a:rPr lang="en-US" sz="1300" dirty="0">
+              <a:rPr lang="en-US" sz="1100" dirty="0">
                 <a:solidFill>
                   <a:srgbClr val="385D8A"/>
                 </a:solidFill>
                 <a:hlinkClick r:id="rId3"/>
               </a:rPr>
-              <a:t>https://beinexmicrosoft-my.sharepoint.com/:f:/g/personal/dilna_dileep_beinex_com/Eu8zNyI-8RtBgaZJ3uOFob0BrdkdOPi1mQQslsBrs-8dAg?e=8iCGlE</a:t>
-            </a:r>
-            <a:endParaRPr lang="en-US" sz="1300" dirty="0">
+              <a:t>https://beinexmicrosoft-my.sharepoint.com/:f:/g/personal/dilna_dileep_beinex_com/EpqrAuMGTr5CvcrEcRoj9GkB7QcXzc80P2bPL1ZvzAAEAg?e=BmCYCx</a:t>
+            </a:r>
+            <a:endParaRPr lang="en-US" sz="1100" dirty="0">
               <a:solidFill>
                 <a:srgbClr val="385D8A"/>
               </a:solidFill>
@@ -4751,15 +4946,15 @@
               <a:defRPr/>
             </a:pPr>
             <a:r>
-              <a:rPr lang="en-US" sz="1300" dirty="0">
+              <a:rPr lang="en-US" sz="1100" dirty="0">
                 <a:solidFill>
                   <a:srgbClr val="385D8A"/>
                 </a:solidFill>
                 <a:hlinkClick r:id="rId4"/>
               </a:rPr>
-              <a:t>https://beinexmicrosoft-my.sharepoint.com/:f:/g/personal/dilna_dileep_beinex_com/Eg-1relTSTBOvKTiRCKNhvIBtF0HnqvbgpCAfwJelM7M6g?e=dceXQW</a:t>
-            </a:r>
-            <a:endParaRPr lang="en-US" sz="1300" dirty="0">
+              <a:t>https://beinexmicrosoft-my.sharepoint.com/:f:/g/personal/dilna_dileep_beinex_com/Ep0OrBrDQ0ZKuut92vMCcDgBr0-CdmQPKsDT_Xn3kgX8jg?e=2Gdtlz</a:t>
+            </a:r>
+            <a:endParaRPr lang="en-US" sz="1100" dirty="0">
               <a:solidFill>
                 <a:srgbClr val="385D8A"/>
               </a:solidFill>
@@ -4776,23 +4971,94 @@
               <a:defRPr/>
             </a:pPr>
             <a:r>
-              <a:rPr lang="en-US" sz="1300" dirty="0">
+              <a:rPr lang="en-US" sz="1100" dirty="0">
                 <a:solidFill>
                   <a:srgbClr val="385D8A"/>
                 </a:solidFill>
+                <a:hlinkClick r:id="rId5"/>
               </a:rPr>
-              <a:t>https://beinexmicrosoft-my.sharepoint.com/:f:/g/personal/dilna_dileep_beinex_com/EtAsNydql1FFsUjfVJyQKKYBmwa7XXLH5UORAXP8F9HwBw?e=nzH6sQ</a:t>
-            </a:r>
-          </a:p>
-          <a:p>
-            <a:pPr marL="77787" lvl="1" defTabSz="839694">
-              <a:spcBef>
-                <a:spcPts val="0"/>
-              </a:spcBef>
-              <a:buClr>
-                <a:srgbClr val="00B0F0"/>
-              </a:buClr>
-              <a:buSzPct val="75000"/>
+              <a:t>https://beinexmicrosoft-my.sharepoint.com/:f:/g/personal/dilna_dileep_beinex_com/Eosxe-kRRR5FkUrdpaP2oH0Bq8xI7FiiyiqzGYtYo5ajeg?e=1p2aTJ</a:t>
+            </a:r>
+            <a:endParaRPr lang="en-US" sz="1100" dirty="0">
+              <a:solidFill>
+                <a:srgbClr val="385D8A"/>
+              </a:solidFill>
+            </a:endParaRPr>
+          </a:p>
+          <a:p>
+            <a:pPr marL="723900" lvl="2" indent="-188913" defTabSz="839694">
+              <a:buClr>
+                <a:srgbClr val="00B0F0"/>
+              </a:buClr>
+              <a:buSzPct val="75000"/>
+              <a:buFont typeface="Wingdings 3" panose="05040102010807070707" pitchFamily="18" charset="2"/>
+              <a:buChar char="u"/>
+              <a:defRPr/>
+            </a:pPr>
+            <a:r>
+              <a:rPr lang="en-US" sz="1100" dirty="0">
+                <a:solidFill>
+                  <a:srgbClr val="385D8A"/>
+                </a:solidFill>
+                <a:hlinkClick r:id="rId6"/>
+              </a:rPr>
+              <a:t>https://beinexmicrosoft-my.sharepoint.com/:f:/g/personal/dilna_dileep_beinex_com/EvLPe2oDjQpBr9Ens_t7LHAB_sleWrBE_c6KK3-9EWMuOQ?e=bka3Nm</a:t>
+            </a:r>
+            <a:endParaRPr lang="en-US" sz="1100" dirty="0">
+              <a:solidFill>
+                <a:srgbClr val="385D8A"/>
+              </a:solidFill>
+            </a:endParaRPr>
+          </a:p>
+          <a:p>
+            <a:pPr marL="723900" lvl="2" indent="-188913" defTabSz="839694">
+              <a:buClr>
+                <a:srgbClr val="00B0F0"/>
+              </a:buClr>
+              <a:buSzPct val="75000"/>
+              <a:buFont typeface="Wingdings 3" panose="05040102010807070707" pitchFamily="18" charset="2"/>
+              <a:buChar char="u"/>
+              <a:defRPr/>
+            </a:pPr>
+            <a:r>
+              <a:rPr lang="en-US" sz="1100" dirty="0">
+                <a:solidFill>
+                  <a:srgbClr val="385D8A"/>
+                </a:solidFill>
+                <a:hlinkClick r:id="rId7"/>
+              </a:rPr>
+              <a:t>https://beinexmicrosoft-my.sharepoint.com/:f:/g/personal/dilna_dileep_beinex_com/EpZJJHoAIrROtBbwoh6CoA4B6TUVM86eqPISJcoVxkqKAQ?e=DbS70r</a:t>
+            </a:r>
+            <a:endParaRPr lang="en-US" sz="1100" dirty="0">
+              <a:solidFill>
+                <a:srgbClr val="385D8A"/>
+              </a:solidFill>
+            </a:endParaRPr>
+          </a:p>
+          <a:p>
+            <a:pPr marL="723900" lvl="2" indent="-188913" defTabSz="839694">
+              <a:buClr>
+                <a:srgbClr val="00B0F0"/>
+              </a:buClr>
+              <a:buSzPct val="75000"/>
+              <a:buFont typeface="Wingdings 3" panose="05040102010807070707" pitchFamily="18" charset="2"/>
+              <a:buChar char="u"/>
+              <a:defRPr/>
+            </a:pPr>
+            <a:endParaRPr lang="en-US" sz="1100" dirty="0">
+              <a:solidFill>
+                <a:srgbClr val="385D8A"/>
+              </a:solidFill>
+            </a:endParaRPr>
+          </a:p>
+          <a:p>
+            <a:pPr marL="723900" lvl="2" indent="-188913" defTabSz="839694">
+              <a:buClr>
+                <a:srgbClr val="00B0F0"/>
+              </a:buClr>
+              <a:buSzPct val="75000"/>
+              <a:buFont typeface="Wingdings 3" panose="05040102010807070707" pitchFamily="18" charset="2"/>
+              <a:buChar char="u"/>
               <a:defRPr/>
             </a:pPr>
             <a:endParaRPr lang="en-US" sz="1300" dirty="0">
@@ -5273,7 +5539,23 @@
                   <a:srgbClr val="0070C0"/>
                 </a:solidFill>
               </a:rPr>
-              <a:t>Week 1 (07/10/2024-11/10/2024)</a:t>
+              <a:t>Week 2 </a:t>
+            </a:r>
+            <a:r>
+              <a:rPr lang="en-US" sz="2600" b="1">
+                <a:solidFill>
+                  <a:srgbClr val="0070C0"/>
+                </a:solidFill>
+              </a:rPr>
+              <a:t>(14/10/2024-18/10/2024</a:t>
+            </a:r>
+            <a:r>
+              <a:rPr lang="en-US" sz="2600" b="1" dirty="0">
+                <a:solidFill>
+                  <a:srgbClr val="0070C0"/>
+                </a:solidFill>
+              </a:rPr>
+              <a:t>)</a:t>
             </a:r>
           </a:p>
           <a:p>
@@ -5672,7 +5954,7 @@
                   <a:srgbClr val="385D8A"/>
                 </a:solidFill>
               </a:rPr>
-              <a:t>07/10/2024 – Induction Program</a:t>
+              <a:t>14/10/2024 – Session focused on SCSS basics and task submission</a:t>
             </a:r>
           </a:p>
           <a:p>
@@ -5703,23 +5985,55 @@
                   <a:srgbClr val="385D8A"/>
                 </a:solidFill>
               </a:rPr>
-              <a:t>08/10/2024 – Task 1 – Preparation and submission R &amp; D on </a:t>
-            </a:r>
-            <a:r>
-              <a:rPr lang="en-US" sz="1300" dirty="0" err="1">
+              <a:t>15/10/2024 – Session focused on Bootstrap font, and task submission</a:t>
+            </a:r>
+          </a:p>
+          <a:p>
+            <a:pPr marL="534987" lvl="2" defTabSz="839694">
+              <a:buClr>
+                <a:srgbClr val="00B0F0"/>
+              </a:buClr>
+              <a:buSzPct val="75000"/>
+              <a:defRPr/>
+            </a:pPr>
+            <a:endParaRPr lang="en-US" sz="1300" dirty="0">
+              <a:solidFill>
+                <a:srgbClr val="385D8A"/>
+              </a:solidFill>
+            </a:endParaRPr>
+          </a:p>
+          <a:p>
+            <a:pPr marL="534987" lvl="2" defTabSz="839694">
+              <a:buClr>
+                <a:srgbClr val="00B0F0"/>
+              </a:buClr>
+              <a:buSzPct val="75000"/>
+              <a:defRPr/>
+            </a:pPr>
+            <a:r>
+              <a:rPr lang="en-US" sz="1300" dirty="0">
                 <a:solidFill>
                   <a:srgbClr val="385D8A"/>
                 </a:solidFill>
               </a:rPr>
-              <a:t>HTML,CSS,Bootstrap</a:t>
-            </a:r>
+              <a:t>16/10/2024 – Final class of HTML , CSS, Bootstrap .</a:t>
+            </a:r>
+          </a:p>
+          <a:p>
+            <a:pPr marL="534987" lvl="2" defTabSz="839694">
+              <a:buClr>
+                <a:srgbClr val="00B0F0"/>
+              </a:buClr>
+              <a:buSzPct val="75000"/>
+              <a:defRPr/>
+            </a:pPr>
             <a:r>
               <a:rPr lang="en-US" sz="1300" dirty="0">
                 <a:solidFill>
                   <a:srgbClr val="385D8A"/>
                 </a:solidFill>
               </a:rPr>
-              <a:t>.</a:t>
+              <a:t>17/10/2024 – Task completed and submitted.</a:t>
             </a:r>
           </a:p>
           <a:p>
@@ -5730,6 +6044,23 @@
               <a:buSzPct val="75000"/>
               <a:defRPr/>
             </a:pPr>
+            <a:r>
+              <a:rPr lang="en-US" sz="1300" dirty="0">
+                <a:solidFill>
+                  <a:srgbClr val="385D8A"/>
+                </a:solidFill>
+              </a:rPr>
+              <a:t>18/10/2024 –Final session of HTML and  doubt clearing .</a:t>
+            </a:r>
+          </a:p>
+          <a:p>
+            <a:pPr marL="534987" lvl="2" defTabSz="839694">
+              <a:buClr>
+                <a:srgbClr val="00B0F0"/>
+              </a:buClr>
+              <a:buSzPct val="75000"/>
+              <a:defRPr/>
+            </a:pPr>
             <a:endParaRPr lang="en-US" sz="1300" dirty="0">
               <a:solidFill>
                 <a:srgbClr val="385D8A"/>
@@ -5744,14 +6075,11 @@
               <a:buSzPct val="75000"/>
               <a:defRPr/>
             </a:pPr>
-            <a:r>
-              <a:rPr lang="en-US" sz="1300" dirty="0">
-                <a:solidFill>
-                  <a:srgbClr val="385D8A"/>
-                </a:solidFill>
-              </a:rPr>
-              <a:t>09/10/2024 – Task 2 – Preparation and submission of HTML testcase of resume using various HTML tags.</a:t>
-            </a:r>
+            <a:endParaRPr lang="en-US" sz="1300" dirty="0">
+              <a:solidFill>
+                <a:srgbClr val="385D8A"/>
+              </a:solidFill>
+            </a:endParaRPr>
           </a:p>
           <a:p>
             <a:pPr marL="534987" lvl="2" defTabSz="839694">
@@ -5775,14 +6103,11 @@
               <a:buSzPct val="75000"/>
               <a:defRPr/>
             </a:pPr>
-            <a:r>
-              <a:rPr lang="en-US" sz="1300" dirty="0">
-                <a:solidFill>
-                  <a:srgbClr val="385D8A"/>
-                </a:solidFill>
-              </a:rPr>
-              <a:t>10/10/2024 – Task 3 – Preparation and submission of HTML testcase of Portfolio.</a:t>
-            </a:r>
+            <a:endParaRPr lang="en-US" sz="1300" dirty="0">
+              <a:solidFill>
+                <a:srgbClr val="385D8A"/>
+              </a:solidFill>
+            </a:endParaRPr>
           </a:p>
           <a:p>
             <a:pPr marL="534987" lvl="2" defTabSz="839694">
@@ -5797,39 +6122,6 @@
                 <a:srgbClr val="385D8A"/>
               </a:solidFill>
             </a:endParaRPr>
-          </a:p>
-          <a:p>
-            <a:pPr marL="534987" lvl="2" defTabSz="839694">
-              <a:buClr>
-                <a:srgbClr val="00B0F0"/>
-              </a:buClr>
-              <a:buSzPct val="75000"/>
-              <a:defRPr/>
-            </a:pPr>
-            <a:r>
-              <a:rPr lang="en-US" sz="1300" dirty="0">
-                <a:solidFill>
-                  <a:srgbClr val="385D8A"/>
-                </a:solidFill>
-              </a:rPr>
-              <a:t>11/10/2024 – Task 4 – Preparation and submission of  HTML page designed using different </a:t>
-            </a:r>
-            <a:r>
-              <a:rPr lang="en-US" sz="1300" dirty="0" err="1">
-                <a:solidFill>
-                  <a:srgbClr val="385D8A"/>
-                </a:solidFill>
-              </a:rPr>
-              <a:t>css</a:t>
-            </a:r>
-            <a:r>
-              <a:rPr lang="en-US" sz="1300" dirty="0">
-                <a:solidFill>
-                  <a:srgbClr val="385D8A"/>
-                </a:solidFill>
-              </a:rPr>
-              <a:t> styling.</a:t>
-            </a:r>
           </a:p>
           <a:p>
             <a:pPr marL="534987" lvl="2" defTabSz="839694">
@@ -5920,7 +6212,7 @@
         <p:spPr>
           <a:xfrm>
             <a:off x="6286894" y="1273660"/>
-            <a:ext cx="5290010" cy="1492716"/>
+            <a:ext cx="5290010" cy="1292662"/>
           </a:xfrm>
           <a:prstGeom prst="rect">
             <a:avLst/>
@@ -5961,7 +6253,7 @@
                   <a:srgbClr val="385D8A"/>
                 </a:solidFill>
               </a:rPr>
-              <a:t>07/10/2024 – Ramya Raju</a:t>
+              <a:t>14/10/2024 – Manu Martin</a:t>
             </a:r>
           </a:p>
           <a:p>
@@ -5980,23 +6272,7 @@
                   <a:srgbClr val="385D8A"/>
                 </a:solidFill>
               </a:rPr>
-              <a:t>08/10/2024 – </a:t>
-            </a:r>
-            <a:r>
-              <a:rPr lang="en-US" sz="1300" dirty="0" err="1">
-                <a:solidFill>
-                  <a:srgbClr val="385D8A"/>
-                </a:solidFill>
-              </a:rPr>
-              <a:t>Siji</a:t>
-            </a:r>
-            <a:r>
-              <a:rPr lang="en-US" sz="1300" dirty="0">
-                <a:solidFill>
-                  <a:srgbClr val="385D8A"/>
-                </a:solidFill>
-              </a:rPr>
-              <a:t> Johnson</a:t>
+              <a:t>15/10/2024 – Manu Martin</a:t>
             </a:r>
           </a:p>
           <a:p>
@@ -6015,7 +6291,23 @@
                   <a:srgbClr val="385D8A"/>
                 </a:solidFill>
               </a:rPr>
-              <a:t>09/10/2024 – Stanly Baby </a:t>
+              <a:t>16/10/1024 – Stanly Baby &amp; </a:t>
+            </a:r>
+            <a:r>
+              <a:rPr lang="en-US" sz="1300" dirty="0" err="1">
+                <a:solidFill>
+                  <a:srgbClr val="385D8A"/>
+                </a:solidFill>
+              </a:rPr>
+              <a:t>Ribin</a:t>
+            </a:r>
+            <a:r>
+              <a:rPr lang="en-US" sz="1300" dirty="0">
+                <a:solidFill>
+                  <a:srgbClr val="385D8A"/>
+                </a:solidFill>
+              </a:rPr>
+              <a:t> Joseph</a:t>
             </a:r>
           </a:p>
           <a:p>
@@ -6034,27 +6326,29 @@
                   <a:srgbClr val="385D8A"/>
                 </a:solidFill>
               </a:rPr>
-              <a:t>10/10/2024 - Stanly Baby </a:t>
-            </a:r>
-          </a:p>
-          <a:p>
-            <a:pPr marL="723900" lvl="2" indent="-188913" defTabSz="839694">
-              <a:buClr>
-                <a:srgbClr val="00B0F0"/>
-              </a:buClr>
-              <a:buSzPct val="75000"/>
-              <a:buFont typeface="Wingdings 3" panose="05040102010807070707" pitchFamily="18" charset="2"/>
-              <a:buChar char="u"/>
-              <a:defRPr/>
-            </a:pPr>
-            <a:r>
-              <a:rPr lang="en-US" sz="1300" dirty="0">
+              <a:t>18/10/2024 – Stanly Baby &amp; </a:t>
+            </a:r>
+            <a:r>
+              <a:rPr lang="en-US" sz="1300" dirty="0" err="1">
                 <a:solidFill>
                   <a:srgbClr val="385D8A"/>
                 </a:solidFill>
               </a:rPr>
-              <a:t>11/10/2024 - Stanly Baby </a:t>
-            </a:r>
+              <a:t>Ribin</a:t>
+            </a:r>
+            <a:r>
+              <a:rPr lang="en-US" sz="1300">
+                <a:solidFill>
+                  <a:srgbClr val="385D8A"/>
+                </a:solidFill>
+              </a:rPr>
+              <a:t> Joseph</a:t>
+            </a:r>
+            <a:endParaRPr lang="en-US" sz="1300" dirty="0">
+              <a:solidFill>
+                <a:srgbClr val="385D8A"/>
+              </a:solidFill>
+            </a:endParaRPr>
           </a:p>
           <a:p>
             <a:pPr marL="77787" lvl="1" defTabSz="839694">
@@ -6090,7 +6384,7 @@
         <p:spPr>
           <a:xfrm>
             <a:off x="6076649" y="3672218"/>
-            <a:ext cx="5480904" cy="2292935"/>
+            <a:ext cx="5480904" cy="3293209"/>
           </a:xfrm>
           <a:prstGeom prst="rect">
             <a:avLst/>
@@ -6130,9 +6424,15 @@
                 <a:solidFill>
                   <a:srgbClr val="385D8A"/>
                 </a:solidFill>
+                <a:hlinkClick r:id="rId3"/>
               </a:rPr>
-              <a:t>https://beinexmicrosoft-my.sharepoint.com/:w:/g/personal/dilna_dileep_beinex_com/ERoJcUcWSNpAuRL31oHtaGQB-mBs9jkm27tWMc3-FcS_gw?e=dmhHfA</a:t>
-            </a:r>
+              <a:t>https://beinexmicrosoft-my.sharepoint.com/:f:/g/personal/dilna_dileep_beinex_com/Eu8zNyI-8RtBgaZJ3uOFob0BrdkdOPi1mQQslsBrs-8dAg?e=8iCGlE</a:t>
+            </a:r>
+            <a:endParaRPr lang="en-US" sz="1300" dirty="0">
+              <a:solidFill>
+                <a:srgbClr val="385D8A"/>
+              </a:solidFill>
+            </a:endParaRPr>
           </a:p>
           <a:p>
             <a:pPr marL="723900" lvl="2" indent="-188913" defTabSz="839694">
@@ -6149,9 +6449,15 @@
                 <a:solidFill>
                   <a:srgbClr val="385D8A"/>
                 </a:solidFill>
+                <a:hlinkClick r:id="rId4"/>
               </a:rPr>
-              <a:t>https://beinexmicrosoft-my.sharepoint.com/:u:/g/personal/dilna_dileep_beinex_com/EXJiiCNloDRIoi4M9zuME7kBFCnDB55Qab0GwKHiUxZmJQ?e=3IzsaA</a:t>
-            </a:r>
+              <a:t>https://beinexmicrosoft-my.sharepoint.com/:f:/g/personal/dilna_dileep_beinex_com/Eg-1relTSTBOvKTiRCKNhvIBtF0HnqvbgpCAfwJelM7M6g?e=dceXQW</a:t>
+            </a:r>
+            <a:endParaRPr lang="en-US" sz="1300" dirty="0">
+              <a:solidFill>
+                <a:srgbClr val="385D8A"/>
+              </a:solidFill>
+            </a:endParaRPr>
           </a:p>
           <a:p>
             <a:pPr marL="723900" lvl="2" indent="-188913" defTabSz="839694">
@@ -6168,9 +6474,56 @@
                 <a:solidFill>
                   <a:srgbClr val="385D8A"/>
                 </a:solidFill>
+                <a:hlinkClick r:id="rId5"/>
               </a:rPr>
-              <a:t>https://beinexmicrosoft-my.sharepoint.com/:u:/g/personal/dilna_dileep_beinex_com/EYui1_5a015KuwWDr9lx4GcBqOyrmC5Ec6hzlssORaOI0Q?e=iNDrCu</a:t>
-            </a:r>
+              <a:t>https://beinexmicrosoft-my.sharepoint.com/:f:/g/personal/dilna_dileep_beinex_com/EtAsNydql1FFsUjfVJyQKKYBmwa7XXLH5UORAXP8F9HwBw?e=nzH6sQ</a:t>
+            </a:r>
+            <a:endParaRPr lang="en-US" sz="1300" dirty="0">
+              <a:solidFill>
+                <a:srgbClr val="385D8A"/>
+              </a:solidFill>
+            </a:endParaRPr>
+          </a:p>
+          <a:p>
+            <a:pPr marL="723900" lvl="2" indent="-188913" defTabSz="839694">
+              <a:buClr>
+                <a:srgbClr val="00B0F0"/>
+              </a:buClr>
+              <a:buSzPct val="75000"/>
+              <a:buFont typeface="Wingdings 3" panose="05040102010807070707" pitchFamily="18" charset="2"/>
+              <a:buChar char="u"/>
+              <a:defRPr/>
+            </a:pPr>
+            <a:r>
+              <a:rPr lang="en-US" sz="1300" dirty="0">
+                <a:solidFill>
+                  <a:srgbClr val="385D8A"/>
+                </a:solidFill>
+                <a:hlinkClick r:id="rId6"/>
+              </a:rPr>
+              <a:t>https://beinexmicrosoft-my.sharepoint.com/:f:/g/personal/dilna_dileep_beinex_com/En2i4xUklblHnCYB3FzSXoQBA0MVZ8gWZh_F2Bitv_ZDmA?e=CqWeqs</a:t>
+            </a:r>
+            <a:endParaRPr lang="en-US" sz="1300" dirty="0">
+              <a:solidFill>
+                <a:srgbClr val="385D8A"/>
+              </a:solidFill>
+            </a:endParaRPr>
+          </a:p>
+          <a:p>
+            <a:pPr marL="723900" lvl="2" indent="-188913" defTabSz="839694">
+              <a:buClr>
+                <a:srgbClr val="00B0F0"/>
+              </a:buClr>
+              <a:buSzPct val="75000"/>
+              <a:buFont typeface="Wingdings 3" panose="05040102010807070707" pitchFamily="18" charset="2"/>
+              <a:buChar char="u"/>
+              <a:defRPr/>
+            </a:pPr>
+            <a:endParaRPr lang="en-US" sz="1300" dirty="0">
+              <a:solidFill>
+                <a:srgbClr val="385D8A"/>
+              </a:solidFill>
+            </a:endParaRPr>
           </a:p>
           <a:p>
             <a:pPr marL="77787" lvl="1" defTabSz="839694">
@@ -6189,12 +6542,29 @@
               </a:solidFill>
             </a:endParaRPr>
           </a:p>
+          <a:p>
+            <a:pPr marL="77787" lvl="1" defTabSz="839694">
+              <a:spcBef>
+                <a:spcPts val="0"/>
+              </a:spcBef>
+              <a:buClr>
+                <a:srgbClr val="00B0F0"/>
+              </a:buClr>
+              <a:buSzPct val="75000"/>
+              <a:defRPr/>
+            </a:pPr>
+            <a:endParaRPr lang="en-US" sz="1300" dirty="0">
+              <a:solidFill>
+                <a:srgbClr val="385D8A"/>
+              </a:solidFill>
+            </a:endParaRPr>
+          </a:p>
         </p:txBody>
       </p:sp>
     </p:spTree>
     <p:extLst>
       <p:ext uri="{BB962C8B-B14F-4D97-AF65-F5344CB8AC3E}">
-        <p14:creationId xmlns:p14="http://schemas.microsoft.com/office/powerpoint/2010/main" val="2399286281"/>
+        <p14:creationId xmlns:p14="http://schemas.microsoft.com/office/powerpoint/2010/main" val="2689186491"/>
       </p:ext>
     </p:extLst>
   </p:cSld>
@@ -6725,7 +7095,7 @@
         <p:spPr>
           <a:xfrm>
             <a:off x="446694" y="1537918"/>
-            <a:ext cx="5290010" cy="1092607"/>
+            <a:ext cx="5290010" cy="3908762"/>
           </a:xfrm>
           <a:prstGeom prst="rect">
             <a:avLst/>
@@ -6737,6 +7107,195 @@
           </a:bodyPr>
           <a:lstStyle/>
           <a:p>
+            <a:pPr marL="266700" lvl="1" indent="-188913" defTabSz="839694">
+              <a:buClr>
+                <a:srgbClr val="00B0F0"/>
+              </a:buClr>
+              <a:buSzPct val="75000"/>
+              <a:buFont typeface="Wingdings 3" panose="05040102010807070707" pitchFamily="18" charset="2"/>
+              <a:buChar char="u"/>
+              <a:defRPr/>
+            </a:pPr>
+            <a:endParaRPr lang="en-US" sz="1400" b="1" dirty="0">
+              <a:solidFill>
+                <a:srgbClr val="385D8A"/>
+              </a:solidFill>
+            </a:endParaRPr>
+          </a:p>
+          <a:p>
+            <a:pPr marL="534987" lvl="2" defTabSz="839694">
+              <a:buClr>
+                <a:srgbClr val="00B0F0"/>
+              </a:buClr>
+              <a:buSzPct val="75000"/>
+              <a:defRPr/>
+            </a:pPr>
+            <a:r>
+              <a:rPr lang="en-US" sz="1300" dirty="0">
+                <a:solidFill>
+                  <a:srgbClr val="385D8A"/>
+                </a:solidFill>
+              </a:rPr>
+              <a:t>07/10/2024 – Induction Program</a:t>
+            </a:r>
+          </a:p>
+          <a:p>
+            <a:pPr marL="534987" lvl="2" defTabSz="839694">
+              <a:buClr>
+                <a:srgbClr val="00B0F0"/>
+              </a:buClr>
+              <a:buSzPct val="75000"/>
+              <a:defRPr/>
+            </a:pPr>
+            <a:endParaRPr lang="en-US" sz="1300" dirty="0">
+              <a:solidFill>
+                <a:srgbClr val="385D8A"/>
+              </a:solidFill>
+            </a:endParaRPr>
+          </a:p>
+          <a:p>
+            <a:pPr marL="534987" lvl="2" defTabSz="839694">
+              <a:buClr>
+                <a:srgbClr val="00B0F0"/>
+              </a:buClr>
+              <a:buSzPct val="75000"/>
+              <a:defRPr/>
+            </a:pPr>
+            <a:r>
+              <a:rPr lang="en-US" sz="1300" dirty="0">
+                <a:solidFill>
+                  <a:srgbClr val="385D8A"/>
+                </a:solidFill>
+              </a:rPr>
+              <a:t>08/10/2024 – Task 1 – Preparation and submission R &amp; D on </a:t>
+            </a:r>
+            <a:r>
+              <a:rPr lang="en-US" sz="1300" dirty="0" err="1">
+                <a:solidFill>
+                  <a:srgbClr val="385D8A"/>
+                </a:solidFill>
+              </a:rPr>
+              <a:t>HTML,CSS,Bootstrap</a:t>
+            </a:r>
+            <a:r>
+              <a:rPr lang="en-US" sz="1300" dirty="0">
+                <a:solidFill>
+                  <a:srgbClr val="385D8A"/>
+                </a:solidFill>
+              </a:rPr>
+              <a:t>.</a:t>
+            </a:r>
+          </a:p>
+          <a:p>
+            <a:pPr marL="534987" lvl="2" defTabSz="839694">
+              <a:buClr>
+                <a:srgbClr val="00B0F0"/>
+              </a:buClr>
+              <a:buSzPct val="75000"/>
+              <a:defRPr/>
+            </a:pPr>
+            <a:endParaRPr lang="en-US" sz="1300" dirty="0">
+              <a:solidFill>
+                <a:srgbClr val="385D8A"/>
+              </a:solidFill>
+            </a:endParaRPr>
+          </a:p>
+          <a:p>
+            <a:pPr marL="534987" lvl="2" defTabSz="839694">
+              <a:buClr>
+                <a:srgbClr val="00B0F0"/>
+              </a:buClr>
+              <a:buSzPct val="75000"/>
+              <a:defRPr/>
+            </a:pPr>
+            <a:r>
+              <a:rPr lang="en-US" sz="1300" dirty="0">
+                <a:solidFill>
+                  <a:srgbClr val="385D8A"/>
+                </a:solidFill>
+              </a:rPr>
+              <a:t>09/10/2024 – Task 2 – Preparation and submission of HTML testcase of resume using various HTML tags.</a:t>
+            </a:r>
+          </a:p>
+          <a:p>
+            <a:pPr marL="534987" lvl="2" defTabSz="839694">
+              <a:buClr>
+                <a:srgbClr val="00B0F0"/>
+              </a:buClr>
+              <a:buSzPct val="75000"/>
+              <a:defRPr/>
+            </a:pPr>
+            <a:endParaRPr lang="en-US" sz="1300" dirty="0">
+              <a:solidFill>
+                <a:srgbClr val="385D8A"/>
+              </a:solidFill>
+            </a:endParaRPr>
+          </a:p>
+          <a:p>
+            <a:pPr marL="534987" lvl="2" defTabSz="839694">
+              <a:buClr>
+                <a:srgbClr val="00B0F0"/>
+              </a:buClr>
+              <a:buSzPct val="75000"/>
+              <a:defRPr/>
+            </a:pPr>
+            <a:r>
+              <a:rPr lang="en-US" sz="1300" dirty="0">
+                <a:solidFill>
+                  <a:srgbClr val="385D8A"/>
+                </a:solidFill>
+              </a:rPr>
+              <a:t>10/10/2024 – Task 3 – Preparation and submission of HTML testcase of Portfolio.</a:t>
+            </a:r>
+          </a:p>
+          <a:p>
+            <a:pPr marL="534987" lvl="2" defTabSz="839694">
+              <a:buClr>
+                <a:srgbClr val="00B0F0"/>
+              </a:buClr>
+              <a:buSzPct val="75000"/>
+              <a:defRPr/>
+            </a:pPr>
+            <a:endParaRPr lang="en-US" sz="1300" dirty="0">
+              <a:solidFill>
+                <a:srgbClr val="385D8A"/>
+              </a:solidFill>
+            </a:endParaRPr>
+          </a:p>
+          <a:p>
+            <a:pPr marL="534987" lvl="2" defTabSz="839694">
+              <a:buClr>
+                <a:srgbClr val="00B0F0"/>
+              </a:buClr>
+              <a:buSzPct val="75000"/>
+              <a:defRPr/>
+            </a:pPr>
+            <a:r>
+              <a:rPr lang="en-US" sz="1300" dirty="0">
+                <a:solidFill>
+                  <a:srgbClr val="385D8A"/>
+                </a:solidFill>
+              </a:rPr>
+              <a:t>11/10/2024 – Task 4 – Preparation and submission of  HTML page designed using different </a:t>
+            </a:r>
+            <a:r>
+              <a:rPr lang="en-US" sz="1300" dirty="0" err="1">
+                <a:solidFill>
+                  <a:srgbClr val="385D8A"/>
+                </a:solidFill>
+              </a:rPr>
+              <a:t>css</a:t>
+            </a:r>
+            <a:r>
+              <a:rPr lang="en-US" sz="1300" dirty="0">
+                <a:solidFill>
+                  <a:srgbClr val="385D8A"/>
+                </a:solidFill>
+              </a:rPr>
+              <a:t> styling.</a:t>
+            </a:r>
+          </a:p>
+          <a:p>
             <a:pPr marL="534987" lvl="2" defTabSz="839694">
               <a:buClr>
                 <a:srgbClr val="00B0F0"/>
@@ -6825,7 +7384,7 @@
         <p:spPr>
           <a:xfrm>
             <a:off x="6286894" y="1273660"/>
-            <a:ext cx="5290010" cy="492443"/>
+            <a:ext cx="5290010" cy="1492716"/>
           </a:xfrm>
           <a:prstGeom prst="rect">
             <a:avLst/>
@@ -6851,6 +7410,117 @@
             </a:endParaRPr>
           </a:p>
           <a:p>
+            <a:pPr marL="723900" lvl="2" indent="-188913" defTabSz="839694">
+              <a:buClr>
+                <a:srgbClr val="00B0F0"/>
+              </a:buClr>
+              <a:buSzPct val="75000"/>
+              <a:buFont typeface="Wingdings 3" panose="05040102010807070707" pitchFamily="18" charset="2"/>
+              <a:buChar char="u"/>
+              <a:defRPr/>
+            </a:pPr>
+            <a:r>
+              <a:rPr lang="en-US" sz="1300" dirty="0">
+                <a:solidFill>
+                  <a:srgbClr val="385D8A"/>
+                </a:solidFill>
+              </a:rPr>
+              <a:t>07/10/2024 – Ramya Raju</a:t>
+            </a:r>
+          </a:p>
+          <a:p>
+            <a:pPr marL="723900" lvl="2" indent="-188913" defTabSz="839694">
+              <a:buClr>
+                <a:srgbClr val="00B0F0"/>
+              </a:buClr>
+              <a:buSzPct val="75000"/>
+              <a:buFont typeface="Wingdings 3" panose="05040102010807070707" pitchFamily="18" charset="2"/>
+              <a:buChar char="u"/>
+              <a:defRPr/>
+            </a:pPr>
+            <a:r>
+              <a:rPr lang="en-US" sz="1300" dirty="0">
+                <a:solidFill>
+                  <a:srgbClr val="385D8A"/>
+                </a:solidFill>
+              </a:rPr>
+              <a:t>08/10/2024 – </a:t>
+            </a:r>
+            <a:r>
+              <a:rPr lang="en-US" sz="1300" dirty="0" err="1">
+                <a:solidFill>
+                  <a:srgbClr val="385D8A"/>
+                </a:solidFill>
+              </a:rPr>
+              <a:t>Siji</a:t>
+            </a:r>
+            <a:r>
+              <a:rPr lang="en-US" sz="1300" dirty="0">
+                <a:solidFill>
+                  <a:srgbClr val="385D8A"/>
+                </a:solidFill>
+              </a:rPr>
+              <a:t> Johnson</a:t>
+            </a:r>
+          </a:p>
+          <a:p>
+            <a:pPr marL="723900" lvl="2" indent="-188913" defTabSz="839694">
+              <a:buClr>
+                <a:srgbClr val="00B0F0"/>
+              </a:buClr>
+              <a:buSzPct val="75000"/>
+              <a:buFont typeface="Wingdings 3" panose="05040102010807070707" pitchFamily="18" charset="2"/>
+              <a:buChar char="u"/>
+              <a:defRPr/>
+            </a:pPr>
+            <a:r>
+              <a:rPr lang="en-US" sz="1300" dirty="0">
+                <a:solidFill>
+                  <a:srgbClr val="385D8A"/>
+                </a:solidFill>
+              </a:rPr>
+              <a:t>09/10/2024 – Stanly Baby </a:t>
+            </a:r>
+          </a:p>
+          <a:p>
+            <a:pPr marL="723900" lvl="2" indent="-188913" defTabSz="839694">
+              <a:buClr>
+                <a:srgbClr val="00B0F0"/>
+              </a:buClr>
+              <a:buSzPct val="75000"/>
+              <a:buFont typeface="Wingdings 3" panose="05040102010807070707" pitchFamily="18" charset="2"/>
+              <a:buChar char="u"/>
+              <a:defRPr/>
+            </a:pPr>
+            <a:r>
+              <a:rPr lang="en-US" sz="1300" dirty="0">
+                <a:solidFill>
+                  <a:srgbClr val="385D8A"/>
+                </a:solidFill>
+              </a:rPr>
+              <a:t>10/10/2024 - Stanly Baby </a:t>
+            </a:r>
+          </a:p>
+          <a:p>
+            <a:pPr marL="723900" lvl="2" indent="-188913" defTabSz="839694">
+              <a:buClr>
+                <a:srgbClr val="00B0F0"/>
+              </a:buClr>
+              <a:buSzPct val="75000"/>
+              <a:buFont typeface="Wingdings 3" panose="05040102010807070707" pitchFamily="18" charset="2"/>
+              <a:buChar char="u"/>
+              <a:defRPr/>
+            </a:pPr>
+            <a:r>
+              <a:rPr lang="en-US" sz="1300" dirty="0">
+                <a:solidFill>
+                  <a:srgbClr val="385D8A"/>
+                </a:solidFill>
+              </a:rPr>
+              <a:t>11/10/2024 - Stanly Baby </a:t>
+            </a:r>
+          </a:p>
+          <a:p>
             <a:pPr marL="77787" lvl="1" defTabSz="839694">
               <a:spcBef>
                 <a:spcPts val="0"/>
@@ -6884,7 +7554,7 @@
         <p:spPr>
           <a:xfrm>
             <a:off x="6076649" y="3672218"/>
-            <a:ext cx="5480904" cy="1892826"/>
+            <a:ext cx="5480904" cy="3293209"/>
           </a:xfrm>
           <a:prstGeom prst="rect">
             <a:avLst/>
@@ -6919,6 +7589,21 @@
               <a:buChar char="u"/>
               <a:defRPr/>
             </a:pPr>
+            <a:r>
+              <a:rPr lang="en-US" sz="1300" dirty="0">
+                <a:solidFill>
+                  <a:srgbClr val="0070C0"/>
+                </a:solidFill>
+                <a:hlinkClick r:id="rId3">
+                  <a:extLst>
+                    <a:ext uri="{A12FA001-AC4F-418D-AE19-62706E023703}">
+                      <ahyp:hlinkClr xmlns:ahyp="http://schemas.microsoft.com/office/drawing/2018/hyperlinkcolor" val="tx"/>
+                    </a:ext>
+                  </a:extLst>
+                </a:hlinkClick>
+              </a:rPr>
+              <a:t>https://beinexmicrosoft-my.sharepoint.com/:w:/g/personal/dilna_dileep_beinex_com/ERoJcUcWSNpAuRL31oHtaGQB-mBs9jkm27tWMc3-FcS_gw?e=dmhHfA</a:t>
+            </a:r>
             <a:endParaRPr lang="en-US" sz="1300" dirty="0">
               <a:solidFill>
                 <a:srgbClr val="385D8A"/>
@@ -6936,30 +7621,53 @@
               <a:defRPr/>
             </a:pPr>
             <a:r>
-              <a:rPr lang="en-US" sz="1300" dirty="0" err="1">
+              <a:rPr lang="en-US" sz="1300" dirty="0">
                 <a:solidFill>
                   <a:srgbClr val="385D8A"/>
                 </a:solidFill>
+                <a:hlinkClick r:id="rId4"/>
               </a:rPr>
-              <a:t>Css</a:t>
-            </a:r>
+              <a:t>https://beinexmicrosoft-my.sharepoint.com/:u:/g/personal/dilna_dileep_beinex_com/EXJiiCNloDRIoi4M9zuME7kBFCnDB55Qab0GwKHiUxZmJQ?e=3IzsaA</a:t>
+            </a:r>
+            <a:endParaRPr lang="en-US" sz="1300" dirty="0">
+              <a:solidFill>
+                <a:srgbClr val="385D8A"/>
+              </a:solidFill>
+            </a:endParaRPr>
+          </a:p>
+          <a:p>
+            <a:pPr marL="723900" lvl="2" indent="-188913" defTabSz="839694">
+              <a:buClr>
+                <a:srgbClr val="00B0F0"/>
+              </a:buClr>
+              <a:buSzPct val="75000"/>
+              <a:buFont typeface="Wingdings 3" panose="05040102010807070707" pitchFamily="18" charset="2"/>
+              <a:buChar char="u"/>
+              <a:defRPr/>
+            </a:pPr>
             <a:r>
               <a:rPr lang="en-US" sz="1300" dirty="0">
                 <a:solidFill>
                   <a:srgbClr val="385D8A"/>
                 </a:solidFill>
+                <a:hlinkClick r:id="rId5"/>
               </a:rPr>
-              <a:t> file- https://beinexmicrosoft-my.sharepoint.com/:u:/g/personal/dilna_dileep_beinex_com/EcL0mOcE9axDnjRmFv83wEwBGakGU4x37wGagWFLxO0w6g?e=0tad8V</a:t>
-            </a:r>
-          </a:p>
-          <a:p>
-            <a:pPr marL="820737" lvl="2" indent="-285750" defTabSz="839694">
-              <a:buClr>
-                <a:srgbClr val="00B0F0"/>
-              </a:buClr>
-              <a:buSzPct val="75000"/>
-              <a:buFont typeface="Arial" panose="020B0604020202020204" pitchFamily="34" charset="0"/>
-              <a:buChar char="•"/>
+              <a:t>https://beinexmicrosoft-my.sharepoint.com/:u:/g/personal/dilna_dileep_beinex_com/EYui1_5a015KuwWDr9lx4GcBqOyrmC5Ec6hzlssORaOI0Q?e=iNDrCu</a:t>
+            </a:r>
+            <a:endParaRPr lang="en-US" sz="1300" dirty="0">
+              <a:solidFill>
+                <a:srgbClr val="385D8A"/>
+              </a:solidFill>
+            </a:endParaRPr>
+          </a:p>
+          <a:p>
+            <a:pPr marL="723900" lvl="2" indent="-188913" defTabSz="839694">
+              <a:buClr>
+                <a:srgbClr val="00B0F0"/>
+              </a:buClr>
+              <a:buSzPct val="75000"/>
+              <a:buFont typeface="Wingdings 3" panose="05040102010807070707" pitchFamily="18" charset="2"/>
+              <a:buChar char="u"/>
               <a:defRPr/>
             </a:pPr>
             <a:r>
@@ -6967,9 +7675,47 @@
                 <a:solidFill>
                   <a:srgbClr val="385D8A"/>
                 </a:solidFill>
+                <a:hlinkClick r:id="rId6"/>
               </a:rPr>
-              <a:t>	Html file - https://beinexmicrosoft-my.sharepoint.com/:u:/g/personal/dilna_dileep_beinex_com/EdthblVnMYVKr0UXUyYOiTQBVN9aJBJ8ha3BB257SoalOw?e=aR7vcM </a:t>
-            </a:r>
+              <a:t>https://beinexmicrosoft-my.sharepoint.com/:f:/g/personal/dilna_dileep_beinex_com/EvRew1bg0_lCt6zTmIEILeIB4-FZrSEIKqbNTSwwhAKmHw?e=zGMzCc</a:t>
+            </a:r>
+            <a:endParaRPr lang="en-US" sz="1300" dirty="0">
+              <a:solidFill>
+                <a:srgbClr val="385D8A"/>
+              </a:solidFill>
+            </a:endParaRPr>
+          </a:p>
+          <a:p>
+            <a:pPr marL="723900" lvl="2" indent="-188913" defTabSz="839694">
+              <a:buClr>
+                <a:srgbClr val="00B0F0"/>
+              </a:buClr>
+              <a:buSzPct val="75000"/>
+              <a:buFont typeface="Wingdings 3" panose="05040102010807070707" pitchFamily="18" charset="2"/>
+              <a:buChar char="u"/>
+              <a:defRPr/>
+            </a:pPr>
+            <a:endParaRPr lang="en-US" sz="1300" dirty="0">
+              <a:solidFill>
+                <a:srgbClr val="385D8A"/>
+              </a:solidFill>
+            </a:endParaRPr>
+          </a:p>
+          <a:p>
+            <a:pPr marL="723900" lvl="2" indent="-188913" defTabSz="839694">
+              <a:buClr>
+                <a:srgbClr val="00B0F0"/>
+              </a:buClr>
+              <a:buSzPct val="75000"/>
+              <a:buFont typeface="Wingdings 3" panose="05040102010807070707" pitchFamily="18" charset="2"/>
+              <a:buChar char="u"/>
+              <a:defRPr/>
+            </a:pPr>
+            <a:endParaRPr lang="en-US" sz="1300" dirty="0">
+              <a:solidFill>
+                <a:srgbClr val="385D8A"/>
+              </a:solidFill>
+            </a:endParaRPr>
           </a:p>
           <a:p>
             <a:pPr marL="77787" lvl="1" defTabSz="839694">
@@ -6993,7 +7739,7 @@
     </p:spTree>
     <p:extLst>
       <p:ext uri="{BB962C8B-B14F-4D97-AF65-F5344CB8AC3E}">
-        <p14:creationId xmlns:p14="http://schemas.microsoft.com/office/powerpoint/2010/main" val="416162850"/>
+        <p14:creationId xmlns:p14="http://schemas.microsoft.com/office/powerpoint/2010/main" val="2399286281"/>
       </p:ext>
     </p:extLst>
   </p:cSld>

</xml_diff>

<commit_message>
angular session started ,first task complete
</commit_message>
<xml_diff>
--- a/Weekly Status Update -Dilna Dileep.pptx
+++ b/Weekly Status Update -Dilna Dileep.pptx
@@ -8,8 +8,9 @@
     <p:sldId id="258" r:id="rId2"/>
     <p:sldId id="297" r:id="rId3"/>
     <p:sldId id="260" r:id="rId4"/>
-    <p:sldId id="300" r:id="rId5"/>
-    <p:sldId id="299" r:id="rId6"/>
+    <p:sldId id="301" r:id="rId5"/>
+    <p:sldId id="300" r:id="rId6"/>
+    <p:sldId id="299" r:id="rId7"/>
   </p:sldIdLst>
   <p:sldSz cx="12192000" cy="6858000"/>
   <p:notesSz cx="6858000" cy="9144000"/>
@@ -369,7 +370,7 @@
           <a:p>
             <a:fld id="{93B38562-6E7D-48A0-9E59-3F9BE1BF3686}" type="datetimeFigureOut">
               <a:rPr lang="en-GB" smtClean="0"/>
-              <a:t>25/10/2024</a:t>
+              <a:t>30/10/2024</a:t>
             </a:fld>
             <a:endParaRPr lang="en-GB"/>
           </a:p>
@@ -569,7 +570,7 @@
           <a:p>
             <a:fld id="{93B38562-6E7D-48A0-9E59-3F9BE1BF3686}" type="datetimeFigureOut">
               <a:rPr lang="en-GB" smtClean="0"/>
-              <a:t>25/10/2024</a:t>
+              <a:t>30/10/2024</a:t>
             </a:fld>
             <a:endParaRPr lang="en-GB"/>
           </a:p>
@@ -779,7 +780,7 @@
           <a:p>
             <a:fld id="{93B38562-6E7D-48A0-9E59-3F9BE1BF3686}" type="datetimeFigureOut">
               <a:rPr lang="en-GB" smtClean="0"/>
-              <a:t>25/10/2024</a:t>
+              <a:t>30/10/2024</a:t>
             </a:fld>
             <a:endParaRPr lang="en-GB"/>
           </a:p>
@@ -979,7 +980,7 @@
           <a:p>
             <a:fld id="{93B38562-6E7D-48A0-9E59-3F9BE1BF3686}" type="datetimeFigureOut">
               <a:rPr lang="en-GB" smtClean="0"/>
-              <a:t>25/10/2024</a:t>
+              <a:t>30/10/2024</a:t>
             </a:fld>
             <a:endParaRPr lang="en-GB"/>
           </a:p>
@@ -1255,7 +1256,7 @@
           <a:p>
             <a:fld id="{93B38562-6E7D-48A0-9E59-3F9BE1BF3686}" type="datetimeFigureOut">
               <a:rPr lang="en-GB" smtClean="0"/>
-              <a:t>25/10/2024</a:t>
+              <a:t>30/10/2024</a:t>
             </a:fld>
             <a:endParaRPr lang="en-GB"/>
           </a:p>
@@ -1523,7 +1524,7 @@
           <a:p>
             <a:fld id="{93B38562-6E7D-48A0-9E59-3F9BE1BF3686}" type="datetimeFigureOut">
               <a:rPr lang="en-GB" smtClean="0"/>
-              <a:t>25/10/2024</a:t>
+              <a:t>30/10/2024</a:t>
             </a:fld>
             <a:endParaRPr lang="en-GB"/>
           </a:p>
@@ -1938,7 +1939,7 @@
           <a:p>
             <a:fld id="{93B38562-6E7D-48A0-9E59-3F9BE1BF3686}" type="datetimeFigureOut">
               <a:rPr lang="en-GB" smtClean="0"/>
-              <a:t>25/10/2024</a:t>
+              <a:t>30/10/2024</a:t>
             </a:fld>
             <a:endParaRPr lang="en-GB"/>
           </a:p>
@@ -2080,7 +2081,7 @@
           <a:p>
             <a:fld id="{93B38562-6E7D-48A0-9E59-3F9BE1BF3686}" type="datetimeFigureOut">
               <a:rPr lang="en-GB" smtClean="0"/>
-              <a:t>25/10/2024</a:t>
+              <a:t>30/10/2024</a:t>
             </a:fld>
             <a:endParaRPr lang="en-GB"/>
           </a:p>
@@ -2193,7 +2194,7 @@
           <a:p>
             <a:fld id="{93B38562-6E7D-48A0-9E59-3F9BE1BF3686}" type="datetimeFigureOut">
               <a:rPr lang="en-GB" smtClean="0"/>
-              <a:t>25/10/2024</a:t>
+              <a:t>30/10/2024</a:t>
             </a:fld>
             <a:endParaRPr lang="en-GB"/>
           </a:p>
@@ -2506,7 +2507,7 @@
           <a:p>
             <a:fld id="{93B38562-6E7D-48A0-9E59-3F9BE1BF3686}" type="datetimeFigureOut">
               <a:rPr lang="en-GB" smtClean="0"/>
-              <a:t>25/10/2024</a:t>
+              <a:t>30/10/2024</a:t>
             </a:fld>
             <a:endParaRPr lang="en-GB"/>
           </a:p>
@@ -2795,7 +2796,7 @@
           <a:p>
             <a:fld id="{93B38562-6E7D-48A0-9E59-3F9BE1BF3686}" type="datetimeFigureOut">
               <a:rPr lang="en-GB" smtClean="0"/>
-              <a:t>25/10/2024</a:t>
+              <a:t>30/10/2024</a:t>
             </a:fld>
             <a:endParaRPr lang="en-GB"/>
           </a:p>
@@ -3038,7 +3039,7 @@
           <a:p>
             <a:fld id="{93B38562-6E7D-48A0-9E59-3F9BE1BF3686}" type="datetimeFigureOut">
               <a:rPr lang="en-GB" smtClean="0"/>
-              <a:t>25/10/2024</a:t>
+              <a:t>30/10/2024</a:t>
             </a:fld>
             <a:endParaRPr lang="en-GB"/>
           </a:p>
@@ -3919,7 +3920,7 @@
                   <a:srgbClr val="0070C0"/>
                 </a:solidFill>
               </a:rPr>
-              <a:t>Week 3 (21/10/2024 - 25/10/2024)</a:t>
+              <a:t>Week 4 (28/10/2024 - 01/11/2024)</a:t>
             </a:r>
           </a:p>
           <a:p>
@@ -4277,7 +4278,7 @@
         <p:spPr>
           <a:xfrm>
             <a:off x="446694" y="1537918"/>
-            <a:ext cx="5290010" cy="5509200"/>
+            <a:ext cx="5290010" cy="4508927"/>
           </a:xfrm>
           <a:prstGeom prst="rect">
             <a:avLst/>
@@ -4318,7 +4319,7 @@
                   <a:srgbClr val="385D8A"/>
                 </a:solidFill>
               </a:rPr>
-              <a:t>21/10/2024 – JavaScript Day 1 started , session focused on  		                 variables , functions , scop , etc. And task submission.</a:t>
+              <a:t>28/10/2024 – Final task of JavaScript assigned.</a:t>
             </a:r>
           </a:p>
           <a:p>
@@ -4349,7 +4350,7 @@
                   <a:srgbClr val="385D8A"/>
                 </a:solidFill>
               </a:rPr>
-              <a:t>22/10/2024 – Session focused Array and Object methods , and task submission.</a:t>
+              <a:t>29/10/2024 – Completed and submitted the final task .</a:t>
             </a:r>
           </a:p>
           <a:p>
@@ -4380,7 +4381,15 @@
                   <a:srgbClr val="385D8A"/>
                 </a:solidFill>
               </a:rPr>
-              <a:t>23/10/2024 – Session is about error handling and debugging , Also Task submission.</a:t>
+              <a:t>30/10/2024 – Session is about the correction and </a:t>
+            </a:r>
+            <a:r>
+              <a:rPr lang="en-US" sz="1300">
+                <a:solidFill>
+                  <a:srgbClr val="385D8A"/>
+                </a:solidFill>
+              </a:rPr>
+              <a:t>modifications in</a:t>
             </a:r>
           </a:p>
           <a:p>
@@ -4391,11 +4400,22 @@
               <a:buSzPct val="75000"/>
               <a:defRPr/>
             </a:pPr>
-            <a:endParaRPr lang="en-US" sz="1300" dirty="0">
-              <a:solidFill>
-                <a:srgbClr val="385D8A"/>
-              </a:solidFill>
-            </a:endParaRPr>
+            <a:r>
+              <a:rPr lang="en-US" sz="1300">
+                <a:solidFill>
+                  <a:srgbClr val="385D8A"/>
+                </a:solidFill>
+              </a:rPr>
+              <a:t>the </a:t>
+            </a:r>
+            <a:r>
+              <a:rPr lang="en-US" sz="1300" dirty="0">
+                <a:solidFill>
+                  <a:srgbClr val="385D8A"/>
+                </a:solidFill>
+              </a:rPr>
+              <a:t>submitted task , and updated task submission.</a:t>
+            </a:r>
           </a:p>
           <a:p>
             <a:pPr marL="534987" lvl="2" defTabSz="839694">
@@ -4405,45 +4425,11 @@
               <a:buSzPct val="75000"/>
               <a:defRPr/>
             </a:pPr>
-            <a:r>
-              <a:rPr lang="en-US" sz="1300" dirty="0">
-                <a:solidFill>
-                  <a:srgbClr val="385D8A"/>
-                </a:solidFill>
-              </a:rPr>
-              <a:t>24/10/2024 – Session is about DOM and Task submission.</a:t>
-            </a:r>
-          </a:p>
-          <a:p>
-            <a:pPr marL="534987" lvl="2" defTabSz="839694">
-              <a:buClr>
-                <a:srgbClr val="00B0F0"/>
-              </a:buClr>
-              <a:buSzPct val="75000"/>
-              <a:defRPr/>
-            </a:pPr>
-            <a:endParaRPr lang="en-US" sz="1300" dirty="0">
-              <a:solidFill>
-                <a:srgbClr val="385D8A"/>
-              </a:solidFill>
-            </a:endParaRPr>
-          </a:p>
-          <a:p>
-            <a:pPr marL="534987" lvl="2" defTabSz="839694">
-              <a:buClr>
-                <a:srgbClr val="00B0F0"/>
-              </a:buClr>
-              <a:buSzPct val="75000"/>
-              <a:defRPr/>
-            </a:pPr>
-            <a:r>
-              <a:rPr lang="en-US" sz="1300" dirty="0">
-                <a:solidFill>
-                  <a:srgbClr val="385D8A"/>
-                </a:solidFill>
-              </a:rPr>
-              <a:t>25/10/2024 – Session is about Event handling and Task submission.</a:t>
-            </a:r>
+            <a:endParaRPr lang="en-US" sz="1300" dirty="0">
+              <a:solidFill>
+                <a:srgbClr val="385D8A"/>
+              </a:solidFill>
+            </a:endParaRPr>
           </a:p>
           <a:p>
             <a:pPr marL="534987" lvl="2" defTabSz="839694">
@@ -4660,7 +4646,7 @@
         <p:spPr>
           <a:xfrm>
             <a:off x="6286894" y="1273660"/>
-            <a:ext cx="5290010" cy="1692771"/>
+            <a:ext cx="5290010" cy="1492716"/>
           </a:xfrm>
           <a:prstGeom prst="rect">
             <a:avLst/>
@@ -4701,7 +4687,7 @@
                   <a:srgbClr val="385D8A"/>
                 </a:solidFill>
               </a:rPr>
-              <a:t>21/10/2024 – </a:t>
+              <a:t>28/10/2024 - Madhu </a:t>
             </a:r>
             <a:r>
               <a:rPr lang="en-US" sz="1300" dirty="0" err="1">
@@ -4709,23 +4695,7 @@
                   <a:srgbClr val="385D8A"/>
                 </a:solidFill>
               </a:rPr>
-              <a:t>Dhanya</a:t>
-            </a:r>
-            <a:r>
-              <a:rPr lang="en-US" sz="1300" dirty="0">
-                <a:solidFill>
-                  <a:srgbClr val="385D8A"/>
-                </a:solidFill>
-              </a:rPr>
-              <a:t> </a:t>
-            </a:r>
-            <a:r>
-              <a:rPr lang="en-US" sz="1300" dirty="0" err="1">
-                <a:solidFill>
-                  <a:srgbClr val="385D8A"/>
-                </a:solidFill>
-              </a:rPr>
-              <a:t>Sethu</a:t>
+              <a:t>Pandikkadu</a:t>
             </a:r>
             <a:endParaRPr lang="en-US" sz="1300" dirty="0">
               <a:solidFill>
@@ -4749,7 +4719,23 @@
                   <a:srgbClr val="385D8A"/>
                 </a:solidFill>
               </a:rPr>
-              <a:t>22/10/2024 – Ajay K J</a:t>
+              <a:t>30/10/2024 - Madhu </a:t>
+            </a:r>
+            <a:r>
+              <a:rPr lang="en-US" sz="1300" dirty="0" err="1">
+                <a:solidFill>
+                  <a:srgbClr val="385D8A"/>
+                </a:solidFill>
+              </a:rPr>
+              <a:t>Pandikkadu</a:t>
+            </a:r>
+            <a:r>
+              <a:rPr lang="en-US" sz="1300" dirty="0">
+                <a:solidFill>
+                  <a:srgbClr val="385D8A"/>
+                </a:solidFill>
+              </a:rPr>
+              <a:t> &amp; Ajay K J</a:t>
             </a:r>
           </a:p>
           <a:p>
@@ -4762,14 +4748,11 @@
               <a:buChar char="u"/>
               <a:defRPr/>
             </a:pPr>
-            <a:r>
-              <a:rPr lang="en-US" sz="1300" dirty="0">
-                <a:solidFill>
-                  <a:srgbClr val="385D8A"/>
-                </a:solidFill>
-              </a:rPr>
-              <a:t>23/10/2024 – Ajay K J</a:t>
-            </a:r>
+            <a:endParaRPr lang="en-US" sz="1300" dirty="0">
+              <a:solidFill>
+                <a:srgbClr val="385D8A"/>
+              </a:solidFill>
+            </a:endParaRPr>
           </a:p>
           <a:p>
             <a:pPr marL="723900" lvl="2" indent="-188913" defTabSz="839694">
@@ -4781,54 +4764,6 @@
               <a:buChar char="u"/>
               <a:defRPr/>
             </a:pPr>
-            <a:r>
-              <a:rPr lang="en-US" sz="1300" dirty="0">
-                <a:solidFill>
-                  <a:srgbClr val="385D8A"/>
-                </a:solidFill>
-              </a:rPr>
-              <a:t>24/10/2024 - Madhu </a:t>
-            </a:r>
-            <a:r>
-              <a:rPr lang="en-US" sz="1300" dirty="0" err="1">
-                <a:solidFill>
-                  <a:srgbClr val="385D8A"/>
-                </a:solidFill>
-              </a:rPr>
-              <a:t>Pandikkadu</a:t>
-            </a:r>
-            <a:endParaRPr lang="en-US" sz="1300" dirty="0">
-              <a:solidFill>
-                <a:srgbClr val="385D8A"/>
-              </a:solidFill>
-            </a:endParaRPr>
-          </a:p>
-          <a:p>
-            <a:pPr marL="723900" lvl="2" indent="-188913" defTabSz="839694">
-              <a:buClr>
-                <a:srgbClr val="00B0F0"/>
-              </a:buClr>
-              <a:buSzPct val="75000"/>
-              <a:buFont typeface="Wingdings 3" panose="05040102010807070707" pitchFamily="18" charset="2"/>
-              <a:buChar char="u"/>
-              <a:defRPr/>
-            </a:pPr>
-            <a:r>
-              <a:rPr lang="en-US" sz="1300" dirty="0">
-                <a:solidFill>
-                  <a:srgbClr val="385D8A"/>
-                </a:solidFill>
-              </a:rPr>
-              <a:t>25/10/2024 - Madhu </a:t>
-            </a:r>
-            <a:r>
-              <a:rPr lang="en-US" sz="1300" dirty="0" err="1">
-                <a:solidFill>
-                  <a:srgbClr val="385D8A"/>
-                </a:solidFill>
-              </a:rPr>
-              <a:t>Pandikkadu</a:t>
-            </a:r>
             <a:endParaRPr lang="en-US" sz="1300" dirty="0">
               <a:solidFill>
                 <a:srgbClr val="385D8A"/>
@@ -4885,7 +4820,7 @@
         <p:spPr>
           <a:xfrm>
             <a:off x="6076649" y="3672218"/>
-            <a:ext cx="5480904" cy="3200876"/>
+            <a:ext cx="5480904" cy="1892826"/>
           </a:xfrm>
           <a:prstGeom prst="rect">
             <a:avLst/>
@@ -4921,15 +4856,15 @@
               <a:defRPr/>
             </a:pPr>
             <a:r>
-              <a:rPr lang="en-US" sz="1100" dirty="0">
+              <a:rPr lang="en-US" sz="1300" dirty="0">
                 <a:solidFill>
                   <a:srgbClr val="385D8A"/>
                 </a:solidFill>
                 <a:hlinkClick r:id="rId3"/>
               </a:rPr>
-              <a:t>https://beinexmicrosoft-my.sharepoint.com/:f:/g/personal/dilna_dileep_beinex_com/EpqrAuMGTr5CvcrEcRoj9GkB7QcXzc80P2bPL1ZvzAAEAg?e=BmCYCx</a:t>
-            </a:r>
-            <a:endParaRPr lang="en-US" sz="1100" dirty="0">
+              <a:t>https://beinexmicrosoft-my.sharepoint.com/:u:/g/personal/dilna_dileep_beinex_com/EcQMjYcWxOlCgZte8cMaEN0Bfp6vSWbdG0nYGe0IMhREGQ?e=hHCmbo</a:t>
+            </a:r>
+            <a:endParaRPr lang="en-US" sz="1300" dirty="0">
               <a:solidFill>
                 <a:srgbClr val="385D8A"/>
               </a:solidFill>
@@ -4946,15 +4881,15 @@
               <a:defRPr/>
             </a:pPr>
             <a:r>
-              <a:rPr lang="en-US" sz="1100" dirty="0">
+              <a:rPr lang="en-US" sz="1300" dirty="0">
                 <a:solidFill>
                   <a:srgbClr val="385D8A"/>
                 </a:solidFill>
                 <a:hlinkClick r:id="rId4"/>
               </a:rPr>
-              <a:t>https://beinexmicrosoft-my.sharepoint.com/:f:/g/personal/dilna_dileep_beinex_com/Ep0OrBrDQ0ZKuut92vMCcDgBr0-CdmQPKsDT_Xn3kgX8jg?e=2Gdtlz</a:t>
-            </a:r>
-            <a:endParaRPr lang="en-US" sz="1100" dirty="0">
+              <a:t>https://beinexmicrosoft-my.sharepoint.com/:f:/g/personal/dilna_dileep_beinex_com/EjW45S8sYVFBiVIHgWSE4h0BH33VmBc5NG_cluq5cWSF8g?e=F8UjtT</a:t>
+            </a:r>
+            <a:endParaRPr lang="en-US" sz="1300" dirty="0">
               <a:solidFill>
                 <a:srgbClr val="385D8A"/>
               </a:solidFill>
@@ -4970,82 +4905,7 @@
               <a:buChar char="u"/>
               <a:defRPr/>
             </a:pPr>
-            <a:r>
-              <a:rPr lang="en-US" sz="1100" dirty="0">
-                <a:solidFill>
-                  <a:srgbClr val="385D8A"/>
-                </a:solidFill>
-                <a:hlinkClick r:id="rId5"/>
-              </a:rPr>
-              <a:t>https://beinexmicrosoft-my.sharepoint.com/:f:/g/personal/dilna_dileep_beinex_com/Eosxe-kRRR5FkUrdpaP2oH0Bq8xI7FiiyiqzGYtYo5ajeg?e=1p2aTJ</a:t>
-            </a:r>
-            <a:endParaRPr lang="en-US" sz="1100" dirty="0">
-              <a:solidFill>
-                <a:srgbClr val="385D8A"/>
-              </a:solidFill>
-            </a:endParaRPr>
-          </a:p>
-          <a:p>
-            <a:pPr marL="723900" lvl="2" indent="-188913" defTabSz="839694">
-              <a:buClr>
-                <a:srgbClr val="00B0F0"/>
-              </a:buClr>
-              <a:buSzPct val="75000"/>
-              <a:buFont typeface="Wingdings 3" panose="05040102010807070707" pitchFamily="18" charset="2"/>
-              <a:buChar char="u"/>
-              <a:defRPr/>
-            </a:pPr>
-            <a:r>
-              <a:rPr lang="en-US" sz="1100" dirty="0">
-                <a:solidFill>
-                  <a:srgbClr val="385D8A"/>
-                </a:solidFill>
-                <a:hlinkClick r:id="rId6"/>
-              </a:rPr>
-              <a:t>https://beinexmicrosoft-my.sharepoint.com/:f:/g/personal/dilna_dileep_beinex_com/EvLPe2oDjQpBr9Ens_t7LHAB_sleWrBE_c6KK3-9EWMuOQ?e=bka3Nm</a:t>
-            </a:r>
-            <a:endParaRPr lang="en-US" sz="1100" dirty="0">
-              <a:solidFill>
-                <a:srgbClr val="385D8A"/>
-              </a:solidFill>
-            </a:endParaRPr>
-          </a:p>
-          <a:p>
-            <a:pPr marL="723900" lvl="2" indent="-188913" defTabSz="839694">
-              <a:buClr>
-                <a:srgbClr val="00B0F0"/>
-              </a:buClr>
-              <a:buSzPct val="75000"/>
-              <a:buFont typeface="Wingdings 3" panose="05040102010807070707" pitchFamily="18" charset="2"/>
-              <a:buChar char="u"/>
-              <a:defRPr/>
-            </a:pPr>
-            <a:r>
-              <a:rPr lang="en-US" sz="1100" dirty="0">
-                <a:solidFill>
-                  <a:srgbClr val="385D8A"/>
-                </a:solidFill>
-                <a:hlinkClick r:id="rId7"/>
-              </a:rPr>
-              <a:t>https://beinexmicrosoft-my.sharepoint.com/:f:/g/personal/dilna_dileep_beinex_com/EpZJJHoAIrROtBbwoh6CoA4B6TUVM86eqPISJcoVxkqKAQ?e=DbS70r</a:t>
-            </a:r>
-            <a:endParaRPr lang="en-US" sz="1100" dirty="0">
-              <a:solidFill>
-                <a:srgbClr val="385D8A"/>
-              </a:solidFill>
-            </a:endParaRPr>
-          </a:p>
-          <a:p>
-            <a:pPr marL="723900" lvl="2" indent="-188913" defTabSz="839694">
-              <a:buClr>
-                <a:srgbClr val="00B0F0"/>
-              </a:buClr>
-              <a:buSzPct val="75000"/>
-              <a:buFont typeface="Wingdings 3" panose="05040102010807070707" pitchFamily="18" charset="2"/>
-              <a:buChar char="u"/>
-              <a:defRPr/>
-            </a:pPr>
-            <a:endParaRPr lang="en-US" sz="1100" dirty="0">
+            <a:endParaRPr lang="en-US" sz="1300" dirty="0">
               <a:solidFill>
                 <a:srgbClr val="385D8A"/>
               </a:solidFill>
@@ -5381,7 +5241,13 @@
   <p:cSld>
     <p:spTree>
       <p:nvGrpSpPr>
-        <p:cNvPr id="1" name=""/>
+        <p:cNvPr id="1" name="">
+          <a:extLst>
+            <a:ext uri="{FF2B5EF4-FFF2-40B4-BE49-F238E27FC236}">
+              <a16:creationId xmlns:a16="http://schemas.microsoft.com/office/drawing/2014/main" id="{B8042BD5-A187-BCA5-F7BB-B386A1D012F7}"/>
+            </a:ext>
+          </a:extLst>
+        </p:cNvPr>
         <p:cNvGrpSpPr/>
         <p:nvPr/>
       </p:nvGrpSpPr>
@@ -5398,7 +5264,7 @@
           <p:cNvPr id="33" name="Rectangle 32">
             <a:extLst>
               <a:ext uri="{FF2B5EF4-FFF2-40B4-BE49-F238E27FC236}">
-                <a16:creationId xmlns:a16="http://schemas.microsoft.com/office/drawing/2014/main" id="{C68FF623-D71A-4998-A0DD-5D9D1ECA5392}"/>
+                <a16:creationId xmlns:a16="http://schemas.microsoft.com/office/drawing/2014/main" id="{C7EC8853-607B-7BDD-301B-CB7875F6176D}"/>
               </a:ext>
             </a:extLst>
           </p:cNvPr>
@@ -5450,7 +5316,7 @@
           <p:cNvPr id="34" name="Rectangle 33">
             <a:extLst>
               <a:ext uri="{FF2B5EF4-FFF2-40B4-BE49-F238E27FC236}">
-                <a16:creationId xmlns:a16="http://schemas.microsoft.com/office/drawing/2014/main" id="{FA5D2B1F-E64F-41DE-924D-BA542C34ED06}"/>
+                <a16:creationId xmlns:a16="http://schemas.microsoft.com/office/drawing/2014/main" id="{355B5F52-545F-A391-38FA-B2EDB9BCD106}"/>
               </a:ext>
             </a:extLst>
           </p:cNvPr>
@@ -5502,7 +5368,7 @@
           <p:cNvPr id="35" name="TextBox 34">
             <a:extLst>
               <a:ext uri="{FF2B5EF4-FFF2-40B4-BE49-F238E27FC236}">
-                <a16:creationId xmlns:a16="http://schemas.microsoft.com/office/drawing/2014/main" id="{0D30C5B4-C1E9-4B87-9CE1-D2BCD6B05072}"/>
+                <a16:creationId xmlns:a16="http://schemas.microsoft.com/office/drawing/2014/main" id="{5C866996-36BD-4A53-1F60-826D753F55F3}"/>
               </a:ext>
             </a:extLst>
           </p:cNvPr>
@@ -5539,23 +5405,7 @@
                   <a:srgbClr val="0070C0"/>
                 </a:solidFill>
               </a:rPr>
-              <a:t>Week 2 </a:t>
-            </a:r>
-            <a:r>
-              <a:rPr lang="en-US" sz="2600" b="1">
-                <a:solidFill>
-                  <a:srgbClr val="0070C0"/>
-                </a:solidFill>
-              </a:rPr>
-              <a:t>(14/10/2024-18/10/2024</a:t>
-            </a:r>
-            <a:r>
-              <a:rPr lang="en-US" sz="2600" b="1" dirty="0">
-                <a:solidFill>
-                  <a:srgbClr val="0070C0"/>
-                </a:solidFill>
-              </a:rPr>
-              <a:t>)</a:t>
+              <a:t>Week 3 (21/10/2024 - 25/10/2024)</a:t>
             </a:r>
           </a:p>
           <a:p>
@@ -5572,7 +5422,7 @@
           <p:cNvPr id="36" name="Picture 35" descr="A picture containing clipart&#10;&#10;Description generated with very high confidence">
             <a:extLst>
               <a:ext uri="{FF2B5EF4-FFF2-40B4-BE49-F238E27FC236}">
-                <a16:creationId xmlns:a16="http://schemas.microsoft.com/office/drawing/2014/main" id="{53078F35-D806-4F0F-98B6-75FEDA3F69BA}"/>
+                <a16:creationId xmlns:a16="http://schemas.microsoft.com/office/drawing/2014/main" id="{3C76CB36-49AA-99A2-FC8A-1D0CB8488EDF}"/>
               </a:ext>
             </a:extLst>
           </p:cNvPr>
@@ -5608,7 +5458,7 @@
           <p:cNvPr id="2" name="Rectangle 1">
             <a:extLst>
               <a:ext uri="{FF2B5EF4-FFF2-40B4-BE49-F238E27FC236}">
-                <a16:creationId xmlns:a16="http://schemas.microsoft.com/office/drawing/2014/main" id="{E9981416-A2BD-4F6F-A16A-599D44127AF2}"/>
+                <a16:creationId xmlns:a16="http://schemas.microsoft.com/office/drawing/2014/main" id="{1D1850F5-5074-9BD3-8DFD-4F6BC1BDFD7D}"/>
               </a:ext>
             </a:extLst>
           </p:cNvPr>
@@ -5658,7 +5508,7 @@
           <p:cNvPr id="7" name="Rectangle 6">
             <a:extLst>
               <a:ext uri="{FF2B5EF4-FFF2-40B4-BE49-F238E27FC236}">
-                <a16:creationId xmlns:a16="http://schemas.microsoft.com/office/drawing/2014/main" id="{CF883A6F-EBA0-4DB7-B4B3-DACE4E381459}"/>
+                <a16:creationId xmlns:a16="http://schemas.microsoft.com/office/drawing/2014/main" id="{D8353889-8CD6-92FD-6E13-FB7E6351BE45}"/>
               </a:ext>
             </a:extLst>
           </p:cNvPr>
@@ -5708,7 +5558,7 @@
           <p:cNvPr id="8" name="Rectangle 7">
             <a:extLst>
               <a:ext uri="{FF2B5EF4-FFF2-40B4-BE49-F238E27FC236}">
-                <a16:creationId xmlns:a16="http://schemas.microsoft.com/office/drawing/2014/main" id="{4EDEB4CC-B0DE-4A69-BBA1-6BA60FBCB711}"/>
+                <a16:creationId xmlns:a16="http://schemas.microsoft.com/office/drawing/2014/main" id="{FDEF7D57-5232-4364-E40C-FC032705EC12}"/>
               </a:ext>
             </a:extLst>
           </p:cNvPr>
@@ -5758,7 +5608,7 @@
           <p:cNvPr id="9" name="Rectangle 8">
             <a:extLst>
               <a:ext uri="{FF2B5EF4-FFF2-40B4-BE49-F238E27FC236}">
-                <a16:creationId xmlns:a16="http://schemas.microsoft.com/office/drawing/2014/main" id="{82C2B6F0-1ED9-4562-8A8A-86A6C3F98988}"/>
+                <a16:creationId xmlns:a16="http://schemas.microsoft.com/office/drawing/2014/main" id="{7574E446-9363-A185-ED4E-DEF0AD8199B1}"/>
               </a:ext>
             </a:extLst>
           </p:cNvPr>
@@ -5807,7 +5657,7 @@
           <p:cNvPr id="10" name="Rectangle 9">
             <a:extLst>
               <a:ext uri="{FF2B5EF4-FFF2-40B4-BE49-F238E27FC236}">
-                <a16:creationId xmlns:a16="http://schemas.microsoft.com/office/drawing/2014/main" id="{19636823-7CA3-4F5D-9733-1F7B42839EA5}"/>
+                <a16:creationId xmlns:a16="http://schemas.microsoft.com/office/drawing/2014/main" id="{BB544520-D638-3933-9F8C-F98B593ED672}"/>
               </a:ext>
             </a:extLst>
           </p:cNvPr>
@@ -5855,7 +5705,7 @@
           <p:cNvPr id="12" name="Rectangle 11">
             <a:extLst>
               <a:ext uri="{FF2B5EF4-FFF2-40B4-BE49-F238E27FC236}">
-                <a16:creationId xmlns:a16="http://schemas.microsoft.com/office/drawing/2014/main" id="{333E5A2A-590A-4984-9C55-7C06CBC9C147}"/>
+                <a16:creationId xmlns:a16="http://schemas.microsoft.com/office/drawing/2014/main" id="{928EF2D4-6E59-11A6-A3CF-5D42879B3498}"/>
               </a:ext>
             </a:extLst>
           </p:cNvPr>
@@ -5903,7 +5753,7 @@
           <p:cNvPr id="3" name="Rectangle 2">
             <a:extLst>
               <a:ext uri="{FF2B5EF4-FFF2-40B4-BE49-F238E27FC236}">
-                <a16:creationId xmlns:a16="http://schemas.microsoft.com/office/drawing/2014/main" id="{21846364-732E-45D1-AC92-93BF1D1A4DDF}"/>
+                <a16:creationId xmlns:a16="http://schemas.microsoft.com/office/drawing/2014/main" id="{82BCACB3-8D58-DB12-A3BE-538A876652C8}"/>
               </a:ext>
             </a:extLst>
           </p:cNvPr>
@@ -5913,7 +5763,7 @@
         <p:spPr>
           <a:xfrm>
             <a:off x="446694" y="1537918"/>
-            <a:ext cx="5290010" cy="3908762"/>
+            <a:ext cx="5290010" cy="5509200"/>
           </a:xfrm>
           <a:prstGeom prst="rect">
             <a:avLst/>
@@ -5954,6 +5804,1348 @@
                   <a:srgbClr val="385D8A"/>
                 </a:solidFill>
               </a:rPr>
+              <a:t>21/10/2024 – JavaScript Day 1 started , session focused on  		                 variables , functions , scop , etc. And task submission.</a:t>
+            </a:r>
+          </a:p>
+          <a:p>
+            <a:pPr marL="534987" lvl="2" defTabSz="839694">
+              <a:buClr>
+                <a:srgbClr val="00B0F0"/>
+              </a:buClr>
+              <a:buSzPct val="75000"/>
+              <a:defRPr/>
+            </a:pPr>
+            <a:endParaRPr lang="en-US" sz="1300" dirty="0">
+              <a:solidFill>
+                <a:srgbClr val="385D8A"/>
+              </a:solidFill>
+            </a:endParaRPr>
+          </a:p>
+          <a:p>
+            <a:pPr marL="534987" lvl="2" defTabSz="839694">
+              <a:buClr>
+                <a:srgbClr val="00B0F0"/>
+              </a:buClr>
+              <a:buSzPct val="75000"/>
+              <a:defRPr/>
+            </a:pPr>
+            <a:r>
+              <a:rPr lang="en-US" sz="1300" dirty="0">
+                <a:solidFill>
+                  <a:srgbClr val="385D8A"/>
+                </a:solidFill>
+              </a:rPr>
+              <a:t>22/10/2024 – Session focused Array and Object methods , and task submission.</a:t>
+            </a:r>
+          </a:p>
+          <a:p>
+            <a:pPr marL="534987" lvl="2" defTabSz="839694">
+              <a:buClr>
+                <a:srgbClr val="00B0F0"/>
+              </a:buClr>
+              <a:buSzPct val="75000"/>
+              <a:defRPr/>
+            </a:pPr>
+            <a:endParaRPr lang="en-US" sz="1300" dirty="0">
+              <a:solidFill>
+                <a:srgbClr val="385D8A"/>
+              </a:solidFill>
+            </a:endParaRPr>
+          </a:p>
+          <a:p>
+            <a:pPr marL="534987" lvl="2" defTabSz="839694">
+              <a:buClr>
+                <a:srgbClr val="00B0F0"/>
+              </a:buClr>
+              <a:buSzPct val="75000"/>
+              <a:defRPr/>
+            </a:pPr>
+            <a:r>
+              <a:rPr lang="en-US" sz="1300" dirty="0">
+                <a:solidFill>
+                  <a:srgbClr val="385D8A"/>
+                </a:solidFill>
+              </a:rPr>
+              <a:t>23/10/2024 – Session is about error handling and debugging , Also Task submission.</a:t>
+            </a:r>
+          </a:p>
+          <a:p>
+            <a:pPr marL="534987" lvl="2" defTabSz="839694">
+              <a:buClr>
+                <a:srgbClr val="00B0F0"/>
+              </a:buClr>
+              <a:buSzPct val="75000"/>
+              <a:defRPr/>
+            </a:pPr>
+            <a:endParaRPr lang="en-US" sz="1300" dirty="0">
+              <a:solidFill>
+                <a:srgbClr val="385D8A"/>
+              </a:solidFill>
+            </a:endParaRPr>
+          </a:p>
+          <a:p>
+            <a:pPr marL="534987" lvl="2" defTabSz="839694">
+              <a:buClr>
+                <a:srgbClr val="00B0F0"/>
+              </a:buClr>
+              <a:buSzPct val="75000"/>
+              <a:defRPr/>
+            </a:pPr>
+            <a:r>
+              <a:rPr lang="en-US" sz="1300" dirty="0">
+                <a:solidFill>
+                  <a:srgbClr val="385D8A"/>
+                </a:solidFill>
+              </a:rPr>
+              <a:t>24/10/2024 – Session is about DOM and Task submission.</a:t>
+            </a:r>
+          </a:p>
+          <a:p>
+            <a:pPr marL="534987" lvl="2" defTabSz="839694">
+              <a:buClr>
+                <a:srgbClr val="00B0F0"/>
+              </a:buClr>
+              <a:buSzPct val="75000"/>
+              <a:defRPr/>
+            </a:pPr>
+            <a:endParaRPr lang="en-US" sz="1300" dirty="0">
+              <a:solidFill>
+                <a:srgbClr val="385D8A"/>
+              </a:solidFill>
+            </a:endParaRPr>
+          </a:p>
+          <a:p>
+            <a:pPr marL="534987" lvl="2" defTabSz="839694">
+              <a:buClr>
+                <a:srgbClr val="00B0F0"/>
+              </a:buClr>
+              <a:buSzPct val="75000"/>
+              <a:defRPr/>
+            </a:pPr>
+            <a:r>
+              <a:rPr lang="en-US" sz="1300" dirty="0">
+                <a:solidFill>
+                  <a:srgbClr val="385D8A"/>
+                </a:solidFill>
+              </a:rPr>
+              <a:t>25/10/2024 – Session is about Event handling and Task submission.</a:t>
+            </a:r>
+          </a:p>
+          <a:p>
+            <a:pPr marL="534987" lvl="2" defTabSz="839694">
+              <a:buClr>
+                <a:srgbClr val="00B0F0"/>
+              </a:buClr>
+              <a:buSzPct val="75000"/>
+              <a:defRPr/>
+            </a:pPr>
+            <a:endParaRPr lang="en-US" sz="1300" dirty="0">
+              <a:solidFill>
+                <a:srgbClr val="385D8A"/>
+              </a:solidFill>
+            </a:endParaRPr>
+          </a:p>
+          <a:p>
+            <a:pPr marL="534987" lvl="2" defTabSz="839694">
+              <a:buClr>
+                <a:srgbClr val="00B0F0"/>
+              </a:buClr>
+              <a:buSzPct val="75000"/>
+              <a:defRPr/>
+            </a:pPr>
+            <a:endParaRPr lang="en-US" sz="1300" dirty="0">
+              <a:solidFill>
+                <a:srgbClr val="385D8A"/>
+              </a:solidFill>
+            </a:endParaRPr>
+          </a:p>
+          <a:p>
+            <a:pPr marL="534987" lvl="2" defTabSz="839694">
+              <a:buClr>
+                <a:srgbClr val="00B0F0"/>
+              </a:buClr>
+              <a:buSzPct val="75000"/>
+              <a:defRPr/>
+            </a:pPr>
+            <a:endParaRPr lang="en-US" sz="1300" dirty="0">
+              <a:solidFill>
+                <a:srgbClr val="385D8A"/>
+              </a:solidFill>
+            </a:endParaRPr>
+          </a:p>
+          <a:p>
+            <a:pPr marL="534987" lvl="2" defTabSz="839694">
+              <a:buClr>
+                <a:srgbClr val="00B0F0"/>
+              </a:buClr>
+              <a:buSzPct val="75000"/>
+              <a:defRPr/>
+            </a:pPr>
+            <a:endParaRPr lang="en-US" sz="1300" dirty="0">
+              <a:solidFill>
+                <a:srgbClr val="385D8A"/>
+              </a:solidFill>
+            </a:endParaRPr>
+          </a:p>
+          <a:p>
+            <a:pPr marL="534987" lvl="2" defTabSz="839694">
+              <a:buClr>
+                <a:srgbClr val="00B0F0"/>
+              </a:buClr>
+              <a:buSzPct val="75000"/>
+              <a:defRPr/>
+            </a:pPr>
+            <a:endParaRPr lang="en-US" sz="1300" dirty="0">
+              <a:solidFill>
+                <a:srgbClr val="385D8A"/>
+              </a:solidFill>
+            </a:endParaRPr>
+          </a:p>
+          <a:p>
+            <a:pPr marL="534987" lvl="2" defTabSz="839694">
+              <a:buClr>
+                <a:srgbClr val="00B0F0"/>
+              </a:buClr>
+              <a:buSzPct val="75000"/>
+              <a:defRPr/>
+            </a:pPr>
+            <a:endParaRPr lang="en-US" sz="1300" dirty="0">
+              <a:solidFill>
+                <a:srgbClr val="385D8A"/>
+              </a:solidFill>
+            </a:endParaRPr>
+          </a:p>
+          <a:p>
+            <a:pPr marL="534987" lvl="2" defTabSz="839694">
+              <a:buClr>
+                <a:srgbClr val="00B0F0"/>
+              </a:buClr>
+              <a:buSzPct val="75000"/>
+              <a:defRPr/>
+            </a:pPr>
+            <a:endParaRPr lang="en-US" sz="1300" dirty="0">
+              <a:solidFill>
+                <a:srgbClr val="385D8A"/>
+              </a:solidFill>
+            </a:endParaRPr>
+          </a:p>
+          <a:p>
+            <a:pPr marL="534987" lvl="2" defTabSz="839694">
+              <a:buClr>
+                <a:srgbClr val="00B0F0"/>
+              </a:buClr>
+              <a:buSzPct val="75000"/>
+              <a:defRPr/>
+            </a:pPr>
+            <a:endParaRPr lang="en-US" sz="1300" dirty="0">
+              <a:solidFill>
+                <a:srgbClr val="385D8A"/>
+              </a:solidFill>
+            </a:endParaRPr>
+          </a:p>
+          <a:p>
+            <a:pPr marL="534987" lvl="2" defTabSz="839694">
+              <a:buClr>
+                <a:srgbClr val="00B0F0"/>
+              </a:buClr>
+              <a:buSzPct val="75000"/>
+              <a:defRPr/>
+            </a:pPr>
+            <a:endParaRPr lang="en-US" sz="1300" dirty="0">
+              <a:solidFill>
+                <a:srgbClr val="385D8A"/>
+              </a:solidFill>
+            </a:endParaRPr>
+          </a:p>
+          <a:p>
+            <a:pPr marL="534987" lvl="2" defTabSz="839694">
+              <a:buClr>
+                <a:srgbClr val="00B0F0"/>
+              </a:buClr>
+              <a:buSzPct val="75000"/>
+              <a:defRPr/>
+            </a:pPr>
+            <a:endParaRPr lang="en-US" sz="1300" dirty="0">
+              <a:solidFill>
+                <a:srgbClr val="385D8A"/>
+              </a:solidFill>
+            </a:endParaRPr>
+          </a:p>
+          <a:p>
+            <a:pPr marL="534987" lvl="2" defTabSz="839694">
+              <a:buClr>
+                <a:srgbClr val="00B0F0"/>
+              </a:buClr>
+              <a:buSzPct val="75000"/>
+              <a:defRPr/>
+            </a:pPr>
+            <a:endParaRPr lang="en-US" sz="1300" dirty="0">
+              <a:solidFill>
+                <a:srgbClr val="385D8A"/>
+              </a:solidFill>
+            </a:endParaRPr>
+          </a:p>
+          <a:p>
+            <a:pPr marL="534987" lvl="2" defTabSz="839694">
+              <a:buClr>
+                <a:srgbClr val="00B0F0"/>
+              </a:buClr>
+              <a:buSzPct val="75000"/>
+              <a:defRPr/>
+            </a:pPr>
+            <a:endParaRPr lang="en-US" sz="1300" dirty="0">
+              <a:solidFill>
+                <a:srgbClr val="385D8A"/>
+              </a:solidFill>
+            </a:endParaRPr>
+          </a:p>
+          <a:p>
+            <a:pPr marL="534987" lvl="2" defTabSz="839694">
+              <a:buClr>
+                <a:srgbClr val="00B0F0"/>
+              </a:buClr>
+              <a:buSzPct val="75000"/>
+              <a:defRPr/>
+            </a:pPr>
+            <a:endParaRPr lang="en-US" sz="1300" dirty="0">
+              <a:solidFill>
+                <a:srgbClr val="385D8A"/>
+              </a:solidFill>
+            </a:endParaRPr>
+          </a:p>
+          <a:p>
+            <a:pPr marL="266700" lvl="1" indent="-188913" defTabSz="839694">
+              <a:buClr>
+                <a:srgbClr val="00B0F0"/>
+              </a:buClr>
+              <a:buSzPct val="75000"/>
+              <a:buFont typeface="Wingdings 3" panose="05040102010807070707" pitchFamily="18" charset="2"/>
+              <a:buChar char="u"/>
+              <a:defRPr/>
+            </a:pPr>
+            <a:endParaRPr lang="en-US" sz="1300" dirty="0">
+              <a:solidFill>
+                <a:srgbClr val="385D8A"/>
+              </a:solidFill>
+            </a:endParaRPr>
+          </a:p>
+        </p:txBody>
+      </p:sp>
+      <p:sp>
+        <p:nvSpPr>
+          <p:cNvPr id="14" name="Rectangle 13">
+            <a:extLst>
+              <a:ext uri="{FF2B5EF4-FFF2-40B4-BE49-F238E27FC236}">
+                <a16:creationId xmlns:a16="http://schemas.microsoft.com/office/drawing/2014/main" id="{A271BEAF-6E80-B875-821C-CB4FF884A759}"/>
+              </a:ext>
+            </a:extLst>
+          </p:cNvPr>
+          <p:cNvSpPr/>
+          <p:nvPr/>
+        </p:nvSpPr>
+        <p:spPr>
+          <a:xfrm>
+            <a:off x="6286894" y="1273660"/>
+            <a:ext cx="5290010" cy="1692771"/>
+          </a:xfrm>
+          <a:prstGeom prst="rect">
+            <a:avLst/>
+          </a:prstGeom>
+        </p:spPr>
+        <p:txBody>
+          <a:bodyPr wrap="square">
+            <a:spAutoFit/>
+          </a:bodyPr>
+          <a:lstStyle/>
+          <a:p>
+            <a:pPr marL="534987" lvl="2" defTabSz="839694">
+              <a:buClr>
+                <a:srgbClr val="00B0F0"/>
+              </a:buClr>
+              <a:buSzPct val="75000"/>
+              <a:defRPr/>
+            </a:pPr>
+            <a:endParaRPr lang="en-US" sz="1300" dirty="0">
+              <a:solidFill>
+                <a:srgbClr val="385D8A"/>
+              </a:solidFill>
+            </a:endParaRPr>
+          </a:p>
+          <a:p>
+            <a:pPr marL="723900" lvl="2" indent="-188913" defTabSz="839694">
+              <a:buClr>
+                <a:srgbClr val="00B0F0"/>
+              </a:buClr>
+              <a:buSzPct val="75000"/>
+              <a:buFont typeface="Wingdings 3" panose="05040102010807070707" pitchFamily="18" charset="2"/>
+              <a:buChar char="u"/>
+              <a:defRPr/>
+            </a:pPr>
+            <a:r>
+              <a:rPr lang="en-US" sz="1300" dirty="0">
+                <a:solidFill>
+                  <a:srgbClr val="385D8A"/>
+                </a:solidFill>
+              </a:rPr>
+              <a:t>21/10/2024 – </a:t>
+            </a:r>
+            <a:r>
+              <a:rPr lang="en-US" sz="1300" dirty="0" err="1">
+                <a:solidFill>
+                  <a:srgbClr val="385D8A"/>
+                </a:solidFill>
+              </a:rPr>
+              <a:t>Dhanya</a:t>
+            </a:r>
+            <a:r>
+              <a:rPr lang="en-US" sz="1300" dirty="0">
+                <a:solidFill>
+                  <a:srgbClr val="385D8A"/>
+                </a:solidFill>
+              </a:rPr>
+              <a:t> </a:t>
+            </a:r>
+            <a:r>
+              <a:rPr lang="en-US" sz="1300" dirty="0" err="1">
+                <a:solidFill>
+                  <a:srgbClr val="385D8A"/>
+                </a:solidFill>
+              </a:rPr>
+              <a:t>Sethu</a:t>
+            </a:r>
+            <a:endParaRPr lang="en-US" sz="1300" dirty="0">
+              <a:solidFill>
+                <a:srgbClr val="385D8A"/>
+              </a:solidFill>
+            </a:endParaRPr>
+          </a:p>
+          <a:p>
+            <a:pPr marL="723900" lvl="2" indent="-188913" defTabSz="839694">
+              <a:buClr>
+                <a:srgbClr val="00B0F0"/>
+              </a:buClr>
+              <a:buSzPct val="75000"/>
+              <a:buFont typeface="Wingdings 3" panose="05040102010807070707" pitchFamily="18" charset="2"/>
+              <a:buChar char="u"/>
+              <a:defRPr/>
+            </a:pPr>
+            <a:r>
+              <a:rPr lang="en-US" sz="1300" dirty="0">
+                <a:solidFill>
+                  <a:srgbClr val="385D8A"/>
+                </a:solidFill>
+              </a:rPr>
+              <a:t>22/10/2024 – Ajay K J</a:t>
+            </a:r>
+          </a:p>
+          <a:p>
+            <a:pPr marL="723900" lvl="2" indent="-188913" defTabSz="839694">
+              <a:buClr>
+                <a:srgbClr val="00B0F0"/>
+              </a:buClr>
+              <a:buSzPct val="75000"/>
+              <a:buFont typeface="Wingdings 3" panose="05040102010807070707" pitchFamily="18" charset="2"/>
+              <a:buChar char="u"/>
+              <a:defRPr/>
+            </a:pPr>
+            <a:r>
+              <a:rPr lang="en-US" sz="1300" dirty="0">
+                <a:solidFill>
+                  <a:srgbClr val="385D8A"/>
+                </a:solidFill>
+              </a:rPr>
+              <a:t>23/10/2024 – Ajay K J</a:t>
+            </a:r>
+          </a:p>
+          <a:p>
+            <a:pPr marL="723900" lvl="2" indent="-188913" defTabSz="839694">
+              <a:buClr>
+                <a:srgbClr val="00B0F0"/>
+              </a:buClr>
+              <a:buSzPct val="75000"/>
+              <a:buFont typeface="Wingdings 3" panose="05040102010807070707" pitchFamily="18" charset="2"/>
+              <a:buChar char="u"/>
+              <a:defRPr/>
+            </a:pPr>
+            <a:r>
+              <a:rPr lang="en-US" sz="1300" dirty="0">
+                <a:solidFill>
+                  <a:srgbClr val="385D8A"/>
+                </a:solidFill>
+              </a:rPr>
+              <a:t>24/10/2024 - Madhu </a:t>
+            </a:r>
+            <a:r>
+              <a:rPr lang="en-US" sz="1300" dirty="0" err="1">
+                <a:solidFill>
+                  <a:srgbClr val="385D8A"/>
+                </a:solidFill>
+              </a:rPr>
+              <a:t>Pandikkadu</a:t>
+            </a:r>
+            <a:endParaRPr lang="en-US" sz="1300" dirty="0">
+              <a:solidFill>
+                <a:srgbClr val="385D8A"/>
+              </a:solidFill>
+            </a:endParaRPr>
+          </a:p>
+          <a:p>
+            <a:pPr marL="723900" lvl="2" indent="-188913" defTabSz="839694">
+              <a:buClr>
+                <a:srgbClr val="00B0F0"/>
+              </a:buClr>
+              <a:buSzPct val="75000"/>
+              <a:buFont typeface="Wingdings 3" panose="05040102010807070707" pitchFamily="18" charset="2"/>
+              <a:buChar char="u"/>
+              <a:defRPr/>
+            </a:pPr>
+            <a:r>
+              <a:rPr lang="en-US" sz="1300" dirty="0">
+                <a:solidFill>
+                  <a:srgbClr val="385D8A"/>
+                </a:solidFill>
+              </a:rPr>
+              <a:t>25/10/2024 - Madhu </a:t>
+            </a:r>
+            <a:r>
+              <a:rPr lang="en-US" sz="1300" dirty="0" err="1">
+                <a:solidFill>
+                  <a:srgbClr val="385D8A"/>
+                </a:solidFill>
+              </a:rPr>
+              <a:t>Pandikkadu</a:t>
+            </a:r>
+            <a:endParaRPr lang="en-US" sz="1300" dirty="0">
+              <a:solidFill>
+                <a:srgbClr val="385D8A"/>
+              </a:solidFill>
+            </a:endParaRPr>
+          </a:p>
+          <a:p>
+            <a:pPr marL="723900" lvl="2" indent="-188913" defTabSz="839694">
+              <a:buClr>
+                <a:srgbClr val="00B0F0"/>
+              </a:buClr>
+              <a:buSzPct val="75000"/>
+              <a:buFont typeface="Wingdings 3" panose="05040102010807070707" pitchFamily="18" charset="2"/>
+              <a:buChar char="u"/>
+              <a:defRPr/>
+            </a:pPr>
+            <a:endParaRPr lang="en-US" sz="1300" dirty="0">
+              <a:solidFill>
+                <a:srgbClr val="385D8A"/>
+              </a:solidFill>
+            </a:endParaRPr>
+          </a:p>
+          <a:p>
+            <a:pPr marL="77787" lvl="1" defTabSz="839694">
+              <a:spcBef>
+                <a:spcPts val="0"/>
+              </a:spcBef>
+              <a:buClr>
+                <a:srgbClr val="00B0F0"/>
+              </a:buClr>
+              <a:buSzPct val="75000"/>
+              <a:defRPr/>
+            </a:pPr>
+            <a:endParaRPr lang="en-US" sz="1300" dirty="0">
+              <a:solidFill>
+                <a:srgbClr val="385D8A"/>
+              </a:solidFill>
+            </a:endParaRPr>
+          </a:p>
+        </p:txBody>
+      </p:sp>
+      <p:sp>
+        <p:nvSpPr>
+          <p:cNvPr id="13" name="Rectangle 12">
+            <a:extLst>
+              <a:ext uri="{FF2B5EF4-FFF2-40B4-BE49-F238E27FC236}">
+                <a16:creationId xmlns:a16="http://schemas.microsoft.com/office/drawing/2014/main" id="{B0244096-1A82-1000-1901-2EC149673E14}"/>
+              </a:ext>
+            </a:extLst>
+          </p:cNvPr>
+          <p:cNvSpPr/>
+          <p:nvPr/>
+        </p:nvSpPr>
+        <p:spPr>
+          <a:xfrm>
+            <a:off x="6076649" y="3672218"/>
+            <a:ext cx="5480904" cy="3200876"/>
+          </a:xfrm>
+          <a:prstGeom prst="rect">
+            <a:avLst/>
+          </a:prstGeom>
+        </p:spPr>
+        <p:txBody>
+          <a:bodyPr wrap="square">
+            <a:spAutoFit/>
+          </a:bodyPr>
+          <a:lstStyle/>
+          <a:p>
+            <a:pPr marL="534987" lvl="2" defTabSz="839694">
+              <a:buClr>
+                <a:srgbClr val="00B0F0"/>
+              </a:buClr>
+              <a:buSzPct val="75000"/>
+              <a:defRPr/>
+            </a:pPr>
+            <a:endParaRPr lang="en-US" sz="1300" dirty="0">
+              <a:solidFill>
+                <a:srgbClr val="385D8A"/>
+              </a:solidFill>
+            </a:endParaRPr>
+          </a:p>
+          <a:p>
+            <a:pPr marL="723900" lvl="2" indent="-188913" defTabSz="839694">
+              <a:buClr>
+                <a:srgbClr val="00B0F0"/>
+              </a:buClr>
+              <a:buSzPct val="75000"/>
+              <a:buFont typeface="Wingdings 3" panose="05040102010807070707" pitchFamily="18" charset="2"/>
+              <a:buChar char="u"/>
+              <a:defRPr/>
+            </a:pPr>
+            <a:r>
+              <a:rPr lang="en-US" sz="1100" dirty="0">
+                <a:solidFill>
+                  <a:srgbClr val="385D8A"/>
+                </a:solidFill>
+                <a:hlinkClick r:id="rId3"/>
+              </a:rPr>
+              <a:t>https://beinexmicrosoft-my.sharepoint.com/:f:/g/personal/dilna_dileep_beinex_com/EpqrAuMGTr5CvcrEcRoj9GkB7QcXzc80P2bPL1ZvzAAEAg?e=BmCYCx</a:t>
+            </a:r>
+            <a:endParaRPr lang="en-US" sz="1100" dirty="0">
+              <a:solidFill>
+                <a:srgbClr val="385D8A"/>
+              </a:solidFill>
+            </a:endParaRPr>
+          </a:p>
+          <a:p>
+            <a:pPr marL="723900" lvl="2" indent="-188913" defTabSz="839694">
+              <a:buClr>
+                <a:srgbClr val="00B0F0"/>
+              </a:buClr>
+              <a:buSzPct val="75000"/>
+              <a:buFont typeface="Wingdings 3" panose="05040102010807070707" pitchFamily="18" charset="2"/>
+              <a:buChar char="u"/>
+              <a:defRPr/>
+            </a:pPr>
+            <a:r>
+              <a:rPr lang="en-US" sz="1100" dirty="0">
+                <a:solidFill>
+                  <a:srgbClr val="385D8A"/>
+                </a:solidFill>
+                <a:hlinkClick r:id="rId4"/>
+              </a:rPr>
+              <a:t>https://beinexmicrosoft-my.sharepoint.com/:f:/g/personal/dilna_dileep_beinex_com/Ep0OrBrDQ0ZKuut92vMCcDgBr0-CdmQPKsDT_Xn3kgX8jg?e=2Gdtlz</a:t>
+            </a:r>
+            <a:endParaRPr lang="en-US" sz="1100" dirty="0">
+              <a:solidFill>
+                <a:srgbClr val="385D8A"/>
+              </a:solidFill>
+            </a:endParaRPr>
+          </a:p>
+          <a:p>
+            <a:pPr marL="723900" lvl="2" indent="-188913" defTabSz="839694">
+              <a:buClr>
+                <a:srgbClr val="00B0F0"/>
+              </a:buClr>
+              <a:buSzPct val="75000"/>
+              <a:buFont typeface="Wingdings 3" panose="05040102010807070707" pitchFamily="18" charset="2"/>
+              <a:buChar char="u"/>
+              <a:defRPr/>
+            </a:pPr>
+            <a:r>
+              <a:rPr lang="en-US" sz="1100" dirty="0">
+                <a:solidFill>
+                  <a:srgbClr val="385D8A"/>
+                </a:solidFill>
+                <a:hlinkClick r:id="rId5"/>
+              </a:rPr>
+              <a:t>https://beinexmicrosoft-my.sharepoint.com/:f:/g/personal/dilna_dileep_beinex_com/Eosxe-kRRR5FkUrdpaP2oH0Bq8xI7FiiyiqzGYtYo5ajeg?e=1p2aTJ</a:t>
+            </a:r>
+            <a:endParaRPr lang="en-US" sz="1100" dirty="0">
+              <a:solidFill>
+                <a:srgbClr val="385D8A"/>
+              </a:solidFill>
+            </a:endParaRPr>
+          </a:p>
+          <a:p>
+            <a:pPr marL="723900" lvl="2" indent="-188913" defTabSz="839694">
+              <a:buClr>
+                <a:srgbClr val="00B0F0"/>
+              </a:buClr>
+              <a:buSzPct val="75000"/>
+              <a:buFont typeface="Wingdings 3" panose="05040102010807070707" pitchFamily="18" charset="2"/>
+              <a:buChar char="u"/>
+              <a:defRPr/>
+            </a:pPr>
+            <a:r>
+              <a:rPr lang="en-US" sz="1100" dirty="0">
+                <a:solidFill>
+                  <a:srgbClr val="385D8A"/>
+                </a:solidFill>
+                <a:hlinkClick r:id="rId6"/>
+              </a:rPr>
+              <a:t>https://beinexmicrosoft-my.sharepoint.com/:f:/g/personal/dilna_dileep_beinex_com/EvLPe2oDjQpBr9Ens_t7LHAB_sleWrBE_c6KK3-9EWMuOQ?e=bka3Nm</a:t>
+            </a:r>
+            <a:endParaRPr lang="en-US" sz="1100" dirty="0">
+              <a:solidFill>
+                <a:srgbClr val="385D8A"/>
+              </a:solidFill>
+            </a:endParaRPr>
+          </a:p>
+          <a:p>
+            <a:pPr marL="723900" lvl="2" indent="-188913" defTabSz="839694">
+              <a:buClr>
+                <a:srgbClr val="00B0F0"/>
+              </a:buClr>
+              <a:buSzPct val="75000"/>
+              <a:buFont typeface="Wingdings 3" panose="05040102010807070707" pitchFamily="18" charset="2"/>
+              <a:buChar char="u"/>
+              <a:defRPr/>
+            </a:pPr>
+            <a:r>
+              <a:rPr lang="en-US" sz="1100" dirty="0">
+                <a:solidFill>
+                  <a:srgbClr val="385D8A"/>
+                </a:solidFill>
+                <a:hlinkClick r:id="rId7"/>
+              </a:rPr>
+              <a:t>https://beinexmicrosoft-my.sharepoint.com/:f:/g/personal/dilna_dileep_beinex_com/EpZJJHoAIrROtBbwoh6CoA4B6TUVM86eqPISJcoVxkqKAQ?e=DbS70r</a:t>
+            </a:r>
+            <a:endParaRPr lang="en-US" sz="1100" dirty="0">
+              <a:solidFill>
+                <a:srgbClr val="385D8A"/>
+              </a:solidFill>
+            </a:endParaRPr>
+          </a:p>
+          <a:p>
+            <a:pPr marL="723900" lvl="2" indent="-188913" defTabSz="839694">
+              <a:buClr>
+                <a:srgbClr val="00B0F0"/>
+              </a:buClr>
+              <a:buSzPct val="75000"/>
+              <a:buFont typeface="Wingdings 3" panose="05040102010807070707" pitchFamily="18" charset="2"/>
+              <a:buChar char="u"/>
+              <a:defRPr/>
+            </a:pPr>
+            <a:endParaRPr lang="en-US" sz="1100" dirty="0">
+              <a:solidFill>
+                <a:srgbClr val="385D8A"/>
+              </a:solidFill>
+            </a:endParaRPr>
+          </a:p>
+          <a:p>
+            <a:pPr marL="723900" lvl="2" indent="-188913" defTabSz="839694">
+              <a:buClr>
+                <a:srgbClr val="00B0F0"/>
+              </a:buClr>
+              <a:buSzPct val="75000"/>
+              <a:buFont typeface="Wingdings 3" panose="05040102010807070707" pitchFamily="18" charset="2"/>
+              <a:buChar char="u"/>
+              <a:defRPr/>
+            </a:pPr>
+            <a:endParaRPr lang="en-US" sz="1300" dirty="0">
+              <a:solidFill>
+                <a:srgbClr val="385D8A"/>
+              </a:solidFill>
+            </a:endParaRPr>
+          </a:p>
+        </p:txBody>
+      </p:sp>
+    </p:spTree>
+    <p:extLst>
+      <p:ext uri="{BB962C8B-B14F-4D97-AF65-F5344CB8AC3E}">
+        <p14:creationId xmlns:p14="http://schemas.microsoft.com/office/powerpoint/2010/main" val="184590398"/>
+      </p:ext>
+    </p:extLst>
+  </p:cSld>
+  <p:clrMapOvr>
+    <a:masterClrMapping/>
+  </p:clrMapOvr>
+</p:sld>
+</file>
+
+<file path=ppt/slides/slide5.xml><?xml version="1.0" encoding="utf-8"?>
+<p:sld xmlns:a="http://schemas.openxmlformats.org/drawingml/2006/main" xmlns:r="http://schemas.openxmlformats.org/officeDocument/2006/relationships" xmlns:p="http://schemas.openxmlformats.org/presentationml/2006/main">
+  <p:cSld>
+    <p:spTree>
+      <p:nvGrpSpPr>
+        <p:cNvPr id="1" name=""/>
+        <p:cNvGrpSpPr/>
+        <p:nvPr/>
+      </p:nvGrpSpPr>
+      <p:grpSpPr>
+        <a:xfrm>
+          <a:off x="0" y="0"/>
+          <a:ext cx="0" cy="0"/>
+          <a:chOff x="0" y="0"/>
+          <a:chExt cx="0" cy="0"/>
+        </a:xfrm>
+      </p:grpSpPr>
+      <p:sp>
+        <p:nvSpPr>
+          <p:cNvPr id="33" name="Rectangle 32">
+            <a:extLst>
+              <a:ext uri="{FF2B5EF4-FFF2-40B4-BE49-F238E27FC236}">
+                <a16:creationId xmlns:a16="http://schemas.microsoft.com/office/drawing/2014/main" id="{C68FF623-D71A-4998-A0DD-5D9D1ECA5392}"/>
+              </a:ext>
+            </a:extLst>
+          </p:cNvPr>
+          <p:cNvSpPr/>
+          <p:nvPr/>
+        </p:nvSpPr>
+        <p:spPr>
+          <a:xfrm>
+            <a:off x="0" y="6644608"/>
+            <a:ext cx="12192000" cy="213392"/>
+          </a:xfrm>
+          <a:prstGeom prst="rect">
+            <a:avLst/>
+          </a:prstGeom>
+          <a:solidFill>
+            <a:srgbClr val="00B0F0"/>
+          </a:solidFill>
+          <a:ln>
+            <a:noFill/>
+          </a:ln>
+        </p:spPr>
+        <p:style>
+          <a:lnRef idx="2">
+            <a:schemeClr val="accent1">
+              <a:shade val="50000"/>
+            </a:schemeClr>
+          </a:lnRef>
+          <a:fillRef idx="1">
+            <a:schemeClr val="accent1"/>
+          </a:fillRef>
+          <a:effectRef idx="0">
+            <a:schemeClr val="accent1"/>
+          </a:effectRef>
+          <a:fontRef idx="minor">
+            <a:schemeClr val="lt1"/>
+          </a:fontRef>
+        </p:style>
+        <p:txBody>
+          <a:bodyPr rtlCol="0" anchor="ctr"/>
+          <a:lstStyle/>
+          <a:p>
+            <a:pPr algn="ctr"/>
+            <a:endParaRPr lang="en-GB"/>
+          </a:p>
+        </p:txBody>
+      </p:sp>
+      <p:sp>
+        <p:nvSpPr>
+          <p:cNvPr id="34" name="Rectangle 33">
+            <a:extLst>
+              <a:ext uri="{FF2B5EF4-FFF2-40B4-BE49-F238E27FC236}">
+                <a16:creationId xmlns:a16="http://schemas.microsoft.com/office/drawing/2014/main" id="{FA5D2B1F-E64F-41DE-924D-BA542C34ED06}"/>
+              </a:ext>
+            </a:extLst>
+          </p:cNvPr>
+          <p:cNvSpPr/>
+          <p:nvPr/>
+        </p:nvSpPr>
+        <p:spPr>
+          <a:xfrm>
+            <a:off x="0" y="871319"/>
+            <a:ext cx="12192000" cy="18288"/>
+          </a:xfrm>
+          <a:prstGeom prst="rect">
+            <a:avLst/>
+          </a:prstGeom>
+          <a:solidFill>
+            <a:srgbClr val="00B0F0"/>
+          </a:solidFill>
+          <a:ln>
+            <a:noFill/>
+          </a:ln>
+        </p:spPr>
+        <p:style>
+          <a:lnRef idx="2">
+            <a:schemeClr val="accent1">
+              <a:shade val="50000"/>
+            </a:schemeClr>
+          </a:lnRef>
+          <a:fillRef idx="1">
+            <a:schemeClr val="accent1"/>
+          </a:fillRef>
+          <a:effectRef idx="0">
+            <a:schemeClr val="accent1"/>
+          </a:effectRef>
+          <a:fontRef idx="minor">
+            <a:schemeClr val="lt1"/>
+          </a:fontRef>
+        </p:style>
+        <p:txBody>
+          <a:bodyPr rtlCol="0" anchor="ctr"/>
+          <a:lstStyle/>
+          <a:p>
+            <a:pPr algn="ctr"/>
+            <a:endParaRPr lang="en-GB"/>
+          </a:p>
+        </p:txBody>
+      </p:sp>
+      <p:sp>
+        <p:nvSpPr>
+          <p:cNvPr id="35" name="TextBox 34">
+            <a:extLst>
+              <a:ext uri="{FF2B5EF4-FFF2-40B4-BE49-F238E27FC236}">
+                <a16:creationId xmlns:a16="http://schemas.microsoft.com/office/drawing/2014/main" id="{0D30C5B4-C1E9-4B87-9CE1-D2BCD6B05072}"/>
+              </a:ext>
+            </a:extLst>
+          </p:cNvPr>
+          <p:cNvSpPr txBox="1"/>
+          <p:nvPr/>
+        </p:nvSpPr>
+        <p:spPr>
+          <a:xfrm>
+            <a:off x="330926" y="254342"/>
+            <a:ext cx="10811556" cy="892552"/>
+          </a:xfrm>
+          <a:prstGeom prst="rect">
+            <a:avLst/>
+          </a:prstGeom>
+          <a:noFill/>
+        </p:spPr>
+        <p:txBody>
+          <a:bodyPr wrap="square" rtlCol="0">
+            <a:spAutoFit/>
+          </a:bodyPr>
+          <a:lstStyle/>
+          <a:p>
+            <a:r>
+              <a:rPr lang="en-IN" sz="2600" b="1" dirty="0">
+                <a:solidFill>
+                  <a:srgbClr val="0070C0"/>
+                </a:solidFill>
+              </a:rPr>
+              <a:t>Project Updates – </a:t>
+            </a:r>
+            <a:r>
+              <a:rPr lang="en-US" sz="2600" b="1" dirty="0">
+                <a:solidFill>
+                  <a:srgbClr val="0070C0"/>
+                </a:solidFill>
+              </a:rPr>
+              <a:t>Week 2 </a:t>
+            </a:r>
+            <a:r>
+              <a:rPr lang="en-US" sz="2600" b="1">
+                <a:solidFill>
+                  <a:srgbClr val="0070C0"/>
+                </a:solidFill>
+              </a:rPr>
+              <a:t>(14/10/2024-18/10/2024</a:t>
+            </a:r>
+            <a:r>
+              <a:rPr lang="en-US" sz="2600" b="1" dirty="0">
+                <a:solidFill>
+                  <a:srgbClr val="0070C0"/>
+                </a:solidFill>
+              </a:rPr>
+              <a:t>)</a:t>
+            </a:r>
+          </a:p>
+          <a:p>
+            <a:endParaRPr lang="en-US" sz="2600" b="1" dirty="0">
+              <a:solidFill>
+                <a:srgbClr val="0070C0"/>
+              </a:solidFill>
+            </a:endParaRPr>
+          </a:p>
+        </p:txBody>
+      </p:sp>
+      <p:pic>
+        <p:nvPicPr>
+          <p:cNvPr id="36" name="Picture 35" descr="A picture containing clipart&#10;&#10;Description generated with very high confidence">
+            <a:extLst>
+              <a:ext uri="{FF2B5EF4-FFF2-40B4-BE49-F238E27FC236}">
+                <a16:creationId xmlns:a16="http://schemas.microsoft.com/office/drawing/2014/main" id="{53078F35-D806-4F0F-98B6-75FEDA3F69BA}"/>
+              </a:ext>
+            </a:extLst>
+          </p:cNvPr>
+          <p:cNvPicPr>
+            <a:picLocks noChangeAspect="1"/>
+          </p:cNvPicPr>
+          <p:nvPr/>
+        </p:nvPicPr>
+        <p:blipFill>
+          <a:blip r:embed="rId2">
+            <a:extLst>
+              <a:ext uri="{28A0092B-C50C-407E-A947-70E740481C1C}">
+                <a14:useLocalDpi xmlns:a14="http://schemas.microsoft.com/office/drawing/2010/main" val="0"/>
+              </a:ext>
+            </a:extLst>
+          </a:blip>
+          <a:stretch>
+            <a:fillRect/>
+          </a:stretch>
+        </p:blipFill>
+        <p:spPr>
+          <a:xfrm>
+            <a:off x="10502537" y="589742"/>
+            <a:ext cx="1689463" cy="563154"/>
+          </a:xfrm>
+          <a:prstGeom prst="rect">
+            <a:avLst/>
+          </a:prstGeom>
+        </p:spPr>
+      </p:pic>
+      <p:sp>
+        <p:nvSpPr>
+          <p:cNvPr id="2" name="Rectangle 1">
+            <a:extLst>
+              <a:ext uri="{FF2B5EF4-FFF2-40B4-BE49-F238E27FC236}">
+                <a16:creationId xmlns:a16="http://schemas.microsoft.com/office/drawing/2014/main" id="{E9981416-A2BD-4F6F-A16A-599D44127AF2}"/>
+              </a:ext>
+            </a:extLst>
+          </p:cNvPr>
+          <p:cNvSpPr/>
+          <p:nvPr/>
+        </p:nvSpPr>
+        <p:spPr>
+          <a:xfrm>
+            <a:off x="433633" y="1152896"/>
+            <a:ext cx="5561814" cy="5228423"/>
+          </a:xfrm>
+          <a:prstGeom prst="rect">
+            <a:avLst/>
+          </a:prstGeom>
+          <a:noFill/>
+          <a:ln>
+            <a:prstDash val="dash"/>
+          </a:ln>
+        </p:spPr>
+        <p:style>
+          <a:lnRef idx="2">
+            <a:schemeClr val="accent1">
+              <a:shade val="50000"/>
+            </a:schemeClr>
+          </a:lnRef>
+          <a:fillRef idx="1">
+            <a:schemeClr val="accent1"/>
+          </a:fillRef>
+          <a:effectRef idx="0">
+            <a:schemeClr val="accent1"/>
+          </a:effectRef>
+          <a:fontRef idx="minor">
+            <a:schemeClr val="lt1"/>
+          </a:fontRef>
+        </p:style>
+        <p:txBody>
+          <a:bodyPr rtlCol="0" anchor="ctr"/>
+          <a:lstStyle/>
+          <a:p>
+            <a:pPr algn="ctr"/>
+            <a:endParaRPr lang="en-IN"/>
+          </a:p>
+        </p:txBody>
+      </p:sp>
+      <p:sp>
+        <p:nvSpPr>
+          <p:cNvPr id="7" name="Rectangle 6">
+            <a:extLst>
+              <a:ext uri="{FF2B5EF4-FFF2-40B4-BE49-F238E27FC236}">
+                <a16:creationId xmlns:a16="http://schemas.microsoft.com/office/drawing/2014/main" id="{CF883A6F-EBA0-4DB7-B4B3-DACE4E381459}"/>
+              </a:ext>
+            </a:extLst>
+          </p:cNvPr>
+          <p:cNvSpPr/>
+          <p:nvPr/>
+        </p:nvSpPr>
+        <p:spPr>
+          <a:xfrm>
+            <a:off x="6150992" y="3845323"/>
+            <a:ext cx="5561814" cy="2487483"/>
+          </a:xfrm>
+          <a:prstGeom prst="rect">
+            <a:avLst/>
+          </a:prstGeom>
+          <a:noFill/>
+          <a:ln>
+            <a:prstDash val="dash"/>
+          </a:ln>
+        </p:spPr>
+        <p:style>
+          <a:lnRef idx="2">
+            <a:schemeClr val="accent1">
+              <a:shade val="50000"/>
+            </a:schemeClr>
+          </a:lnRef>
+          <a:fillRef idx="1">
+            <a:schemeClr val="accent1"/>
+          </a:fillRef>
+          <a:effectRef idx="0">
+            <a:schemeClr val="accent1"/>
+          </a:effectRef>
+          <a:fontRef idx="minor">
+            <a:schemeClr val="lt1"/>
+          </a:fontRef>
+        </p:style>
+        <p:txBody>
+          <a:bodyPr rtlCol="0" anchor="ctr"/>
+          <a:lstStyle/>
+          <a:p>
+            <a:pPr algn="ctr"/>
+            <a:endParaRPr lang="en-IN"/>
+          </a:p>
+        </p:txBody>
+      </p:sp>
+      <p:sp>
+        <p:nvSpPr>
+          <p:cNvPr id="8" name="Rectangle 7">
+            <a:extLst>
+              <a:ext uri="{FF2B5EF4-FFF2-40B4-BE49-F238E27FC236}">
+                <a16:creationId xmlns:a16="http://schemas.microsoft.com/office/drawing/2014/main" id="{4EDEB4CC-B0DE-4A69-BBA1-6BA60FBCB711}"/>
+              </a:ext>
+            </a:extLst>
+          </p:cNvPr>
+          <p:cNvSpPr/>
+          <p:nvPr/>
+        </p:nvSpPr>
+        <p:spPr>
+          <a:xfrm>
+            <a:off x="6150992" y="1152897"/>
+            <a:ext cx="5561814" cy="2571663"/>
+          </a:xfrm>
+          <a:prstGeom prst="rect">
+            <a:avLst/>
+          </a:prstGeom>
+          <a:noFill/>
+          <a:ln>
+            <a:prstDash val="dash"/>
+          </a:ln>
+        </p:spPr>
+        <p:style>
+          <a:lnRef idx="2">
+            <a:schemeClr val="accent1">
+              <a:shade val="50000"/>
+            </a:schemeClr>
+          </a:lnRef>
+          <a:fillRef idx="1">
+            <a:schemeClr val="accent1"/>
+          </a:fillRef>
+          <a:effectRef idx="0">
+            <a:schemeClr val="accent1"/>
+          </a:effectRef>
+          <a:fontRef idx="minor">
+            <a:schemeClr val="lt1"/>
+          </a:fontRef>
+        </p:style>
+        <p:txBody>
+          <a:bodyPr rtlCol="0" anchor="ctr"/>
+          <a:lstStyle/>
+          <a:p>
+            <a:pPr algn="ctr"/>
+            <a:endParaRPr lang="en-IN"/>
+          </a:p>
+        </p:txBody>
+      </p:sp>
+      <p:sp>
+        <p:nvSpPr>
+          <p:cNvPr id="9" name="Rectangle 8">
+            <a:extLst>
+              <a:ext uri="{FF2B5EF4-FFF2-40B4-BE49-F238E27FC236}">
+                <a16:creationId xmlns:a16="http://schemas.microsoft.com/office/drawing/2014/main" id="{82C2B6F0-1ED9-4562-8A8A-86A6C3F98988}"/>
+              </a:ext>
+            </a:extLst>
+          </p:cNvPr>
+          <p:cNvSpPr/>
+          <p:nvPr/>
+        </p:nvSpPr>
+        <p:spPr>
+          <a:xfrm>
+            <a:off x="601742" y="1010075"/>
+            <a:ext cx="981961" cy="276999"/>
+          </a:xfrm>
+          <a:prstGeom prst="rect">
+            <a:avLst/>
+          </a:prstGeom>
+          <a:solidFill>
+            <a:schemeClr val="bg1"/>
+          </a:solidFill>
+        </p:spPr>
+        <p:txBody>
+          <a:bodyPr wrap="square">
+            <a:spAutoFit/>
+          </a:bodyPr>
+          <a:lstStyle/>
+          <a:p>
+            <a:pPr algn="ctr"/>
+            <a:r>
+              <a:rPr lang="en-AU" sz="1200" b="1" dirty="0">
+                <a:solidFill>
+                  <a:srgbClr val="0070C0"/>
+                </a:solidFill>
+                <a:latin typeface="+mj-lt"/>
+              </a:rPr>
+              <a:t>Updates</a:t>
+            </a:r>
+            <a:endParaRPr lang="en-GB" sz="1200" b="1" dirty="0">
+              <a:solidFill>
+                <a:srgbClr val="0070C0"/>
+              </a:solidFill>
+              <a:latin typeface="+mj-lt"/>
+            </a:endParaRPr>
+          </a:p>
+        </p:txBody>
+      </p:sp>
+      <p:sp>
+        <p:nvSpPr>
+          <p:cNvPr id="10" name="Rectangle 9">
+            <a:extLst>
+              <a:ext uri="{FF2B5EF4-FFF2-40B4-BE49-F238E27FC236}">
+                <a16:creationId xmlns:a16="http://schemas.microsoft.com/office/drawing/2014/main" id="{19636823-7CA3-4F5D-9733-1F7B42839EA5}"/>
+              </a:ext>
+            </a:extLst>
+          </p:cNvPr>
+          <p:cNvSpPr/>
+          <p:nvPr/>
+        </p:nvSpPr>
+        <p:spPr>
+          <a:xfrm>
+            <a:off x="6372518" y="996661"/>
+            <a:ext cx="1918042" cy="276999"/>
+          </a:xfrm>
+          <a:prstGeom prst="rect">
+            <a:avLst/>
+          </a:prstGeom>
+          <a:solidFill>
+            <a:schemeClr val="bg1"/>
+          </a:solidFill>
+        </p:spPr>
+        <p:txBody>
+          <a:bodyPr wrap="square">
+            <a:spAutoFit/>
+          </a:bodyPr>
+          <a:lstStyle/>
+          <a:p>
+            <a:r>
+              <a:rPr lang="en-AU" sz="1200" b="1" dirty="0">
+                <a:solidFill>
+                  <a:srgbClr val="0070C0"/>
+                </a:solidFill>
+                <a:latin typeface="+mj-lt"/>
+              </a:rPr>
+              <a:t>Action Items – Trainers</a:t>
+            </a:r>
+            <a:endParaRPr lang="en-GB" sz="1200" b="1" dirty="0">
+              <a:solidFill>
+                <a:srgbClr val="0070C0"/>
+              </a:solidFill>
+              <a:latin typeface="+mj-lt"/>
+            </a:endParaRPr>
+          </a:p>
+        </p:txBody>
+      </p:sp>
+      <p:sp>
+        <p:nvSpPr>
+          <p:cNvPr id="12" name="Rectangle 11">
+            <a:extLst>
+              <a:ext uri="{FF2B5EF4-FFF2-40B4-BE49-F238E27FC236}">
+                <a16:creationId xmlns:a16="http://schemas.microsoft.com/office/drawing/2014/main" id="{333E5A2A-590A-4984-9C55-7C06CBC9C147}"/>
+              </a:ext>
+            </a:extLst>
+          </p:cNvPr>
+          <p:cNvSpPr/>
+          <p:nvPr/>
+        </p:nvSpPr>
+        <p:spPr>
+          <a:xfrm>
+            <a:off x="6372516" y="3742296"/>
+            <a:ext cx="1918043" cy="276999"/>
+          </a:xfrm>
+          <a:prstGeom prst="rect">
+            <a:avLst/>
+          </a:prstGeom>
+          <a:solidFill>
+            <a:schemeClr val="bg1"/>
+          </a:solidFill>
+        </p:spPr>
+        <p:txBody>
+          <a:bodyPr wrap="square">
+            <a:spAutoFit/>
+          </a:bodyPr>
+          <a:lstStyle/>
+          <a:p>
+            <a:r>
+              <a:rPr lang="en-AU" sz="1200" b="1" dirty="0">
+                <a:solidFill>
+                  <a:srgbClr val="0070C0"/>
+                </a:solidFill>
+                <a:latin typeface="+mj-lt"/>
+              </a:rPr>
+              <a:t>Action Items – Interns</a:t>
+            </a:r>
+            <a:endParaRPr lang="en-GB" sz="1200" b="1" dirty="0">
+              <a:solidFill>
+                <a:srgbClr val="0070C0"/>
+              </a:solidFill>
+              <a:latin typeface="+mj-lt"/>
+            </a:endParaRPr>
+          </a:p>
+        </p:txBody>
+      </p:sp>
+      <p:sp>
+        <p:nvSpPr>
+          <p:cNvPr id="3" name="Rectangle 2">
+            <a:extLst>
+              <a:ext uri="{FF2B5EF4-FFF2-40B4-BE49-F238E27FC236}">
+                <a16:creationId xmlns:a16="http://schemas.microsoft.com/office/drawing/2014/main" id="{21846364-732E-45D1-AC92-93BF1D1A4DDF}"/>
+              </a:ext>
+            </a:extLst>
+          </p:cNvPr>
+          <p:cNvSpPr/>
+          <p:nvPr/>
+        </p:nvSpPr>
+        <p:spPr>
+          <a:xfrm>
+            <a:off x="446694" y="1537918"/>
+            <a:ext cx="5290010" cy="4308872"/>
+          </a:xfrm>
+          <a:prstGeom prst="rect">
+            <a:avLst/>
+          </a:prstGeom>
+        </p:spPr>
+        <p:txBody>
+          <a:bodyPr wrap="square">
+            <a:spAutoFit/>
+          </a:bodyPr>
+          <a:lstStyle/>
+          <a:p>
+            <a:pPr marL="266700" lvl="1" indent="-188913" defTabSz="839694">
+              <a:buClr>
+                <a:srgbClr val="00B0F0"/>
+              </a:buClr>
+              <a:buSzPct val="75000"/>
+              <a:buFont typeface="Wingdings 3" panose="05040102010807070707" pitchFamily="18" charset="2"/>
+              <a:buChar char="u"/>
+              <a:defRPr/>
+            </a:pPr>
+            <a:endParaRPr lang="en-US" sz="1400" b="1" dirty="0">
+              <a:solidFill>
+                <a:srgbClr val="385D8A"/>
+              </a:solidFill>
+            </a:endParaRPr>
+          </a:p>
+          <a:p>
+            <a:pPr marL="534987" lvl="2" defTabSz="839694">
+              <a:buClr>
+                <a:srgbClr val="00B0F0"/>
+              </a:buClr>
+              <a:buSzPct val="75000"/>
+              <a:defRPr/>
+            </a:pPr>
+            <a:r>
+              <a:rPr lang="en-US" sz="1300" dirty="0">
+                <a:solidFill>
+                  <a:srgbClr val="385D8A"/>
+                </a:solidFill>
+              </a:rPr>
               <a:t>14/10/2024 – Session focused on SCSS basics and task submission</a:t>
             </a:r>
           </a:p>
@@ -6027,6 +7219,20 @@
               <a:buSzPct val="75000"/>
               <a:defRPr/>
             </a:pPr>
+            <a:endParaRPr lang="en-US" sz="1300" dirty="0">
+              <a:solidFill>
+                <a:srgbClr val="385D8A"/>
+              </a:solidFill>
+            </a:endParaRPr>
+          </a:p>
+          <a:p>
+            <a:pPr marL="534987" lvl="2" defTabSz="839694">
+              <a:buClr>
+                <a:srgbClr val="00B0F0"/>
+              </a:buClr>
+              <a:buSzPct val="75000"/>
+              <a:defRPr/>
+            </a:pPr>
             <a:r>
               <a:rPr lang="en-US" sz="1300" dirty="0">
                 <a:solidFill>
@@ -6035,6 +7241,20 @@
               </a:rPr>
               <a:t>17/10/2024 – Task completed and submitted.</a:t>
             </a:r>
+          </a:p>
+          <a:p>
+            <a:pPr marL="534987" lvl="2" defTabSz="839694">
+              <a:buClr>
+                <a:srgbClr val="00B0F0"/>
+              </a:buClr>
+              <a:buSzPct val="75000"/>
+              <a:defRPr/>
+            </a:pPr>
+            <a:endParaRPr lang="en-US" sz="1300" dirty="0">
+              <a:solidFill>
+                <a:srgbClr val="385D8A"/>
+              </a:solidFill>
+            </a:endParaRPr>
           </a:p>
           <a:p>
             <a:pPr marL="534987" lvl="2" defTabSz="839694">
@@ -6574,7 +7794,7 @@
 </p:sld>
 </file>
 
-<file path=ppt/slides/slide5.xml><?xml version="1.0" encoding="utf-8"?>
+<file path=ppt/slides/slide6.xml><?xml version="1.0" encoding="utf-8"?>
 <p:sld xmlns:a="http://schemas.openxmlformats.org/drawingml/2006/main" xmlns:r="http://schemas.openxmlformats.org/officeDocument/2006/relationships" xmlns:p="http://schemas.openxmlformats.org/presentationml/2006/main">
   <p:cSld>
     <p:spTree>

</xml_diff>

<commit_message>
till day 12 done
</commit_message>
<xml_diff>
--- a/Weekly Status Update -Dilna Dileep.pptx
+++ b/Weekly Status Update -Dilna Dileep.pptx
@@ -8,10 +8,11 @@
     <p:sldId id="258" r:id="rId2"/>
     <p:sldId id="297" r:id="rId3"/>
     <p:sldId id="260" r:id="rId4"/>
-    <p:sldId id="302" r:id="rId5"/>
-    <p:sldId id="301" r:id="rId6"/>
-    <p:sldId id="300" r:id="rId7"/>
-    <p:sldId id="299" r:id="rId8"/>
+    <p:sldId id="303" r:id="rId5"/>
+    <p:sldId id="302" r:id="rId6"/>
+    <p:sldId id="301" r:id="rId7"/>
+    <p:sldId id="300" r:id="rId8"/>
+    <p:sldId id="299" r:id="rId9"/>
   </p:sldIdLst>
   <p:sldSz cx="12192000" cy="6858000"/>
   <p:notesSz cx="6858000" cy="9144000"/>
@@ -371,7 +372,7 @@
           <a:p>
             <a:fld id="{93B38562-6E7D-48A0-9E59-3F9BE1BF3686}" type="datetimeFigureOut">
               <a:rPr lang="en-GB" smtClean="0"/>
-              <a:t>07/11/2024</a:t>
+              <a:t>15/11/2024</a:t>
             </a:fld>
             <a:endParaRPr lang="en-GB"/>
           </a:p>
@@ -571,7 +572,7 @@
           <a:p>
             <a:fld id="{93B38562-6E7D-48A0-9E59-3F9BE1BF3686}" type="datetimeFigureOut">
               <a:rPr lang="en-GB" smtClean="0"/>
-              <a:t>07/11/2024</a:t>
+              <a:t>15/11/2024</a:t>
             </a:fld>
             <a:endParaRPr lang="en-GB"/>
           </a:p>
@@ -781,7 +782,7 @@
           <a:p>
             <a:fld id="{93B38562-6E7D-48A0-9E59-3F9BE1BF3686}" type="datetimeFigureOut">
               <a:rPr lang="en-GB" smtClean="0"/>
-              <a:t>07/11/2024</a:t>
+              <a:t>15/11/2024</a:t>
             </a:fld>
             <a:endParaRPr lang="en-GB"/>
           </a:p>
@@ -981,7 +982,7 @@
           <a:p>
             <a:fld id="{93B38562-6E7D-48A0-9E59-3F9BE1BF3686}" type="datetimeFigureOut">
               <a:rPr lang="en-GB" smtClean="0"/>
-              <a:t>07/11/2024</a:t>
+              <a:t>15/11/2024</a:t>
             </a:fld>
             <a:endParaRPr lang="en-GB"/>
           </a:p>
@@ -1257,7 +1258,7 @@
           <a:p>
             <a:fld id="{93B38562-6E7D-48A0-9E59-3F9BE1BF3686}" type="datetimeFigureOut">
               <a:rPr lang="en-GB" smtClean="0"/>
-              <a:t>07/11/2024</a:t>
+              <a:t>15/11/2024</a:t>
             </a:fld>
             <a:endParaRPr lang="en-GB"/>
           </a:p>
@@ -1525,7 +1526,7 @@
           <a:p>
             <a:fld id="{93B38562-6E7D-48A0-9E59-3F9BE1BF3686}" type="datetimeFigureOut">
               <a:rPr lang="en-GB" smtClean="0"/>
-              <a:t>07/11/2024</a:t>
+              <a:t>15/11/2024</a:t>
             </a:fld>
             <a:endParaRPr lang="en-GB"/>
           </a:p>
@@ -1940,7 +1941,7 @@
           <a:p>
             <a:fld id="{93B38562-6E7D-48A0-9E59-3F9BE1BF3686}" type="datetimeFigureOut">
               <a:rPr lang="en-GB" smtClean="0"/>
-              <a:t>07/11/2024</a:t>
+              <a:t>15/11/2024</a:t>
             </a:fld>
             <a:endParaRPr lang="en-GB"/>
           </a:p>
@@ -2082,7 +2083,7 @@
           <a:p>
             <a:fld id="{93B38562-6E7D-48A0-9E59-3F9BE1BF3686}" type="datetimeFigureOut">
               <a:rPr lang="en-GB" smtClean="0"/>
-              <a:t>07/11/2024</a:t>
+              <a:t>15/11/2024</a:t>
             </a:fld>
             <a:endParaRPr lang="en-GB"/>
           </a:p>
@@ -2195,7 +2196,7 @@
           <a:p>
             <a:fld id="{93B38562-6E7D-48A0-9E59-3F9BE1BF3686}" type="datetimeFigureOut">
               <a:rPr lang="en-GB" smtClean="0"/>
-              <a:t>07/11/2024</a:t>
+              <a:t>15/11/2024</a:t>
             </a:fld>
             <a:endParaRPr lang="en-GB"/>
           </a:p>
@@ -2508,7 +2509,7 @@
           <a:p>
             <a:fld id="{93B38562-6E7D-48A0-9E59-3F9BE1BF3686}" type="datetimeFigureOut">
               <a:rPr lang="en-GB" smtClean="0"/>
-              <a:t>07/11/2024</a:t>
+              <a:t>15/11/2024</a:t>
             </a:fld>
             <a:endParaRPr lang="en-GB"/>
           </a:p>
@@ -2797,7 +2798,7 @@
           <a:p>
             <a:fld id="{93B38562-6E7D-48A0-9E59-3F9BE1BF3686}" type="datetimeFigureOut">
               <a:rPr lang="en-GB" smtClean="0"/>
-              <a:t>07/11/2024</a:t>
+              <a:t>15/11/2024</a:t>
             </a:fld>
             <a:endParaRPr lang="en-GB"/>
           </a:p>
@@ -3040,7 +3041,7 @@
           <a:p>
             <a:fld id="{93B38562-6E7D-48A0-9E59-3F9BE1BF3686}" type="datetimeFigureOut">
               <a:rPr lang="en-GB" smtClean="0"/>
-              <a:t>07/11/2024</a:t>
+              <a:t>15/11/2024</a:t>
             </a:fld>
             <a:endParaRPr lang="en-GB"/>
           </a:p>
@@ -3893,7 +3894,7 @@
         </p:nvSpPr>
         <p:spPr>
           <a:xfrm>
-            <a:off x="330926" y="254342"/>
+            <a:off x="330926" y="245198"/>
             <a:ext cx="10811556" cy="892552"/>
           </a:xfrm>
           <a:prstGeom prst="rect">
@@ -3916,12 +3917,20 @@
               <a:t>Project Updates – </a:t>
             </a:r>
             <a:r>
+              <a:rPr lang="en-US" sz="2600" b="1">
+                <a:solidFill>
+                  <a:srgbClr val="0070C0"/>
+                </a:solidFill>
+              </a:rPr>
+              <a:t>Week 6 (11/11/2024 - 15/11/2024</a:t>
+            </a:r>
+            <a:r>
               <a:rPr lang="en-US" sz="2600" b="1" dirty="0">
                 <a:solidFill>
                   <a:srgbClr val="0070C0"/>
                 </a:solidFill>
               </a:rPr>
-              <a:t>Week 5 (04/11/2024 - 08/11/2024)</a:t>
+              <a:t>)</a:t>
             </a:r>
           </a:p>
           <a:p>
@@ -4279,7 +4288,7 @@
         <p:spPr>
           <a:xfrm>
             <a:off x="446694" y="1537918"/>
-            <a:ext cx="5290010" cy="7109639"/>
+            <a:ext cx="5290010" cy="8910131"/>
           </a:xfrm>
           <a:prstGeom prst="rect">
             <a:avLst/>
@@ -4320,7 +4329,7 @@
                   <a:srgbClr val="385D8A"/>
                 </a:solidFill>
               </a:rPr>
-              <a:t>04/11/2024 –Session is about Angular forms and task submission.</a:t>
+              <a:t>11/11/2024 –Session is about Angular Error handling and task submission.</a:t>
             </a:r>
           </a:p>
           <a:p>
@@ -4351,7 +4360,7 @@
                   <a:srgbClr val="385D8A"/>
                 </a:solidFill>
               </a:rPr>
-              <a:t>05/11/2024 –Session is about Services and Dependency Injection and task submission.</a:t>
+              <a:t>12/11/2024 –Session is about Angular pipes : custom pipes and built-in pipes. And task submission.</a:t>
             </a:r>
           </a:p>
           <a:p>
@@ -4382,7 +4391,69 @@
                   <a:srgbClr val="385D8A"/>
                 </a:solidFill>
               </a:rPr>
-              <a:t>06/11/2024 –Session is about Angular Routing </a:t>
+              <a:t>13/11/2024 –Session is about Angular custom directives, And task submission.</a:t>
+            </a:r>
+          </a:p>
+          <a:p>
+            <a:pPr marL="534987" lvl="2" defTabSz="839694">
+              <a:buClr>
+                <a:srgbClr val="00B0F0"/>
+              </a:buClr>
+              <a:buSzPct val="75000"/>
+              <a:defRPr/>
+            </a:pPr>
+            <a:endParaRPr lang="en-US" sz="1300" dirty="0">
+              <a:solidFill>
+                <a:srgbClr val="385D8A"/>
+              </a:solidFill>
+            </a:endParaRPr>
+          </a:p>
+          <a:p>
+            <a:pPr marL="534987" lvl="2" defTabSz="839694">
+              <a:buClr>
+                <a:srgbClr val="00B0F0"/>
+              </a:buClr>
+              <a:buSzPct val="75000"/>
+              <a:defRPr/>
+            </a:pPr>
+            <a:r>
+              <a:rPr lang="en-US" sz="1300" dirty="0">
+                <a:solidFill>
+                  <a:srgbClr val="385D8A"/>
+                </a:solidFill>
+              </a:rPr>
+              <a:t>14/11/2024 –Session is about Promise and Observable, And task submission.</a:t>
+            </a:r>
+          </a:p>
+          <a:p>
+            <a:pPr marL="534987" lvl="2" defTabSz="839694">
+              <a:buClr>
+                <a:srgbClr val="00B0F0"/>
+              </a:buClr>
+              <a:buSzPct val="75000"/>
+              <a:defRPr/>
+            </a:pPr>
+            <a:endParaRPr lang="en-US" sz="1300" dirty="0">
+              <a:solidFill>
+                <a:srgbClr val="385D8A"/>
+              </a:solidFill>
+            </a:endParaRPr>
+          </a:p>
+          <a:p>
+            <a:pPr marL="534987" lvl="2" defTabSz="839694">
+              <a:buClr>
+                <a:srgbClr val="00B0F0"/>
+              </a:buClr>
+              <a:buSzPct val="75000"/>
+              <a:defRPr/>
+            </a:pPr>
+            <a:r>
+              <a:rPr lang="en-US" sz="1300" dirty="0">
+                <a:solidFill>
+                  <a:srgbClr val="385D8A"/>
+                </a:solidFill>
+              </a:rPr>
+              <a:t>15/11/2024 –Session is about </a:t>
             </a:r>
             <a:r>
               <a:rPr lang="en-GB" sz="1300" dirty="0">
@@ -4390,7 +4461,7 @@
                   <a:srgbClr val="385D8A"/>
                 </a:solidFill>
               </a:rPr>
-              <a:t>It includes normal, nested, and parameterized routes, along with query parameters. </a:t>
+              <a:t>Component Interaction and Data Sharing </a:t>
             </a:r>
             <a:r>
               <a:rPr lang="en-US" sz="1300" dirty="0">
@@ -4398,55 +4469,92 @@
                   <a:srgbClr val="385D8A"/>
                 </a:solidFill>
               </a:rPr>
-              <a:t> and task submission.</a:t>
-            </a:r>
-          </a:p>
-          <a:p>
-            <a:pPr marL="534987" lvl="2" defTabSz="839694">
-              <a:buClr>
-                <a:srgbClr val="00B0F0"/>
-              </a:buClr>
-              <a:buSzPct val="75000"/>
-              <a:defRPr/>
-            </a:pPr>
-            <a:endParaRPr lang="en-US" sz="1300" dirty="0">
-              <a:solidFill>
-                <a:srgbClr val="385D8A"/>
-              </a:solidFill>
-            </a:endParaRPr>
-          </a:p>
-          <a:p>
-            <a:pPr marL="534987" lvl="2" defTabSz="839694">
-              <a:buClr>
-                <a:srgbClr val="00B0F0"/>
-              </a:buClr>
-              <a:buSzPct val="75000"/>
-              <a:defRPr/>
-            </a:pPr>
-            <a:r>
-              <a:rPr lang="en-US" sz="1300" dirty="0">
-                <a:solidFill>
-                  <a:srgbClr val="385D8A"/>
-                </a:solidFill>
-              </a:rPr>
-              <a:t>07/11/2024 –Session is </a:t>
-            </a:r>
-            <a:r>
-              <a:rPr lang="en-GB" sz="1300" dirty="0">
-                <a:solidFill>
-                  <a:srgbClr val="385D8A"/>
-                </a:solidFill>
-              </a:rPr>
-              <a:t>Lazy loading and Guarding routes</a:t>
-            </a:r>
-            <a:r>
-              <a:rPr lang="en-US" sz="1300" dirty="0">
-                <a:solidFill>
-                  <a:srgbClr val="385D8A"/>
-                </a:solidFill>
-              </a:rPr>
-              <a:t> and task submission.</a:t>
-            </a:r>
+              <a:t>, And task submission.</a:t>
+            </a:r>
+          </a:p>
+          <a:p>
+            <a:pPr marL="534987" lvl="2" defTabSz="839694">
+              <a:buClr>
+                <a:srgbClr val="00B0F0"/>
+              </a:buClr>
+              <a:buSzPct val="75000"/>
+              <a:defRPr/>
+            </a:pPr>
+            <a:endParaRPr lang="en-US" sz="1300" dirty="0">
+              <a:solidFill>
+                <a:srgbClr val="385D8A"/>
+              </a:solidFill>
+            </a:endParaRPr>
+          </a:p>
+          <a:p>
+            <a:pPr marL="534987" lvl="2" defTabSz="839694">
+              <a:buClr>
+                <a:srgbClr val="00B0F0"/>
+              </a:buClr>
+              <a:buSzPct val="75000"/>
+              <a:defRPr/>
+            </a:pPr>
+            <a:endParaRPr lang="en-US" sz="1300" dirty="0">
+              <a:solidFill>
+                <a:srgbClr val="385D8A"/>
+              </a:solidFill>
+            </a:endParaRPr>
+          </a:p>
+          <a:p>
+            <a:pPr marL="534987" lvl="2" defTabSz="839694">
+              <a:buClr>
+                <a:srgbClr val="00B0F0"/>
+              </a:buClr>
+              <a:buSzPct val="75000"/>
+              <a:defRPr/>
+            </a:pPr>
+            <a:endParaRPr lang="en-US" sz="1300" dirty="0">
+              <a:solidFill>
+                <a:srgbClr val="385D8A"/>
+              </a:solidFill>
+            </a:endParaRPr>
+          </a:p>
+          <a:p>
+            <a:pPr marL="534987" lvl="2" defTabSz="839694">
+              <a:buClr>
+                <a:srgbClr val="00B0F0"/>
+              </a:buClr>
+              <a:buSzPct val="75000"/>
+              <a:defRPr/>
+            </a:pPr>
+            <a:endParaRPr lang="en-US" sz="1300" dirty="0">
+              <a:solidFill>
+                <a:srgbClr val="385D8A"/>
+              </a:solidFill>
+            </a:endParaRPr>
+          </a:p>
+          <a:p>
+            <a:pPr marL="534987" lvl="2" defTabSz="839694">
+              <a:buClr>
+                <a:srgbClr val="00B0F0"/>
+              </a:buClr>
+              <a:buSzPct val="75000"/>
+              <a:defRPr/>
+            </a:pPr>
+            <a:endParaRPr lang="en-US" sz="1300" dirty="0">
+              <a:solidFill>
+                <a:srgbClr val="385D8A"/>
+              </a:solidFill>
+            </a:endParaRPr>
+          </a:p>
+          <a:p>
+            <a:pPr marL="534987" lvl="2" defTabSz="839694">
+              <a:buClr>
+                <a:srgbClr val="00B0F0"/>
+              </a:buClr>
+              <a:buSzPct val="75000"/>
+              <a:defRPr/>
+            </a:pPr>
+            <a:endParaRPr lang="en-US" sz="1300" dirty="0">
+              <a:solidFill>
+                <a:srgbClr val="385D8A"/>
+              </a:solidFill>
+            </a:endParaRPr>
           </a:p>
           <a:p>
             <a:pPr marL="534987" lvl="2" defTabSz="839694">
@@ -4789,7 +4897,7 @@
         <p:spPr>
           <a:xfrm>
             <a:off x="6286894" y="1273660"/>
-            <a:ext cx="5290010" cy="2092881"/>
+            <a:ext cx="5290010" cy="2292935"/>
           </a:xfrm>
           <a:prstGeom prst="rect">
             <a:avLst/>
@@ -4830,23 +4938,15 @@
                   <a:srgbClr val="385D8A"/>
                 </a:solidFill>
               </a:rPr>
-              <a:t>04/11/2024 – </a:t>
-            </a:r>
-            <a:r>
-              <a:rPr lang="en-US" sz="1300" dirty="0" err="1">
+              <a:t>11/11/2024  - </a:t>
+            </a:r>
+            <a:r>
+              <a:rPr lang="en-GB" sz="1300" dirty="0">
                 <a:solidFill>
                   <a:srgbClr val="385D8A"/>
                 </a:solidFill>
               </a:rPr>
-              <a:t>Iby</a:t>
-            </a:r>
-            <a:r>
-              <a:rPr lang="en-US" sz="1300" dirty="0">
-                <a:solidFill>
-                  <a:srgbClr val="385D8A"/>
-                </a:solidFill>
-              </a:rPr>
-              <a:t> Binu </a:t>
+              <a:t>Mohammed Faisal</a:t>
             </a:r>
           </a:p>
           <a:p>
@@ -4860,28 +4960,44 @@
               <a:defRPr/>
             </a:pPr>
             <a:r>
-              <a:rPr lang="en-US" sz="1300" dirty="0">
+              <a:rPr lang="en-GB" sz="1300" dirty="0">
                 <a:solidFill>
                   <a:srgbClr val="385D8A"/>
                 </a:solidFill>
               </a:rPr>
-              <a:t>05/11/2024 – </a:t>
-            </a:r>
-            <a:r>
-              <a:rPr lang="en-US" sz="1300" dirty="0" err="1">
+              <a:t>12/11/2024 - </a:t>
+            </a:r>
+            <a:r>
+              <a:rPr lang="en-GB" sz="1300" dirty="0" err="1">
                 <a:solidFill>
                   <a:srgbClr val="385D8A"/>
                 </a:solidFill>
               </a:rPr>
-              <a:t>Sanoob</a:t>
-            </a:r>
-            <a:r>
-              <a:rPr lang="en-US" sz="1300" dirty="0">
+              <a:t>Ejas</a:t>
+            </a:r>
+            <a:r>
+              <a:rPr lang="en-GB" sz="1300" dirty="0">
                 <a:solidFill>
                   <a:srgbClr val="385D8A"/>
                 </a:solidFill>
               </a:rPr>
-              <a:t> S</a:t>
+              <a:t> </a:t>
+            </a:r>
+            <a:r>
+              <a:rPr lang="en-GB" sz="1300" dirty="0" err="1">
+                <a:solidFill>
+                  <a:srgbClr val="385D8A"/>
+                </a:solidFill>
+              </a:rPr>
+              <a:t>Ahammed</a:t>
+            </a:r>
+            <a:r>
+              <a:rPr lang="en-GB" sz="1300" dirty="0">
+                <a:solidFill>
+                  <a:srgbClr val="385D8A"/>
+                </a:solidFill>
+              </a:rPr>
+              <a:t> M R</a:t>
             </a:r>
           </a:p>
           <a:p>
@@ -4895,12 +5011,28 @@
               <a:defRPr/>
             </a:pPr>
             <a:r>
-              <a:rPr lang="en-US" sz="1300" dirty="0">
+              <a:rPr lang="en-GB" sz="1300" dirty="0">
                 <a:solidFill>
                   <a:srgbClr val="385D8A"/>
                 </a:solidFill>
               </a:rPr>
-              <a:t>06/11/2024 – Vyshnav N V</a:t>
+              <a:t>13/11/2024 - </a:t>
+            </a:r>
+            <a:r>
+              <a:rPr lang="en-GB" sz="1300" dirty="0" err="1">
+                <a:solidFill>
+                  <a:srgbClr val="385D8A"/>
+                </a:solidFill>
+              </a:rPr>
+              <a:t>Remson</a:t>
+            </a:r>
+            <a:r>
+              <a:rPr lang="en-GB" sz="1300" dirty="0">
+                <a:solidFill>
+                  <a:srgbClr val="385D8A"/>
+                </a:solidFill>
+              </a:rPr>
+              <a:t> P J</a:t>
             </a:r>
           </a:p>
           <a:p>
@@ -4914,29 +5046,61 @@
               <a:defRPr/>
             </a:pPr>
             <a:r>
-              <a:rPr lang="en-US" sz="1300" dirty="0">
+              <a:rPr lang="en-GB" sz="1300" dirty="0">
                 <a:solidFill>
                   <a:srgbClr val="385D8A"/>
                 </a:solidFill>
               </a:rPr>
-              <a:t>07/11/2024 -</a:t>
-            </a:r>
-            <a:r>
-              <a:rPr lang="en-US" sz="1300" dirty="0" err="1">
+              <a:t>14/11/2024 - Mohammed </a:t>
+            </a:r>
+            <a:r>
+              <a:rPr lang="en-GB" sz="1300" dirty="0" err="1">
                 <a:solidFill>
                   <a:srgbClr val="385D8A"/>
                 </a:solidFill>
               </a:rPr>
-              <a:t>Jensil</a:t>
-            </a:r>
-            <a:r>
-              <a:rPr lang="en-US" sz="1300" dirty="0">
+              <a:t>Rasik</a:t>
+            </a:r>
+            <a:r>
+              <a:rPr lang="en-GB" sz="1300" dirty="0">
                 <a:solidFill>
                   <a:srgbClr val="385D8A"/>
                 </a:solidFill>
               </a:rPr>
-              <a:t> Mansoor PJ</a:t>
-            </a:r>
+              <a:t> K</a:t>
+            </a:r>
+          </a:p>
+          <a:p>
+            <a:pPr marL="723900" lvl="2" indent="-188913" defTabSz="839694">
+              <a:buClr>
+                <a:srgbClr val="00B0F0"/>
+              </a:buClr>
+              <a:buSzPct val="75000"/>
+              <a:buFont typeface="Wingdings 3" panose="05040102010807070707" pitchFamily="18" charset="2"/>
+              <a:buChar char="u"/>
+              <a:defRPr/>
+            </a:pPr>
+            <a:r>
+              <a:rPr lang="en-GB" sz="1300" dirty="0">
+                <a:solidFill>
+                  <a:srgbClr val="385D8A"/>
+                </a:solidFill>
+              </a:rPr>
+              <a:t>15/11/2024 - Akhil </a:t>
+            </a:r>
+            <a:r>
+              <a:rPr lang="en-GB" sz="1300" dirty="0" err="1">
+                <a:solidFill>
+                  <a:srgbClr val="385D8A"/>
+                </a:solidFill>
+              </a:rPr>
+              <a:t>Auguestine</a:t>
+            </a:r>
+            <a:endParaRPr lang="en-GB" sz="1300" dirty="0">
+              <a:solidFill>
+                <a:srgbClr val="385D8A"/>
+              </a:solidFill>
+            </a:endParaRPr>
           </a:p>
           <a:p>
             <a:pPr marL="723900" lvl="2" indent="-188913" defTabSz="839694">
@@ -5034,7 +5198,7 @@
         <p:spPr>
           <a:xfrm>
             <a:off x="6076649" y="3672218"/>
-            <a:ext cx="5480904" cy="4493538"/>
+            <a:ext cx="5480904" cy="5801588"/>
           </a:xfrm>
           <a:prstGeom prst="rect">
             <a:avLst/>
@@ -5069,19 +5233,16 @@
               <a:buChar char="u"/>
               <a:defRPr/>
             </a:pPr>
-            <a:r>
-              <a:rPr lang="en-US" sz="1300" dirty="0">
-                <a:solidFill>
-                  <a:srgbClr val="385D8A"/>
-                </a:solidFill>
-                <a:hlinkClick r:id="rId3"/>
-              </a:rPr>
-              <a:t>https://beinexmicrosoft-my.sharepoint.com/:u:/g/personal/dilna_dileep_beinex_com/EVztI3Sa439Km2bdghMKCz8BX5Js6QAutI3lgL3gOI0vKA?e=RSP43o</a:t>
-            </a:r>
-            <a:endParaRPr lang="en-US" sz="1300" dirty="0">
-              <a:solidFill>
-                <a:srgbClr val="385D8A"/>
-              </a:solidFill>
+            <a:endParaRPr kumimoji="0" lang="en-US" altLang="en-US" sz="1100" b="0" i="0" u="none" strike="noStrike" cap="none" normalizeH="0" baseline="0" dirty="0">
+              <a:ln>
+                <a:noFill/>
+              </a:ln>
+              <a:solidFill>
+                <a:schemeClr val="tx1"/>
+              </a:solidFill>
+              <a:effectLst/>
+              <a:latin typeface="Arial" panose="020B0604020202020204" pitchFamily="34" charset="0"/>
+              <a:hlinkClick r:id="rId3"/>
             </a:endParaRPr>
           </a:p>
           <a:p>
@@ -5095,18 +5256,28 @@
               <a:defRPr/>
             </a:pPr>
             <a:r>
-              <a:rPr lang="en-US" sz="1300" dirty="0">
-                <a:solidFill>
-                  <a:srgbClr val="385D8A"/>
-                </a:solidFill>
-                <a:hlinkClick r:id="rId4"/>
-              </a:rPr>
-              <a:t>https://beinexmicrosoft-my.sharepoint.com/:u:/g/personal/dilna_dileep_beinex_com/EewgYDTMxJZOvTZIUm3snXkBYs0z3qxo0u-J5ndQSI6frg?e=VSyF44</a:t>
-            </a:r>
-            <a:endParaRPr lang="en-US" sz="1300" dirty="0">
-              <a:solidFill>
-                <a:srgbClr val="385D8A"/>
-              </a:solidFill>
+              <a:rPr kumimoji="0" lang="en-US" altLang="en-US" sz="1300" b="0" i="0" u="none" strike="noStrike" cap="none" normalizeH="0" baseline="0" dirty="0">
+                <a:ln>
+                  <a:noFill/>
+                </a:ln>
+                <a:solidFill>
+                  <a:schemeClr val="tx1"/>
+                </a:solidFill>
+                <a:effectLst/>
+                <a:latin typeface="Arial" panose="020B0604020202020204" pitchFamily="34" charset="0"/>
+                <a:hlinkClick r:id="rId3"/>
+              </a:rPr>
+              <a:t>Angular Day8.zip</a:t>
+            </a:r>
+            <a:endParaRPr kumimoji="0" lang="en-US" altLang="en-US" sz="1300" b="0" i="0" u="none" strike="noStrike" cap="none" normalizeH="0" baseline="0" dirty="0">
+              <a:ln>
+                <a:noFill/>
+              </a:ln>
+              <a:solidFill>
+                <a:schemeClr val="tx1"/>
+              </a:solidFill>
+              <a:effectLst/>
+              <a:latin typeface="Arial" panose="020B0604020202020204" pitchFamily="34" charset="0"/>
             </a:endParaRPr>
           </a:p>
           <a:p>
@@ -5119,19 +5290,8 @@
               <a:buChar char="u"/>
               <a:defRPr/>
             </a:pPr>
-            <a:r>
-              <a:rPr lang="en-US" sz="1300" dirty="0">
-                <a:solidFill>
-                  <a:srgbClr val="385D8A"/>
-                </a:solidFill>
-                <a:hlinkClick r:id="rId5"/>
-              </a:rPr>
-              <a:t>https://beinexmicrosoft-my.sharepoint.com/:u:/g/personal/dilna_dileep_beinex_com/EcciNgsnR-lLpLy1IDSYNYUB2huQ5RjKuFGpvNURrcOFgg?e=5Z9hyh</a:t>
-            </a:r>
-            <a:endParaRPr lang="en-US" sz="1300" dirty="0">
-              <a:solidFill>
-                <a:srgbClr val="385D8A"/>
-              </a:solidFill>
+            <a:endParaRPr lang="en-US" altLang="en-US" sz="1300" dirty="0">
+              <a:latin typeface="Arial" panose="020B0604020202020204" pitchFamily="34" charset="0"/>
             </a:endParaRPr>
           </a:p>
           <a:p>
@@ -5145,18 +5305,28 @@
               <a:defRPr/>
             </a:pPr>
             <a:r>
-              <a:rPr lang="en-US" sz="1300" dirty="0">
-                <a:solidFill>
-                  <a:srgbClr val="385D8A"/>
-                </a:solidFill>
-                <a:hlinkClick r:id="rId6"/>
-              </a:rPr>
-              <a:t>https://beinexmicrosoft-my.sharepoint.com/:u:/g/personal/dilna_dileep_beinex_com/Edpl7dkkeTVEuyZASPPpRMkBrL1HVk2gPXJ_AzIAytL5Bw?e=hUsuvz</a:t>
-            </a:r>
-            <a:endParaRPr lang="en-US" sz="1300" dirty="0">
-              <a:solidFill>
-                <a:srgbClr val="385D8A"/>
-              </a:solidFill>
+              <a:rPr kumimoji="0" lang="en-US" altLang="en-US" sz="1300" b="0" i="0" u="none" strike="noStrike" cap="none" normalizeH="0" baseline="0" dirty="0">
+                <a:ln>
+                  <a:noFill/>
+                </a:ln>
+                <a:solidFill>
+                  <a:schemeClr val="tx1"/>
+                </a:solidFill>
+                <a:effectLst/>
+                <a:latin typeface="Arial" panose="020B0604020202020204" pitchFamily="34" charset="0"/>
+                <a:hlinkClick r:id="rId4"/>
+              </a:rPr>
+              <a:t>Angular Day9.zip</a:t>
+            </a:r>
+            <a:endParaRPr kumimoji="0" lang="en-US" altLang="en-US" sz="1300" b="0" i="0" u="none" strike="noStrike" cap="none" normalizeH="0" baseline="0" dirty="0">
+              <a:ln>
+                <a:noFill/>
+              </a:ln>
+              <a:solidFill>
+                <a:schemeClr val="tx1"/>
+              </a:solidFill>
+              <a:effectLst/>
+              <a:latin typeface="Arial" panose="020B0604020202020204" pitchFamily="34" charset="0"/>
             </a:endParaRPr>
           </a:p>
           <a:p>
@@ -5169,10 +5339,8 @@
               <a:buChar char="u"/>
               <a:defRPr/>
             </a:pPr>
-            <a:endParaRPr lang="en-US" sz="1300" dirty="0">
-              <a:solidFill>
-                <a:srgbClr val="385D8A"/>
-              </a:solidFill>
+            <a:endParaRPr lang="en-US" altLang="en-US" sz="1300" dirty="0">
+              <a:latin typeface="Arial" panose="020B0604020202020204" pitchFamily="34" charset="0"/>
             </a:endParaRPr>
           </a:p>
           <a:p>
@@ -5185,10 +5353,29 @@
               <a:buChar char="u"/>
               <a:defRPr/>
             </a:pPr>
-            <a:endParaRPr lang="en-US" sz="1300" dirty="0">
-              <a:solidFill>
-                <a:srgbClr val="385D8A"/>
-              </a:solidFill>
+            <a:r>
+              <a:rPr kumimoji="0" lang="en-US" altLang="en-US" sz="1400" b="0" i="0" u="none" strike="noStrike" cap="none" normalizeH="0" baseline="0" dirty="0">
+                <a:ln>
+                  <a:noFill/>
+                </a:ln>
+                <a:solidFill>
+                  <a:schemeClr val="tx1"/>
+                </a:solidFill>
+                <a:effectLst/>
+                <a:latin typeface="Arial" panose="020B0604020202020204" pitchFamily="34" charset="0"/>
+                <a:hlinkClick r:id="rId5"/>
+              </a:rPr>
+              <a:t>angular_Directives.zip</a:t>
+            </a:r>
+            <a:endParaRPr kumimoji="0" lang="en-US" altLang="en-US" sz="1400" b="0" i="0" u="none" strike="noStrike" cap="none" normalizeH="0" baseline="0" dirty="0">
+              <a:ln>
+                <a:noFill/>
+              </a:ln>
+              <a:solidFill>
+                <a:schemeClr val="tx1"/>
+              </a:solidFill>
+              <a:effectLst/>
+              <a:latin typeface="Arial" panose="020B0604020202020204" pitchFamily="34" charset="0"/>
             </a:endParaRPr>
           </a:p>
           <a:p>
@@ -5201,10 +5388,8 @@
               <a:buChar char="u"/>
               <a:defRPr/>
             </a:pPr>
-            <a:endParaRPr lang="en-US" sz="1300" dirty="0">
-              <a:solidFill>
-                <a:srgbClr val="385D8A"/>
-              </a:solidFill>
+            <a:endParaRPr lang="en-US" altLang="en-US" sz="1300" dirty="0">
+              <a:latin typeface="Arial" panose="020B0604020202020204" pitchFamily="34" charset="0"/>
             </a:endParaRPr>
           </a:p>
           <a:p>
@@ -5217,10 +5402,29 @@
               <a:buChar char="u"/>
               <a:defRPr/>
             </a:pPr>
-            <a:endParaRPr lang="en-US" sz="1300" dirty="0">
-              <a:solidFill>
-                <a:srgbClr val="385D8A"/>
-              </a:solidFill>
+            <a:r>
+              <a:rPr kumimoji="0" lang="en-US" altLang="en-US" sz="1300" b="0" i="0" u="none" strike="noStrike" cap="none" normalizeH="0" baseline="0" dirty="0">
+                <a:ln>
+                  <a:noFill/>
+                </a:ln>
+                <a:solidFill>
+                  <a:schemeClr val="tx1"/>
+                </a:solidFill>
+                <a:effectLst/>
+                <a:latin typeface="Arial" panose="020B0604020202020204" pitchFamily="34" charset="0"/>
+                <a:hlinkClick r:id="rId6"/>
+              </a:rPr>
+              <a:t>Angular Day11.zip</a:t>
+            </a:r>
+            <a:endParaRPr kumimoji="0" lang="en-US" altLang="en-US" sz="1300" b="0" i="0" u="none" strike="noStrike" cap="none" normalizeH="0" baseline="0" dirty="0">
+              <a:ln>
+                <a:noFill/>
+              </a:ln>
+              <a:solidFill>
+                <a:schemeClr val="tx1"/>
+              </a:solidFill>
+              <a:effectLst/>
+              <a:latin typeface="Arial" panose="020B0604020202020204" pitchFamily="34" charset="0"/>
             </a:endParaRPr>
           </a:p>
           <a:p>
@@ -5233,10 +5437,8 @@
               <a:buChar char="u"/>
               <a:defRPr/>
             </a:pPr>
-            <a:endParaRPr lang="en-US" sz="1300" dirty="0">
-              <a:solidFill>
-                <a:srgbClr val="385D8A"/>
-              </a:solidFill>
+            <a:endParaRPr lang="en-US" altLang="en-US" sz="1300" dirty="0">
+              <a:latin typeface="Arial" panose="020B0604020202020204" pitchFamily="34" charset="0"/>
             </a:endParaRPr>
           </a:p>
           <a:p>
@@ -5249,10 +5451,29 @@
               <a:buChar char="u"/>
               <a:defRPr/>
             </a:pPr>
-            <a:endParaRPr lang="en-US" sz="1300" dirty="0">
-              <a:solidFill>
-                <a:srgbClr val="385D8A"/>
-              </a:solidFill>
+            <a:r>
+              <a:rPr kumimoji="0" lang="en-US" altLang="en-US" sz="1300" b="0" i="0" u="none" strike="noStrike" cap="none" normalizeH="0" baseline="0" dirty="0">
+                <a:ln>
+                  <a:noFill/>
+                </a:ln>
+                <a:solidFill>
+                  <a:schemeClr val="tx1"/>
+                </a:solidFill>
+                <a:effectLst/>
+                <a:latin typeface="Arial" panose="020B0604020202020204" pitchFamily="34" charset="0"/>
+                <a:hlinkClick r:id="rId7"/>
+              </a:rPr>
+              <a:t>Angular Day12.zip</a:t>
+            </a:r>
+            <a:endParaRPr kumimoji="0" lang="en-US" altLang="en-US" sz="1300" b="0" i="0" u="none" strike="noStrike" cap="none" normalizeH="0" baseline="0" dirty="0">
+              <a:ln>
+                <a:noFill/>
+              </a:ln>
+              <a:solidFill>
+                <a:schemeClr val="tx1"/>
+              </a:solidFill>
+              <a:effectLst/>
+              <a:latin typeface="Arial" panose="020B0604020202020204" pitchFamily="34" charset="0"/>
             </a:endParaRPr>
           </a:p>
           <a:p>
@@ -5265,10 +5486,15 @@
               <a:buChar char="u"/>
               <a:defRPr/>
             </a:pPr>
-            <a:endParaRPr lang="en-US" sz="1300" dirty="0">
-              <a:solidFill>
-                <a:srgbClr val="385D8A"/>
-              </a:solidFill>
+            <a:endParaRPr kumimoji="0" lang="en-US" altLang="en-US" sz="1300" b="0" i="0" u="none" strike="noStrike" cap="none" normalizeH="0" baseline="0" dirty="0">
+              <a:ln>
+                <a:noFill/>
+              </a:ln>
+              <a:solidFill>
+                <a:schemeClr val="tx1"/>
+              </a:solidFill>
+              <a:effectLst/>
+              <a:latin typeface="Arial" panose="020B0604020202020204" pitchFamily="34" charset="0"/>
             </a:endParaRPr>
           </a:p>
           <a:p>
@@ -5281,10 +5507,15 @@
               <a:buChar char="u"/>
               <a:defRPr/>
             </a:pPr>
-            <a:endParaRPr lang="en-US" sz="1300" dirty="0">
-              <a:solidFill>
-                <a:srgbClr val="385D8A"/>
-              </a:solidFill>
+            <a:endParaRPr kumimoji="0" lang="en-US" altLang="en-US" sz="1300" b="0" i="0" u="none" strike="noStrike" cap="none" normalizeH="0" baseline="0" dirty="0">
+              <a:ln>
+                <a:noFill/>
+              </a:ln>
+              <a:solidFill>
+                <a:schemeClr val="tx1"/>
+              </a:solidFill>
+              <a:effectLst/>
+              <a:latin typeface="Arial" panose="020B0604020202020204" pitchFamily="34" charset="0"/>
             </a:endParaRPr>
           </a:p>
           <a:p>
@@ -5297,10 +5528,456 @@
               <a:buChar char="u"/>
               <a:defRPr/>
             </a:pPr>
-            <a:endParaRPr lang="en-US" sz="1300" dirty="0">
-              <a:solidFill>
-                <a:srgbClr val="385D8A"/>
-              </a:solidFill>
+            <a:endParaRPr kumimoji="0" lang="en-US" altLang="en-US" sz="1300" b="0" i="0" u="none" strike="noStrike" cap="none" normalizeH="0" baseline="0" dirty="0">
+              <a:ln>
+                <a:noFill/>
+              </a:ln>
+              <a:solidFill>
+                <a:schemeClr val="tx1"/>
+              </a:solidFill>
+              <a:effectLst/>
+              <a:latin typeface="Arial" panose="020B0604020202020204" pitchFamily="34" charset="0"/>
+            </a:endParaRPr>
+          </a:p>
+          <a:p>
+            <a:pPr marL="723900" lvl="2" indent="-188913" defTabSz="839694">
+              <a:buClr>
+                <a:srgbClr val="00B0F0"/>
+              </a:buClr>
+              <a:buSzPct val="75000"/>
+              <a:buFont typeface="Wingdings 3" panose="05040102010807070707" pitchFamily="18" charset="2"/>
+              <a:buChar char="u"/>
+              <a:defRPr/>
+            </a:pPr>
+            <a:endParaRPr kumimoji="0" lang="en-US" altLang="en-US" sz="1300" b="0" i="0" u="none" strike="noStrike" cap="none" normalizeH="0" baseline="0" dirty="0">
+              <a:ln>
+                <a:noFill/>
+              </a:ln>
+              <a:solidFill>
+                <a:schemeClr val="tx1"/>
+              </a:solidFill>
+              <a:effectLst/>
+              <a:latin typeface="Arial" panose="020B0604020202020204" pitchFamily="34" charset="0"/>
+            </a:endParaRPr>
+          </a:p>
+          <a:p>
+            <a:pPr marL="723900" lvl="2" indent="-188913" defTabSz="839694">
+              <a:buClr>
+                <a:srgbClr val="00B0F0"/>
+              </a:buClr>
+              <a:buSzPct val="75000"/>
+              <a:buFont typeface="Wingdings 3" panose="05040102010807070707" pitchFamily="18" charset="2"/>
+              <a:buChar char="u"/>
+              <a:defRPr/>
+            </a:pPr>
+            <a:endParaRPr lang="en-US" altLang="en-US" sz="1300" dirty="0">
+              <a:latin typeface="Arial" panose="020B0604020202020204" pitchFamily="34" charset="0"/>
+            </a:endParaRPr>
+          </a:p>
+          <a:p>
+            <a:pPr marL="723900" lvl="2" indent="-188913" defTabSz="839694">
+              <a:buClr>
+                <a:srgbClr val="00B0F0"/>
+              </a:buClr>
+              <a:buSzPct val="75000"/>
+              <a:buFont typeface="Wingdings 3" panose="05040102010807070707" pitchFamily="18" charset="2"/>
+              <a:buChar char="u"/>
+              <a:defRPr/>
+            </a:pPr>
+            <a:endParaRPr kumimoji="0" lang="en-US" altLang="en-US" sz="1300" b="0" i="0" u="none" strike="noStrike" cap="none" normalizeH="0" baseline="0" dirty="0">
+              <a:ln>
+                <a:noFill/>
+              </a:ln>
+              <a:solidFill>
+                <a:schemeClr val="tx1"/>
+              </a:solidFill>
+              <a:effectLst/>
+              <a:latin typeface="Arial" panose="020B0604020202020204" pitchFamily="34" charset="0"/>
+            </a:endParaRPr>
+          </a:p>
+          <a:p>
+            <a:pPr marL="723900" lvl="2" indent="-188913" defTabSz="839694">
+              <a:buClr>
+                <a:srgbClr val="00B0F0"/>
+              </a:buClr>
+              <a:buSzPct val="75000"/>
+              <a:buFont typeface="Wingdings 3" panose="05040102010807070707" pitchFamily="18" charset="2"/>
+              <a:buChar char="u"/>
+              <a:defRPr/>
+            </a:pPr>
+            <a:endParaRPr kumimoji="0" lang="en-US" altLang="en-US" sz="1300" b="0" i="0" u="none" strike="noStrike" cap="none" normalizeH="0" baseline="0" dirty="0">
+              <a:ln>
+                <a:noFill/>
+              </a:ln>
+              <a:solidFill>
+                <a:schemeClr val="tx1"/>
+              </a:solidFill>
+              <a:effectLst/>
+              <a:latin typeface="Arial" panose="020B0604020202020204" pitchFamily="34" charset="0"/>
+            </a:endParaRPr>
+          </a:p>
+          <a:p>
+            <a:pPr marL="723900" lvl="2" indent="-188913" defTabSz="839694">
+              <a:buClr>
+                <a:srgbClr val="00B0F0"/>
+              </a:buClr>
+              <a:buSzPct val="75000"/>
+              <a:buFont typeface="Wingdings 3" panose="05040102010807070707" pitchFamily="18" charset="2"/>
+              <a:buChar char="u"/>
+              <a:defRPr/>
+            </a:pPr>
+            <a:endParaRPr lang="en-US" sz="1100" dirty="0">
+              <a:solidFill>
+                <a:srgbClr val="385D8A"/>
+              </a:solidFill>
+            </a:endParaRPr>
+          </a:p>
+          <a:p>
+            <a:pPr marL="723900" lvl="2" indent="-188913" defTabSz="839694">
+              <a:buClr>
+                <a:srgbClr val="00B0F0"/>
+              </a:buClr>
+              <a:buSzPct val="75000"/>
+              <a:buFont typeface="Wingdings 3" panose="05040102010807070707" pitchFamily="18" charset="2"/>
+              <a:buChar char="u"/>
+              <a:defRPr/>
+            </a:pPr>
+            <a:endParaRPr lang="en-US" sz="1100" dirty="0">
+              <a:solidFill>
+                <a:srgbClr val="385D8A"/>
+              </a:solidFill>
+            </a:endParaRPr>
+          </a:p>
+          <a:p>
+            <a:pPr marL="723900" lvl="2" indent="-188913" defTabSz="839694">
+              <a:buClr>
+                <a:srgbClr val="00B0F0"/>
+              </a:buClr>
+              <a:buSzPct val="75000"/>
+              <a:buFont typeface="Wingdings 3" panose="05040102010807070707" pitchFamily="18" charset="2"/>
+              <a:buChar char="u"/>
+              <a:defRPr/>
+            </a:pPr>
+            <a:endParaRPr lang="en-US" sz="1100" dirty="0">
+              <a:solidFill>
+                <a:srgbClr val="385D8A"/>
+              </a:solidFill>
+            </a:endParaRPr>
+          </a:p>
+          <a:p>
+            <a:pPr marL="723900" lvl="2" indent="-188913" defTabSz="839694">
+              <a:buClr>
+                <a:srgbClr val="00B0F0"/>
+              </a:buClr>
+              <a:buSzPct val="75000"/>
+              <a:buFont typeface="Wingdings 3" panose="05040102010807070707" pitchFamily="18" charset="2"/>
+              <a:buChar char="u"/>
+              <a:defRPr/>
+            </a:pPr>
+            <a:endParaRPr lang="en-US" sz="1300" dirty="0">
+              <a:solidFill>
+                <a:srgbClr val="385D8A"/>
+              </a:solidFill>
+            </a:endParaRPr>
+          </a:p>
+          <a:p>
+            <a:pPr marL="723900" lvl="2" indent="-188913" defTabSz="839694">
+              <a:buClr>
+                <a:srgbClr val="00B0F0"/>
+              </a:buClr>
+              <a:buSzPct val="75000"/>
+              <a:buFont typeface="Wingdings 3" panose="05040102010807070707" pitchFamily="18" charset="2"/>
+              <a:buChar char="u"/>
+              <a:defRPr/>
+            </a:pPr>
+            <a:endParaRPr lang="en-US" sz="1300" dirty="0">
+              <a:solidFill>
+                <a:srgbClr val="385D8A"/>
+              </a:solidFill>
+            </a:endParaRPr>
+          </a:p>
+          <a:p>
+            <a:pPr marL="723900" lvl="2" indent="-188913" defTabSz="839694">
+              <a:buClr>
+                <a:srgbClr val="00B0F0"/>
+              </a:buClr>
+              <a:buSzPct val="75000"/>
+              <a:buFont typeface="Wingdings 3" panose="05040102010807070707" pitchFamily="18" charset="2"/>
+              <a:buChar char="u"/>
+              <a:defRPr/>
+            </a:pPr>
+            <a:endParaRPr lang="en-US" sz="1300" dirty="0">
+              <a:solidFill>
+                <a:srgbClr val="385D8A"/>
+              </a:solidFill>
+            </a:endParaRPr>
+          </a:p>
+          <a:p>
+            <a:pPr marL="723900" lvl="2" indent="-188913" defTabSz="839694">
+              <a:buClr>
+                <a:srgbClr val="00B0F0"/>
+              </a:buClr>
+              <a:buSzPct val="75000"/>
+              <a:buFont typeface="Wingdings 3" panose="05040102010807070707" pitchFamily="18" charset="2"/>
+              <a:buChar char="u"/>
+              <a:defRPr/>
+            </a:pPr>
+            <a:endParaRPr lang="en-US" sz="1300" dirty="0">
+              <a:solidFill>
+                <a:srgbClr val="385D8A"/>
+              </a:solidFill>
+            </a:endParaRPr>
+          </a:p>
+          <a:p>
+            <a:pPr marL="723900" lvl="2" indent="-188913" defTabSz="839694">
+              <a:buClr>
+                <a:srgbClr val="00B0F0"/>
+              </a:buClr>
+              <a:buSzPct val="75000"/>
+              <a:buFont typeface="Wingdings 3" panose="05040102010807070707" pitchFamily="18" charset="2"/>
+              <a:buChar char="u"/>
+              <a:defRPr/>
+            </a:pPr>
+            <a:endParaRPr lang="en-US" sz="1300" dirty="0">
+              <a:solidFill>
+                <a:srgbClr val="385D8A"/>
+              </a:solidFill>
+            </a:endParaRPr>
+          </a:p>
+          <a:p>
+            <a:pPr marL="723900" lvl="2" indent="-188913" defTabSz="839694">
+              <a:buClr>
+                <a:srgbClr val="00B0F0"/>
+              </a:buClr>
+              <a:buSzPct val="75000"/>
+              <a:buFont typeface="Wingdings 3" panose="05040102010807070707" pitchFamily="18" charset="2"/>
+              <a:buChar char="u"/>
+              <a:defRPr/>
+            </a:pPr>
+            <a:endParaRPr lang="en-US" sz="1300" dirty="0">
+              <a:solidFill>
+                <a:srgbClr val="385D8A"/>
+              </a:solidFill>
+            </a:endParaRPr>
+          </a:p>
+          <a:p>
+            <a:pPr marL="723900" lvl="2" indent="-188913" defTabSz="839694">
+              <a:buClr>
+                <a:srgbClr val="00B0F0"/>
+              </a:buClr>
+              <a:buSzPct val="75000"/>
+              <a:buFont typeface="Wingdings 3" panose="05040102010807070707" pitchFamily="18" charset="2"/>
+              <a:buChar char="u"/>
+              <a:defRPr/>
+            </a:pPr>
+            <a:endParaRPr lang="en-US" sz="1300" dirty="0">
+              <a:solidFill>
+                <a:srgbClr val="385D8A"/>
+              </a:solidFill>
+            </a:endParaRPr>
+          </a:p>
+          <a:p>
+            <a:pPr marL="723900" lvl="2" indent="-188913" defTabSz="839694">
+              <a:buClr>
+                <a:srgbClr val="00B0F0"/>
+              </a:buClr>
+              <a:buSzPct val="75000"/>
+              <a:buFont typeface="Wingdings 3" panose="05040102010807070707" pitchFamily="18" charset="2"/>
+              <a:buChar char="u"/>
+              <a:defRPr/>
+            </a:pPr>
+            <a:endParaRPr lang="en-US" sz="1300" dirty="0">
+              <a:solidFill>
+                <a:srgbClr val="385D8A"/>
+              </a:solidFill>
+            </a:endParaRPr>
+          </a:p>
+        </p:txBody>
+      </p:sp>
+      <p:sp>
+        <p:nvSpPr>
+          <p:cNvPr id="4" name="Rectangle 1">
+            <a:extLst>
+              <a:ext uri="{FF2B5EF4-FFF2-40B4-BE49-F238E27FC236}">
+                <a16:creationId xmlns:a16="http://schemas.microsoft.com/office/drawing/2014/main" id="{A218CF37-7F70-DB34-9719-9873BEF253D7}"/>
+              </a:ext>
+            </a:extLst>
+          </p:cNvPr>
+          <p:cNvSpPr>
+            <a:spLocks noChangeArrowheads="1"/>
+          </p:cNvSpPr>
+          <p:nvPr/>
+        </p:nvSpPr>
+        <p:spPr bwMode="auto">
+          <a:xfrm>
+            <a:off x="0" y="-184666"/>
+            <a:ext cx="12192000" cy="369332"/>
+          </a:xfrm>
+          <a:prstGeom prst="rect">
+            <a:avLst/>
+          </a:prstGeom>
+          <a:noFill/>
+          <a:ln>
+            <a:noFill/>
+          </a:ln>
+          <a:effectLst/>
+          <a:extLst>
+            <a:ext uri="{909E8E84-426E-40DD-AFC4-6F175D3DCCD1}">
+              <a14:hiddenFill xmlns:a14="http://schemas.microsoft.com/office/drawing/2010/main">
+                <a:solidFill>
+                  <a:schemeClr val="accent1"/>
+                </a:solidFill>
+              </a14:hiddenFill>
+            </a:ext>
+            <a:ext uri="{91240B29-F687-4F45-9708-019B960494DF}">
+              <a14:hiddenLine xmlns:a14="http://schemas.microsoft.com/office/drawing/2010/main" w="9525">
+                <a:solidFill>
+                  <a:schemeClr val="tx1"/>
+                </a:solidFill>
+                <a:miter lim="800000"/>
+                <a:headEnd/>
+                <a:tailEnd/>
+              </a14:hiddenLine>
+            </a:ext>
+            <a:ext uri="{AF507438-7753-43E0-B8FC-AC1667EBCBE1}">
+              <a14:hiddenEffects xmlns:a14="http://schemas.microsoft.com/office/drawing/2010/main">
+                <a:effectLst>
+                  <a:outerShdw dist="35921" dir="2700000" algn="ctr" rotWithShape="0">
+                    <a:schemeClr val="bg2"/>
+                  </a:outerShdw>
+                </a:effectLst>
+              </a14:hiddenEffects>
+            </a:ext>
+          </a:extLst>
+        </p:spPr>
+        <p:txBody>
+          <a:bodyPr vert="horz" wrap="square" lIns="91440" tIns="45720" rIns="91440" bIns="45720" numCol="1" anchor="ctr" anchorCtr="0" compatLnSpc="1">
+            <a:prstTxWarp prst="textNoShape">
+              <a:avLst/>
+            </a:prstTxWarp>
+            <a:spAutoFit/>
+          </a:bodyPr>
+          <a:lstStyle/>
+          <a:p>
+            <a:pPr marL="0" marR="0" lvl="0" indent="0" algn="l" defTabSz="914400" rtl="0" eaLnBrk="0" fontAlgn="base" latinLnBrk="0" hangingPunct="0">
+              <a:lnSpc>
+                <a:spcPct val="100000"/>
+              </a:lnSpc>
+              <a:spcBef>
+                <a:spcPct val="0"/>
+              </a:spcBef>
+              <a:spcAft>
+                <a:spcPct val="0"/>
+              </a:spcAft>
+              <a:buClrTx/>
+              <a:buSzTx/>
+              <a:buFontTx/>
+              <a:buNone/>
+              <a:tabLst/>
+            </a:pPr>
+            <a:endParaRPr kumimoji="0" lang="en-US" altLang="en-US" sz="1800" b="0" i="0" u="none" strike="noStrike" cap="none" normalizeH="0" baseline="0" dirty="0">
+              <a:ln>
+                <a:noFill/>
+              </a:ln>
+              <a:solidFill>
+                <a:schemeClr val="tx1"/>
+              </a:solidFill>
+              <a:effectLst/>
+              <a:latin typeface="Arial" panose="020B0604020202020204" pitchFamily="34" charset="0"/>
+            </a:endParaRPr>
+          </a:p>
+        </p:txBody>
+      </p:sp>
+      <p:sp>
+        <p:nvSpPr>
+          <p:cNvPr id="5" name="Rectangle 1">
+            <a:extLst>
+              <a:ext uri="{FF2B5EF4-FFF2-40B4-BE49-F238E27FC236}">
+                <a16:creationId xmlns:a16="http://schemas.microsoft.com/office/drawing/2014/main" id="{10672F22-85C3-C8F0-579C-B12EFDC24D30}"/>
+              </a:ext>
+            </a:extLst>
+          </p:cNvPr>
+          <p:cNvSpPr>
+            <a:spLocks noChangeArrowheads="1"/>
+          </p:cNvSpPr>
+          <p:nvPr/>
+        </p:nvSpPr>
+        <p:spPr bwMode="auto">
+          <a:xfrm>
+            <a:off x="0" y="-184666"/>
+            <a:ext cx="12192000" cy="369332"/>
+          </a:xfrm>
+          <a:prstGeom prst="rect">
+            <a:avLst/>
+          </a:prstGeom>
+          <a:noFill/>
+          <a:ln>
+            <a:noFill/>
+          </a:ln>
+          <a:effectLst/>
+          <a:extLst>
+            <a:ext uri="{909E8E84-426E-40DD-AFC4-6F175D3DCCD1}">
+              <a14:hiddenFill xmlns:a14="http://schemas.microsoft.com/office/drawing/2010/main">
+                <a:solidFill>
+                  <a:schemeClr val="accent1"/>
+                </a:solidFill>
+              </a14:hiddenFill>
+            </a:ext>
+            <a:ext uri="{91240B29-F687-4F45-9708-019B960494DF}">
+              <a14:hiddenLine xmlns:a14="http://schemas.microsoft.com/office/drawing/2010/main" w="9525">
+                <a:solidFill>
+                  <a:schemeClr val="tx1"/>
+                </a:solidFill>
+                <a:miter lim="800000"/>
+                <a:headEnd/>
+                <a:tailEnd/>
+              </a14:hiddenLine>
+            </a:ext>
+            <a:ext uri="{AF507438-7753-43E0-B8FC-AC1667EBCBE1}">
+              <a14:hiddenEffects xmlns:a14="http://schemas.microsoft.com/office/drawing/2010/main">
+                <a:effectLst>
+                  <a:outerShdw dist="35921" dir="2700000" algn="ctr" rotWithShape="0">
+                    <a:schemeClr val="bg2"/>
+                  </a:outerShdw>
+                </a:effectLst>
+              </a14:hiddenEffects>
+            </a:ext>
+          </a:extLst>
+        </p:spPr>
+        <p:txBody>
+          <a:bodyPr vert="horz" wrap="square" lIns="91440" tIns="45720" rIns="91440" bIns="45720" numCol="1" anchor="ctr" anchorCtr="0" compatLnSpc="1">
+            <a:prstTxWarp prst="textNoShape">
+              <a:avLst/>
+            </a:prstTxWarp>
+            <a:spAutoFit/>
+          </a:bodyPr>
+          <a:lstStyle/>
+          <a:p>
+            <a:pPr marL="0" marR="0" lvl="0" indent="0" algn="l" defTabSz="914400" rtl="0" eaLnBrk="0" fontAlgn="base" latinLnBrk="0" hangingPunct="0">
+              <a:lnSpc>
+                <a:spcPct val="100000"/>
+              </a:lnSpc>
+              <a:spcBef>
+                <a:spcPct val="0"/>
+              </a:spcBef>
+              <a:spcAft>
+                <a:spcPct val="0"/>
+              </a:spcAft>
+              <a:buClrTx/>
+              <a:buSzTx/>
+              <a:buFontTx/>
+              <a:buNone/>
+              <a:tabLst/>
+            </a:pPr>
+            <a:endParaRPr kumimoji="0" lang="en-US" altLang="en-US" sz="1800" b="0" i="0" u="none" strike="noStrike" cap="none" normalizeH="0" baseline="0" dirty="0">
+              <a:ln>
+                <a:noFill/>
+              </a:ln>
+              <a:solidFill>
+                <a:schemeClr val="tx1"/>
+              </a:solidFill>
+              <a:effectLst/>
+              <a:latin typeface="Arial" panose="020B0604020202020204" pitchFamily="34" charset="0"/>
             </a:endParaRPr>
           </a:p>
         </p:txBody>
@@ -5620,7 +6297,7 @@
         <p:cNvPr id="1" name="">
           <a:extLst>
             <a:ext uri="{FF2B5EF4-FFF2-40B4-BE49-F238E27FC236}">
-              <a16:creationId xmlns:a16="http://schemas.microsoft.com/office/drawing/2014/main" id="{E39C4D38-08AF-7469-12D0-386BB37D2E1B}"/>
+              <a16:creationId xmlns:a16="http://schemas.microsoft.com/office/drawing/2014/main" id="{7419CEF8-CC1D-05AA-D737-28C04E8AB6D3}"/>
             </a:ext>
           </a:extLst>
         </p:cNvPr>
@@ -5640,7 +6317,7 @@
           <p:cNvPr id="33" name="Rectangle 32">
             <a:extLst>
               <a:ext uri="{FF2B5EF4-FFF2-40B4-BE49-F238E27FC236}">
-                <a16:creationId xmlns:a16="http://schemas.microsoft.com/office/drawing/2014/main" id="{2FBAA08D-87E1-60B0-756E-3FCD99483652}"/>
+                <a16:creationId xmlns:a16="http://schemas.microsoft.com/office/drawing/2014/main" id="{AED4D6DC-133B-5CC2-ED78-B8EDC4BD0FAF}"/>
               </a:ext>
             </a:extLst>
           </p:cNvPr>
@@ -5692,7 +6369,7 @@
           <p:cNvPr id="34" name="Rectangle 33">
             <a:extLst>
               <a:ext uri="{FF2B5EF4-FFF2-40B4-BE49-F238E27FC236}">
-                <a16:creationId xmlns:a16="http://schemas.microsoft.com/office/drawing/2014/main" id="{96B933E7-EE2F-0945-AF61-17F46B747AE8}"/>
+                <a16:creationId xmlns:a16="http://schemas.microsoft.com/office/drawing/2014/main" id="{DC0E2BED-FDA6-D625-E585-3C18C4F10276}"/>
               </a:ext>
             </a:extLst>
           </p:cNvPr>
@@ -5744,7 +6421,7 @@
           <p:cNvPr id="35" name="TextBox 34">
             <a:extLst>
               <a:ext uri="{FF2B5EF4-FFF2-40B4-BE49-F238E27FC236}">
-                <a16:creationId xmlns:a16="http://schemas.microsoft.com/office/drawing/2014/main" id="{CBA76445-41CD-B141-5B02-23F74216E3EA}"/>
+                <a16:creationId xmlns:a16="http://schemas.microsoft.com/office/drawing/2014/main" id="{E99D8470-9200-5F47-8F32-20A30792BBFE}"/>
               </a:ext>
             </a:extLst>
           </p:cNvPr>
@@ -5781,7 +6458,7 @@
                   <a:srgbClr val="0070C0"/>
                 </a:solidFill>
               </a:rPr>
-              <a:t>Week 4 (28/10/2024 - 01/11/2024)</a:t>
+              <a:t>Week 5 (04/11/2024 - 08/11/2024)</a:t>
             </a:r>
           </a:p>
           <a:p>
@@ -5798,7 +6475,7 @@
           <p:cNvPr id="36" name="Picture 35" descr="A picture containing clipart&#10;&#10;Description generated with very high confidence">
             <a:extLst>
               <a:ext uri="{FF2B5EF4-FFF2-40B4-BE49-F238E27FC236}">
-                <a16:creationId xmlns:a16="http://schemas.microsoft.com/office/drawing/2014/main" id="{0BBBD795-46AE-0A09-55A6-8879F2A61FC4}"/>
+                <a16:creationId xmlns:a16="http://schemas.microsoft.com/office/drawing/2014/main" id="{DD50AF29-4E9A-1CA9-AF7F-AFFCCC46478F}"/>
               </a:ext>
             </a:extLst>
           </p:cNvPr>
@@ -5834,7 +6511,7 @@
           <p:cNvPr id="2" name="Rectangle 1">
             <a:extLst>
               <a:ext uri="{FF2B5EF4-FFF2-40B4-BE49-F238E27FC236}">
-                <a16:creationId xmlns:a16="http://schemas.microsoft.com/office/drawing/2014/main" id="{186BCE1B-94CA-C882-7DB5-F567BC300EBB}"/>
+                <a16:creationId xmlns:a16="http://schemas.microsoft.com/office/drawing/2014/main" id="{C3E39B0E-BCBA-86EA-C4DC-41D3FACE7DC8}"/>
               </a:ext>
             </a:extLst>
           </p:cNvPr>
@@ -5884,7 +6561,7 @@
           <p:cNvPr id="7" name="Rectangle 6">
             <a:extLst>
               <a:ext uri="{FF2B5EF4-FFF2-40B4-BE49-F238E27FC236}">
-                <a16:creationId xmlns:a16="http://schemas.microsoft.com/office/drawing/2014/main" id="{59364785-1256-60E4-B1B7-89702A03CCD5}"/>
+                <a16:creationId xmlns:a16="http://schemas.microsoft.com/office/drawing/2014/main" id="{D0E19E31-AF30-70F5-B9D7-05D6BC89DCFC}"/>
               </a:ext>
             </a:extLst>
           </p:cNvPr>
@@ -5934,7 +6611,7 @@
           <p:cNvPr id="8" name="Rectangle 7">
             <a:extLst>
               <a:ext uri="{FF2B5EF4-FFF2-40B4-BE49-F238E27FC236}">
-                <a16:creationId xmlns:a16="http://schemas.microsoft.com/office/drawing/2014/main" id="{86E2608F-B1E2-5B93-91AE-364C2B7E4A95}"/>
+                <a16:creationId xmlns:a16="http://schemas.microsoft.com/office/drawing/2014/main" id="{7A85503F-3381-6DF1-1A37-F0168B86E3E0}"/>
               </a:ext>
             </a:extLst>
           </p:cNvPr>
@@ -5984,7 +6661,7 @@
           <p:cNvPr id="9" name="Rectangle 8">
             <a:extLst>
               <a:ext uri="{FF2B5EF4-FFF2-40B4-BE49-F238E27FC236}">
-                <a16:creationId xmlns:a16="http://schemas.microsoft.com/office/drawing/2014/main" id="{2A6AD031-6CCA-40D8-1B1F-19E14E81391D}"/>
+                <a16:creationId xmlns:a16="http://schemas.microsoft.com/office/drawing/2014/main" id="{24ED6635-9895-6895-8C27-ED978C59D362}"/>
               </a:ext>
             </a:extLst>
           </p:cNvPr>
@@ -6033,7 +6710,7 @@
           <p:cNvPr id="10" name="Rectangle 9">
             <a:extLst>
               <a:ext uri="{FF2B5EF4-FFF2-40B4-BE49-F238E27FC236}">
-                <a16:creationId xmlns:a16="http://schemas.microsoft.com/office/drawing/2014/main" id="{379E98F0-119B-062E-82FC-99F6093AC172}"/>
+                <a16:creationId xmlns:a16="http://schemas.microsoft.com/office/drawing/2014/main" id="{CC61D48B-E8AA-3DCB-AB23-BC1523988449}"/>
               </a:ext>
             </a:extLst>
           </p:cNvPr>
@@ -6081,7 +6758,7 @@
           <p:cNvPr id="12" name="Rectangle 11">
             <a:extLst>
               <a:ext uri="{FF2B5EF4-FFF2-40B4-BE49-F238E27FC236}">
-                <a16:creationId xmlns:a16="http://schemas.microsoft.com/office/drawing/2014/main" id="{F9236038-6BA2-1565-E3BA-73C65CD707F3}"/>
+                <a16:creationId xmlns:a16="http://schemas.microsoft.com/office/drawing/2014/main" id="{E87BCE93-D046-7729-F133-008739848981}"/>
               </a:ext>
             </a:extLst>
           </p:cNvPr>
@@ -6129,7 +6806,7 @@
           <p:cNvPr id="3" name="Rectangle 2">
             <a:extLst>
               <a:ext uri="{FF2B5EF4-FFF2-40B4-BE49-F238E27FC236}">
-                <a16:creationId xmlns:a16="http://schemas.microsoft.com/office/drawing/2014/main" id="{DB7A722C-D842-3971-C452-564BD9F30E50}"/>
+                <a16:creationId xmlns:a16="http://schemas.microsoft.com/office/drawing/2014/main" id="{02FFFC7F-9B51-660E-AB3F-3831B7F4AEFA}"/>
               </a:ext>
             </a:extLst>
           </p:cNvPr>
@@ -6139,7 +6816,7 @@
         <p:spPr>
           <a:xfrm>
             <a:off x="446694" y="1537918"/>
-            <a:ext cx="5290010" cy="6309420"/>
+            <a:ext cx="5290010" cy="7909858"/>
           </a:xfrm>
           <a:prstGeom prst="rect">
             <a:avLst/>
@@ -6180,7 +6857,7 @@
                   <a:srgbClr val="385D8A"/>
                 </a:solidFill>
               </a:rPr>
-              <a:t>28/10/2024 – Final task of JavaScript assigned.</a:t>
+              <a:t>04/11/2024 –Session is about Angular forms and task submission.</a:t>
             </a:r>
           </a:p>
           <a:p>
@@ -6211,7 +6888,7 @@
                   <a:srgbClr val="385D8A"/>
                 </a:solidFill>
               </a:rPr>
-              <a:t>29/10/2024 – Completed and submitted the final task .</a:t>
+              <a:t>05/11/2024 –Session is about Services and Dependency Injection and task submission.</a:t>
             </a:r>
           </a:p>
           <a:p>
@@ -6242,24 +6919,23 @@
                   <a:srgbClr val="385D8A"/>
                 </a:solidFill>
               </a:rPr>
-              <a:t>30/10/2024 – Session is about the correction and modifications in</a:t>
-            </a:r>
-          </a:p>
-          <a:p>
-            <a:pPr marL="534987" lvl="2" defTabSz="839694">
-              <a:buClr>
-                <a:srgbClr val="00B0F0"/>
-              </a:buClr>
-              <a:buSzPct val="75000"/>
-              <a:defRPr/>
-            </a:pPr>
+              <a:t>06/11/2024 –Session is about Angular Routing </a:t>
+            </a:r>
+            <a:r>
+              <a:rPr lang="en-GB" sz="1300" dirty="0">
+                <a:solidFill>
+                  <a:srgbClr val="385D8A"/>
+                </a:solidFill>
+              </a:rPr>
+              <a:t>It includes normal, nested, and parameterized routes, along with query parameters. </a:t>
+            </a:r>
             <a:r>
               <a:rPr lang="en-US" sz="1300" dirty="0">
                 <a:solidFill>
                   <a:srgbClr val="385D8A"/>
                 </a:solidFill>
               </a:rPr>
-              <a:t>the submitted task , and updated task submission.</a:t>
+              <a:t> and task submission.</a:t>
             </a:r>
           </a:p>
           <a:p>
@@ -6290,39 +6966,155 @@
                   <a:srgbClr val="385D8A"/>
                 </a:solidFill>
               </a:rPr>
-              <a:t>31/10/2024 – Session is about Angular project setup and task submission.</a:t>
-            </a:r>
-          </a:p>
-          <a:p>
-            <a:pPr marL="534987" lvl="2" defTabSz="839694">
-              <a:buClr>
-                <a:srgbClr val="00B0F0"/>
-              </a:buClr>
-              <a:buSzPct val="75000"/>
-              <a:defRPr/>
-            </a:pPr>
-            <a:endParaRPr lang="en-US" sz="1300" dirty="0">
-              <a:solidFill>
-                <a:srgbClr val="385D8A"/>
-              </a:solidFill>
-            </a:endParaRPr>
-          </a:p>
-          <a:p>
-            <a:pPr marL="534987" lvl="2" defTabSz="839694">
-              <a:buClr>
-                <a:srgbClr val="00B0F0"/>
-              </a:buClr>
-              <a:buSzPct val="75000"/>
-              <a:defRPr/>
-            </a:pPr>
+              <a:t>07/11/2024 –Session is </a:t>
+            </a:r>
+            <a:r>
+              <a:rPr lang="en-GB" sz="1300" dirty="0">
+                <a:solidFill>
+                  <a:srgbClr val="385D8A"/>
+                </a:solidFill>
+              </a:rPr>
+              <a:t>Lazy loading and Guarding routes</a:t>
+            </a:r>
             <a:r>
               <a:rPr lang="en-US" sz="1300" dirty="0">
                 <a:solidFill>
                   <a:srgbClr val="385D8A"/>
                 </a:solidFill>
               </a:rPr>
-              <a:t>01/11/2024 – Session is about Angular fundamentals and task submission.</a:t>
-            </a:r>
+              <a:t> and task submission.</a:t>
+            </a:r>
+          </a:p>
+          <a:p>
+            <a:pPr marL="534987" lvl="2" defTabSz="839694">
+              <a:buClr>
+                <a:srgbClr val="00B0F0"/>
+              </a:buClr>
+              <a:buSzPct val="75000"/>
+              <a:defRPr/>
+            </a:pPr>
+            <a:endParaRPr lang="en-US" sz="1300" dirty="0">
+              <a:solidFill>
+                <a:srgbClr val="385D8A"/>
+              </a:solidFill>
+            </a:endParaRPr>
+          </a:p>
+          <a:p>
+            <a:pPr marL="534987" lvl="2" defTabSz="839694">
+              <a:buClr>
+                <a:srgbClr val="00B0F0"/>
+              </a:buClr>
+              <a:buSzPct val="75000"/>
+              <a:defRPr/>
+            </a:pPr>
+            <a:r>
+              <a:rPr lang="en-US" sz="1300" dirty="0">
+                <a:solidFill>
+                  <a:srgbClr val="385D8A"/>
+                </a:solidFill>
+              </a:rPr>
+              <a:t>08/11/2024 –Session is </a:t>
+            </a:r>
+            <a:r>
+              <a:rPr lang="en-GB" sz="1300" dirty="0">
+                <a:solidFill>
+                  <a:srgbClr val="385D8A"/>
+                </a:solidFill>
+              </a:rPr>
+              <a:t>HTTP Methods </a:t>
+            </a:r>
+            <a:r>
+              <a:rPr lang="en-US" sz="1300" dirty="0">
+                <a:solidFill>
+                  <a:srgbClr val="385D8A"/>
+                </a:solidFill>
+              </a:rPr>
+              <a:t>and task submission.</a:t>
+            </a:r>
+          </a:p>
+          <a:p>
+            <a:pPr marL="534987" lvl="2" defTabSz="839694">
+              <a:buClr>
+                <a:srgbClr val="00B0F0"/>
+              </a:buClr>
+              <a:buSzPct val="75000"/>
+              <a:defRPr/>
+            </a:pPr>
+            <a:endParaRPr lang="en-US" sz="1300" dirty="0">
+              <a:solidFill>
+                <a:srgbClr val="385D8A"/>
+              </a:solidFill>
+            </a:endParaRPr>
+          </a:p>
+          <a:p>
+            <a:pPr marL="534987" lvl="2" defTabSz="839694">
+              <a:buClr>
+                <a:srgbClr val="00B0F0"/>
+              </a:buClr>
+              <a:buSzPct val="75000"/>
+              <a:defRPr/>
+            </a:pPr>
+            <a:endParaRPr lang="en-US" sz="1300" dirty="0">
+              <a:solidFill>
+                <a:srgbClr val="385D8A"/>
+              </a:solidFill>
+            </a:endParaRPr>
+          </a:p>
+          <a:p>
+            <a:pPr marL="534987" lvl="2" defTabSz="839694">
+              <a:buClr>
+                <a:srgbClr val="00B0F0"/>
+              </a:buClr>
+              <a:buSzPct val="75000"/>
+              <a:defRPr/>
+            </a:pPr>
+            <a:endParaRPr lang="en-US" sz="1300" dirty="0">
+              <a:solidFill>
+                <a:srgbClr val="385D8A"/>
+              </a:solidFill>
+            </a:endParaRPr>
+          </a:p>
+          <a:p>
+            <a:pPr marL="534987" lvl="2" defTabSz="839694">
+              <a:buClr>
+                <a:srgbClr val="00B0F0"/>
+              </a:buClr>
+              <a:buSzPct val="75000"/>
+              <a:defRPr/>
+            </a:pPr>
+            <a:endParaRPr lang="en-US" sz="1300" dirty="0">
+              <a:solidFill>
+                <a:srgbClr val="385D8A"/>
+              </a:solidFill>
+            </a:endParaRPr>
+          </a:p>
+          <a:p>
+            <a:pPr marL="534987" lvl="2" defTabSz="839694">
+              <a:buClr>
+                <a:srgbClr val="00B0F0"/>
+              </a:buClr>
+              <a:buSzPct val="75000"/>
+              <a:defRPr/>
+            </a:pPr>
+            <a:endParaRPr lang="en-US" sz="1300" dirty="0">
+              <a:solidFill>
+                <a:srgbClr val="385D8A"/>
+              </a:solidFill>
+            </a:endParaRPr>
+          </a:p>
+          <a:p>
+            <a:pPr marL="534987" lvl="2" defTabSz="839694">
+              <a:buClr>
+                <a:srgbClr val="00B0F0"/>
+              </a:buClr>
+              <a:buSzPct val="75000"/>
+              <a:defRPr/>
+            </a:pPr>
+            <a:endParaRPr lang="en-US" sz="1300" dirty="0">
+              <a:solidFill>
+                <a:srgbClr val="385D8A"/>
+              </a:solidFill>
+            </a:endParaRPr>
           </a:p>
           <a:p>
             <a:pPr marL="534987" lvl="2" defTabSz="839694">
@@ -6585,7 +7377,7 @@
           <p:cNvPr id="14" name="Rectangle 13">
             <a:extLst>
               <a:ext uri="{FF2B5EF4-FFF2-40B4-BE49-F238E27FC236}">
-                <a16:creationId xmlns:a16="http://schemas.microsoft.com/office/drawing/2014/main" id="{68036BB1-9345-8DE3-ADE6-00994DAA0CE7}"/>
+                <a16:creationId xmlns:a16="http://schemas.microsoft.com/office/drawing/2014/main" id="{8A0BEABA-E896-1452-2B02-BE1555D9E384}"/>
               </a:ext>
             </a:extLst>
           </p:cNvPr>
@@ -6595,7 +7387,7 @@
         <p:spPr>
           <a:xfrm>
             <a:off x="6286894" y="1273660"/>
-            <a:ext cx="5290010" cy="1892826"/>
+            <a:ext cx="5290010" cy="2292935"/>
           </a:xfrm>
           <a:prstGeom prst="rect">
             <a:avLst/>
@@ -6636,7 +7428,7 @@
                   <a:srgbClr val="385D8A"/>
                 </a:solidFill>
               </a:rPr>
-              <a:t>28/10/2024 - Madhu </a:t>
+              <a:t>04/11/2024  - </a:t>
             </a:r>
             <a:r>
               <a:rPr lang="en-US" sz="1300" dirty="0" err="1">
@@ -6644,13 +7436,16 @@
                   <a:srgbClr val="385D8A"/>
                 </a:solidFill>
               </a:rPr>
-              <a:t>Pandikkadu</a:t>
-            </a:r>
-            <a:endParaRPr lang="en-US" sz="1300" dirty="0">
-              <a:solidFill>
-                <a:srgbClr val="385D8A"/>
-              </a:solidFill>
-            </a:endParaRPr>
+              <a:t>Iby</a:t>
+            </a:r>
+            <a:r>
+              <a:rPr lang="en-US" sz="1300" dirty="0">
+                <a:solidFill>
+                  <a:srgbClr val="385D8A"/>
+                </a:solidFill>
+              </a:rPr>
+              <a:t> Binu </a:t>
+            </a:r>
           </a:p>
           <a:p>
             <a:pPr marL="723900" lvl="2" indent="-188913" defTabSz="839694">
@@ -6668,7 +7463,7 @@
                   <a:srgbClr val="385D8A"/>
                 </a:solidFill>
               </a:rPr>
-              <a:t>30/10/2024 - Madhu </a:t>
+              <a:t>05/11/2024  - </a:t>
             </a:r>
             <a:r>
               <a:rPr lang="en-US" sz="1300" dirty="0" err="1">
@@ -6676,7 +7471,7 @@
                   <a:srgbClr val="385D8A"/>
                 </a:solidFill>
               </a:rPr>
-              <a:t>Pandikkadu</a:t>
+              <a:t>Sanoob</a:t>
             </a:r>
             <a:r>
               <a:rPr lang="en-US" sz="1300" dirty="0">
@@ -6684,7 +7479,7 @@
                   <a:srgbClr val="385D8A"/>
                 </a:solidFill>
               </a:rPr>
-              <a:t> &amp; Ajay K J</a:t>
+              <a:t> S</a:t>
             </a:r>
           </a:p>
           <a:p>
@@ -6703,7 +7498,7 @@
                   <a:srgbClr val="385D8A"/>
                 </a:solidFill>
               </a:rPr>
-              <a:t>31/10/2024 – Basil Kurian</a:t>
+              <a:t>06/11/2024  - Vyshnav N V</a:t>
             </a:r>
           </a:p>
           <a:p>
@@ -6722,23 +7517,7 @@
                   <a:srgbClr val="385D8A"/>
                 </a:solidFill>
               </a:rPr>
-              <a:t>01/11/2024 - </a:t>
-            </a:r>
-            <a:r>
-              <a:rPr lang="en-US" sz="1300" dirty="0" err="1">
-                <a:solidFill>
-                  <a:srgbClr val="385D8A"/>
-                </a:solidFill>
-              </a:rPr>
-              <a:t>Ushanandini</a:t>
-            </a:r>
-            <a:r>
-              <a:rPr lang="en-US" sz="1300" dirty="0">
-                <a:solidFill>
-                  <a:srgbClr val="385D8A"/>
-                </a:solidFill>
-              </a:rPr>
-              <a:t> A</a:t>
+              <a:t>07/11/2024  - Mansoor PJ</a:t>
             </a:r>
           </a:p>
           <a:p>
@@ -6749,6 +7528,39 @@
               <a:buSzPct val="75000"/>
               <a:buFont typeface="Wingdings 3" panose="05040102010807070707" pitchFamily="18" charset="2"/>
               <a:buChar char="u"/>
+              <a:defRPr/>
+            </a:pPr>
+            <a:r>
+              <a:rPr lang="en-US" sz="1300" dirty="0">
+                <a:solidFill>
+                  <a:srgbClr val="385D8A"/>
+                </a:solidFill>
+              </a:rPr>
+              <a:t>08/11/2024  - Ratheesh K</a:t>
+            </a:r>
+          </a:p>
+          <a:p>
+            <a:pPr marL="723900" lvl="2" indent="-188913" defTabSz="839694">
+              <a:buClr>
+                <a:srgbClr val="00B0F0"/>
+              </a:buClr>
+              <a:buSzPct val="75000"/>
+              <a:buFont typeface="Wingdings 3" panose="05040102010807070707" pitchFamily="18" charset="2"/>
+              <a:buChar char="u"/>
+              <a:defRPr/>
+            </a:pPr>
+            <a:endParaRPr lang="en-US" sz="1300" dirty="0">
+              <a:solidFill>
+                <a:srgbClr val="385D8A"/>
+              </a:solidFill>
+            </a:endParaRPr>
+          </a:p>
+          <a:p>
+            <a:pPr marL="534987" lvl="2" defTabSz="839694">
+              <a:buClr>
+                <a:srgbClr val="00B0F0"/>
+              </a:buClr>
+              <a:buSzPct val="75000"/>
               <a:defRPr/>
             </a:pPr>
             <a:endParaRPr lang="en-US" sz="1300" dirty="0">
@@ -6813,7 +7625,7 @@
           <p:cNvPr id="13" name="Rectangle 12">
             <a:extLst>
               <a:ext uri="{FF2B5EF4-FFF2-40B4-BE49-F238E27FC236}">
-                <a16:creationId xmlns:a16="http://schemas.microsoft.com/office/drawing/2014/main" id="{059B3EAD-B410-FCF9-B20F-7925647B43ED}"/>
+                <a16:creationId xmlns:a16="http://schemas.microsoft.com/office/drawing/2014/main" id="{98D2DF99-227A-87BC-9C93-17E7A119461D}"/>
               </a:ext>
             </a:extLst>
           </p:cNvPr>
@@ -6823,7 +7635,7 @@
         <p:spPr>
           <a:xfrm>
             <a:off x="6076649" y="3672218"/>
-            <a:ext cx="5480904" cy="3693319"/>
+            <a:ext cx="5480904" cy="3939540"/>
           </a:xfrm>
           <a:prstGeom prst="rect">
             <a:avLst/>
@@ -6858,19 +7670,16 @@
               <a:buChar char="u"/>
               <a:defRPr/>
             </a:pPr>
-            <a:r>
-              <a:rPr lang="en-US" sz="1300" dirty="0">
-                <a:solidFill>
-                  <a:srgbClr val="385D8A"/>
-                </a:solidFill>
-                <a:hlinkClick r:id="rId3"/>
-              </a:rPr>
-              <a:t>https://beinexmicrosoft-my.sharepoint.com/:u:/g/personal/dilna_dileep_beinex_com/EcQMjYcWxOlCgZte8cMaEN0Bfp6vSWbdG0nYGe0IMhREGQ?e=hHCmbo</a:t>
-            </a:r>
-            <a:endParaRPr lang="en-US" sz="1300" dirty="0">
-              <a:solidFill>
-                <a:srgbClr val="385D8A"/>
-              </a:solidFill>
+            <a:endParaRPr kumimoji="0" lang="en-US" altLang="en-US" sz="1300" b="0" i="0" u="none" strike="noStrike" cap="none" normalizeH="0" baseline="0" dirty="0">
+              <a:ln>
+                <a:noFill/>
+              </a:ln>
+              <a:solidFill>
+                <a:schemeClr val="tx1"/>
+              </a:solidFill>
+              <a:effectLst/>
+              <a:latin typeface="Arial" panose="020B0604020202020204" pitchFamily="34" charset="0"/>
+              <a:hlinkClick r:id="rId3"/>
             </a:endParaRPr>
           </a:p>
           <a:p>
@@ -6884,15 +7693,39 @@
               <a:defRPr/>
             </a:pPr>
             <a:r>
-              <a:rPr lang="en-US" sz="1300" dirty="0">
-                <a:solidFill>
-                  <a:srgbClr val="385D8A"/>
-                </a:solidFill>
-                <a:hlinkClick r:id="rId4"/>
-              </a:rPr>
-              <a:t>https://beinexmicrosoft-my.sharepoint.com/:f:/g/personal/dilna_dileep_beinex_com/EjW45S8sYVFBiVIHgWSE4h0BH33VmBc5NG_cluq5cWSF8g?e=F8UjtT</a:t>
-            </a:r>
-            <a:endParaRPr lang="en-US" sz="1300" dirty="0">
+              <a:rPr kumimoji="0" lang="en-US" altLang="en-US" sz="1300" b="0" i="0" u="none" strike="noStrike" cap="none" normalizeH="0" baseline="0" dirty="0">
+                <a:ln>
+                  <a:noFill/>
+                </a:ln>
+                <a:solidFill>
+                  <a:schemeClr val="tx1"/>
+                </a:solidFill>
+                <a:effectLst/>
+                <a:latin typeface="Arial" panose="020B0604020202020204" pitchFamily="34" charset="0"/>
+                <a:hlinkClick r:id="rId3"/>
+              </a:rPr>
+              <a:t>Angular 3.zip</a:t>
+            </a:r>
+            <a:endParaRPr kumimoji="0" lang="en-US" altLang="en-US" sz="1300" b="0" i="0" u="none" strike="noStrike" cap="none" normalizeH="0" baseline="0" dirty="0">
+              <a:ln>
+                <a:noFill/>
+              </a:ln>
+              <a:solidFill>
+                <a:schemeClr val="tx1"/>
+              </a:solidFill>
+              <a:effectLst/>
+              <a:latin typeface="Arial" panose="020B0604020202020204" pitchFamily="34" charset="0"/>
+            </a:endParaRPr>
+          </a:p>
+          <a:p>
+            <a:pPr marL="534987" lvl="2" defTabSz="839694">
+              <a:buClr>
+                <a:srgbClr val="00B0F0"/>
+              </a:buClr>
+              <a:buSzPct val="75000"/>
+              <a:defRPr/>
+            </a:pPr>
+            <a:endParaRPr lang="en-US" sz="1100" dirty="0">
               <a:solidFill>
                 <a:srgbClr val="385D8A"/>
               </a:solidFill>
@@ -6909,18 +7742,28 @@
               <a:defRPr/>
             </a:pPr>
             <a:r>
-              <a:rPr lang="en-US" sz="1300" dirty="0">
-                <a:solidFill>
-                  <a:srgbClr val="385D8A"/>
-                </a:solidFill>
-                <a:hlinkClick r:id="rId5"/>
-              </a:rPr>
-              <a:t>https://beinexmicrosoft-my.sharepoint.com/:u:/g/personal/dilna_dileep_beinex_com/EVwRV3NfhSVEkW19yPjmSIEBNN8wt039v2xn11K5q1dtFA?e=ctWgzp</a:t>
-            </a:r>
-            <a:endParaRPr lang="en-US" sz="1300" dirty="0">
-              <a:solidFill>
-                <a:srgbClr val="385D8A"/>
-              </a:solidFill>
+              <a:rPr kumimoji="0" lang="en-US" altLang="en-US" sz="1300" b="0" i="0" u="none" strike="noStrike" cap="none" normalizeH="0" baseline="0" dirty="0">
+                <a:ln>
+                  <a:noFill/>
+                </a:ln>
+                <a:solidFill>
+                  <a:schemeClr val="tx1"/>
+                </a:solidFill>
+                <a:effectLst/>
+                <a:latin typeface="Arial" panose="020B0604020202020204" pitchFamily="34" charset="0"/>
+                <a:hlinkClick r:id="rId4"/>
+              </a:rPr>
+              <a:t>Angular 4.zip</a:t>
+            </a:r>
+            <a:endParaRPr kumimoji="0" lang="en-US" altLang="en-US" sz="1300" b="0" i="0" u="none" strike="noStrike" cap="none" normalizeH="0" baseline="0" dirty="0">
+              <a:ln>
+                <a:noFill/>
+              </a:ln>
+              <a:solidFill>
+                <a:schemeClr val="tx1"/>
+              </a:solidFill>
+              <a:effectLst/>
+              <a:latin typeface="Arial" panose="020B0604020202020204" pitchFamily="34" charset="0"/>
             </a:endParaRPr>
           </a:p>
           <a:p>
@@ -6933,15 +7776,211 @@
               <a:buChar char="u"/>
               <a:defRPr/>
             </a:pPr>
-            <a:r>
-              <a:rPr lang="en-US" sz="1300" dirty="0">
-                <a:solidFill>
-                  <a:srgbClr val="385D8A"/>
-                </a:solidFill>
+            <a:endParaRPr lang="en-US" sz="1100" dirty="0">
+              <a:solidFill>
+                <a:srgbClr val="385D8A"/>
+              </a:solidFill>
+            </a:endParaRPr>
+          </a:p>
+          <a:p>
+            <a:pPr marL="723900" lvl="2" indent="-188913" defTabSz="839694">
+              <a:buClr>
+                <a:srgbClr val="00B0F0"/>
+              </a:buClr>
+              <a:buSzPct val="75000"/>
+              <a:buFont typeface="Wingdings 3" panose="05040102010807070707" pitchFamily="18" charset="2"/>
+              <a:buChar char="u"/>
+              <a:defRPr/>
+            </a:pPr>
+            <a:r>
+              <a:rPr kumimoji="0" lang="en-US" altLang="en-US" sz="1300" b="0" i="0" u="none" strike="noStrike" cap="none" normalizeH="0" baseline="0" dirty="0">
+                <a:ln>
+                  <a:noFill/>
+                </a:ln>
+                <a:solidFill>
+                  <a:schemeClr val="tx1"/>
+                </a:solidFill>
+                <a:effectLst/>
+                <a:latin typeface="Arial" panose="020B0604020202020204" pitchFamily="34" charset="0"/>
+                <a:hlinkClick r:id="rId5"/>
+              </a:rPr>
+              <a:t>Angular 5.zip</a:t>
+            </a:r>
+            <a:endParaRPr kumimoji="0" lang="en-US" altLang="en-US" sz="1300" b="0" i="0" u="none" strike="noStrike" cap="none" normalizeH="0" baseline="0" dirty="0">
+              <a:ln>
+                <a:noFill/>
+              </a:ln>
+              <a:solidFill>
+                <a:schemeClr val="tx1"/>
+              </a:solidFill>
+              <a:effectLst/>
+              <a:latin typeface="Arial" panose="020B0604020202020204" pitchFamily="34" charset="0"/>
+            </a:endParaRPr>
+          </a:p>
+          <a:p>
+            <a:pPr marL="723900" lvl="2" indent="-188913" defTabSz="839694">
+              <a:buClr>
+                <a:srgbClr val="00B0F0"/>
+              </a:buClr>
+              <a:buSzPct val="75000"/>
+              <a:buFont typeface="Wingdings 3" panose="05040102010807070707" pitchFamily="18" charset="2"/>
+              <a:buChar char="u"/>
+              <a:defRPr/>
+            </a:pPr>
+            <a:endParaRPr lang="en-US" sz="1100" dirty="0">
+              <a:solidFill>
+                <a:srgbClr val="385D8A"/>
+              </a:solidFill>
+            </a:endParaRPr>
+          </a:p>
+          <a:p>
+            <a:pPr marL="723900" lvl="2" indent="-188913" defTabSz="839694">
+              <a:buClr>
+                <a:srgbClr val="00B0F0"/>
+              </a:buClr>
+              <a:buSzPct val="75000"/>
+              <a:buFont typeface="Wingdings 3" panose="05040102010807070707" pitchFamily="18" charset="2"/>
+              <a:buChar char="u"/>
+              <a:defRPr/>
+            </a:pPr>
+            <a:r>
+              <a:rPr kumimoji="0" lang="en-US" altLang="en-US" sz="1300" b="0" i="0" u="none" strike="noStrike" cap="none" normalizeH="0" baseline="0" dirty="0">
+                <a:ln>
+                  <a:noFill/>
+                </a:ln>
+                <a:solidFill>
+                  <a:schemeClr val="tx1"/>
+                </a:solidFill>
+                <a:effectLst/>
+                <a:latin typeface="Arial" panose="020B0604020202020204" pitchFamily="34" charset="0"/>
                 <a:hlinkClick r:id="rId6"/>
               </a:rPr>
-              <a:t>https://beinexmicrosoft-my.sharepoint.com/:u:/g/personal/dilna_dileep_beinex_com/EQ9A9RE8nwRAmo7qM3BU-doBjfdhPgz2xdHKy6u2fZlxpw?e=xeSSmI</a:t>
-            </a:r>
+              <a:t>Angular 6.zip</a:t>
+            </a:r>
+            <a:endParaRPr kumimoji="0" lang="en-US" altLang="en-US" sz="1300" b="0" i="0" u="none" strike="noStrike" cap="none" normalizeH="0" baseline="0" dirty="0">
+              <a:ln>
+                <a:noFill/>
+              </a:ln>
+              <a:solidFill>
+                <a:schemeClr val="tx1"/>
+              </a:solidFill>
+              <a:effectLst/>
+              <a:latin typeface="Arial" panose="020B0604020202020204" pitchFamily="34" charset="0"/>
+            </a:endParaRPr>
+          </a:p>
+          <a:p>
+            <a:pPr marL="534987" lvl="2" defTabSz="839694">
+              <a:buClr>
+                <a:srgbClr val="00B0F0"/>
+              </a:buClr>
+              <a:buSzPct val="75000"/>
+              <a:defRPr/>
+            </a:pPr>
+            <a:endParaRPr kumimoji="0" lang="en-US" altLang="en-US" sz="1100" b="0" i="0" u="none" strike="noStrike" cap="none" normalizeH="0" baseline="0" dirty="0">
+              <a:ln>
+                <a:noFill/>
+              </a:ln>
+              <a:solidFill>
+                <a:srgbClr val="385D8A"/>
+              </a:solidFill>
+              <a:effectLst/>
+              <a:latin typeface="Arial" panose="020B0604020202020204" pitchFamily="34" charset="0"/>
+              <a:hlinkClick r:id="rId7"/>
+            </a:endParaRPr>
+          </a:p>
+          <a:p>
+            <a:pPr marL="723900" lvl="2" indent="-188913" defTabSz="839694">
+              <a:buClr>
+                <a:srgbClr val="00B0F0"/>
+              </a:buClr>
+              <a:buSzPct val="75000"/>
+              <a:buFont typeface="Wingdings 3" panose="05040102010807070707" pitchFamily="18" charset="2"/>
+              <a:buChar char="u"/>
+              <a:defRPr/>
+            </a:pPr>
+            <a:r>
+              <a:rPr kumimoji="0" lang="en-US" altLang="en-US" sz="1300" b="0" i="0" u="none" strike="noStrike" cap="none" normalizeH="0" baseline="0" dirty="0">
+                <a:ln>
+                  <a:noFill/>
+                </a:ln>
+                <a:solidFill>
+                  <a:schemeClr val="tx1"/>
+                </a:solidFill>
+                <a:effectLst/>
+                <a:latin typeface="Arial" panose="020B0604020202020204" pitchFamily="34" charset="0"/>
+                <a:hlinkClick r:id="rId7"/>
+              </a:rPr>
+              <a:t>Angular Day7.zip</a:t>
+            </a:r>
+            <a:endParaRPr kumimoji="0" lang="en-US" altLang="en-US" sz="1300" b="0" i="0" u="none" strike="noStrike" cap="none" normalizeH="0" baseline="0" dirty="0">
+              <a:ln>
+                <a:noFill/>
+              </a:ln>
+              <a:solidFill>
+                <a:schemeClr val="tx1"/>
+              </a:solidFill>
+              <a:effectLst/>
+              <a:latin typeface="Arial" panose="020B0604020202020204" pitchFamily="34" charset="0"/>
+            </a:endParaRPr>
+          </a:p>
+          <a:p>
+            <a:pPr marL="723900" lvl="2" indent="-188913" defTabSz="839694">
+              <a:buClr>
+                <a:srgbClr val="00B0F0"/>
+              </a:buClr>
+              <a:buSzPct val="75000"/>
+              <a:buFont typeface="Wingdings 3" panose="05040102010807070707" pitchFamily="18" charset="2"/>
+              <a:buChar char="u"/>
+              <a:defRPr/>
+            </a:pPr>
+            <a:endParaRPr lang="en-US" sz="1100" dirty="0">
+              <a:solidFill>
+                <a:srgbClr val="385D8A"/>
+              </a:solidFill>
+            </a:endParaRPr>
+          </a:p>
+          <a:p>
+            <a:pPr marL="723900" lvl="2" indent="-188913" defTabSz="839694">
+              <a:buClr>
+                <a:srgbClr val="00B0F0"/>
+              </a:buClr>
+              <a:buSzPct val="75000"/>
+              <a:buFont typeface="Wingdings 3" panose="05040102010807070707" pitchFamily="18" charset="2"/>
+              <a:buChar char="u"/>
+              <a:defRPr/>
+            </a:pPr>
+            <a:endParaRPr lang="en-US" sz="1300" dirty="0">
+              <a:solidFill>
+                <a:srgbClr val="385D8A"/>
+              </a:solidFill>
+            </a:endParaRPr>
+          </a:p>
+          <a:p>
+            <a:pPr marL="723900" lvl="2" indent="-188913" defTabSz="839694">
+              <a:buClr>
+                <a:srgbClr val="00B0F0"/>
+              </a:buClr>
+              <a:buSzPct val="75000"/>
+              <a:buFont typeface="Wingdings 3" panose="05040102010807070707" pitchFamily="18" charset="2"/>
+              <a:buChar char="u"/>
+              <a:defRPr/>
+            </a:pPr>
+            <a:endParaRPr lang="en-US" sz="1300" dirty="0">
+              <a:solidFill>
+                <a:srgbClr val="385D8A"/>
+              </a:solidFill>
+            </a:endParaRPr>
+          </a:p>
+          <a:p>
+            <a:pPr marL="723900" lvl="2" indent="-188913" defTabSz="839694">
+              <a:buClr>
+                <a:srgbClr val="00B0F0"/>
+              </a:buClr>
+              <a:buSzPct val="75000"/>
+              <a:buFont typeface="Wingdings 3" panose="05040102010807070707" pitchFamily="18" charset="2"/>
+              <a:buChar char="u"/>
+              <a:defRPr/>
+            </a:pPr>
             <a:endParaRPr lang="en-US" sz="1300" dirty="0">
               <a:solidFill>
                 <a:srgbClr val="385D8A"/>
@@ -7033,7 +8072,7 @@
     </p:spTree>
     <p:extLst>
       <p:ext uri="{BB962C8B-B14F-4D97-AF65-F5344CB8AC3E}">
-        <p14:creationId xmlns:p14="http://schemas.microsoft.com/office/powerpoint/2010/main" val="580528904"/>
+        <p14:creationId xmlns:p14="http://schemas.microsoft.com/office/powerpoint/2010/main" val="1812499663"/>
       </p:ext>
     </p:extLst>
   </p:cSld>
@@ -7051,7 +8090,7 @@
         <p:cNvPr id="1" name="">
           <a:extLst>
             <a:ext uri="{FF2B5EF4-FFF2-40B4-BE49-F238E27FC236}">
-              <a16:creationId xmlns:a16="http://schemas.microsoft.com/office/drawing/2014/main" id="{B8042BD5-A187-BCA5-F7BB-B386A1D012F7}"/>
+              <a16:creationId xmlns:a16="http://schemas.microsoft.com/office/drawing/2014/main" id="{E39C4D38-08AF-7469-12D0-386BB37D2E1B}"/>
             </a:ext>
           </a:extLst>
         </p:cNvPr>
@@ -7071,7 +8110,7 @@
           <p:cNvPr id="33" name="Rectangle 32">
             <a:extLst>
               <a:ext uri="{FF2B5EF4-FFF2-40B4-BE49-F238E27FC236}">
-                <a16:creationId xmlns:a16="http://schemas.microsoft.com/office/drawing/2014/main" id="{C7EC8853-607B-7BDD-301B-CB7875F6176D}"/>
+                <a16:creationId xmlns:a16="http://schemas.microsoft.com/office/drawing/2014/main" id="{2FBAA08D-87E1-60B0-756E-3FCD99483652}"/>
               </a:ext>
             </a:extLst>
           </p:cNvPr>
@@ -7123,7 +8162,7 @@
           <p:cNvPr id="34" name="Rectangle 33">
             <a:extLst>
               <a:ext uri="{FF2B5EF4-FFF2-40B4-BE49-F238E27FC236}">
-                <a16:creationId xmlns:a16="http://schemas.microsoft.com/office/drawing/2014/main" id="{355B5F52-545F-A391-38FA-B2EDB9BCD106}"/>
+                <a16:creationId xmlns:a16="http://schemas.microsoft.com/office/drawing/2014/main" id="{96B933E7-EE2F-0945-AF61-17F46B747AE8}"/>
               </a:ext>
             </a:extLst>
           </p:cNvPr>
@@ -7175,7 +8214,7 @@
           <p:cNvPr id="35" name="TextBox 34">
             <a:extLst>
               <a:ext uri="{FF2B5EF4-FFF2-40B4-BE49-F238E27FC236}">
-                <a16:creationId xmlns:a16="http://schemas.microsoft.com/office/drawing/2014/main" id="{5C866996-36BD-4A53-1F60-826D753F55F3}"/>
+                <a16:creationId xmlns:a16="http://schemas.microsoft.com/office/drawing/2014/main" id="{CBA76445-41CD-B141-5B02-23F74216E3EA}"/>
               </a:ext>
             </a:extLst>
           </p:cNvPr>
@@ -7212,7 +8251,7 @@
                   <a:srgbClr val="0070C0"/>
                 </a:solidFill>
               </a:rPr>
-              <a:t>Week 3 (21/10/2024 - 25/10/2024)</a:t>
+              <a:t>Week 4 (28/10/2024 - 01/11/2024)</a:t>
             </a:r>
           </a:p>
           <a:p>
@@ -7229,7 +8268,7 @@
           <p:cNvPr id="36" name="Picture 35" descr="A picture containing clipart&#10;&#10;Description generated with very high confidence">
             <a:extLst>
               <a:ext uri="{FF2B5EF4-FFF2-40B4-BE49-F238E27FC236}">
-                <a16:creationId xmlns:a16="http://schemas.microsoft.com/office/drawing/2014/main" id="{3C76CB36-49AA-99A2-FC8A-1D0CB8488EDF}"/>
+                <a16:creationId xmlns:a16="http://schemas.microsoft.com/office/drawing/2014/main" id="{0BBBD795-46AE-0A09-55A6-8879F2A61FC4}"/>
               </a:ext>
             </a:extLst>
           </p:cNvPr>
@@ -7265,7 +8304,7 @@
           <p:cNvPr id="2" name="Rectangle 1">
             <a:extLst>
               <a:ext uri="{FF2B5EF4-FFF2-40B4-BE49-F238E27FC236}">
-                <a16:creationId xmlns:a16="http://schemas.microsoft.com/office/drawing/2014/main" id="{1D1850F5-5074-9BD3-8DFD-4F6BC1BDFD7D}"/>
+                <a16:creationId xmlns:a16="http://schemas.microsoft.com/office/drawing/2014/main" id="{186BCE1B-94CA-C882-7DB5-F567BC300EBB}"/>
               </a:ext>
             </a:extLst>
           </p:cNvPr>
@@ -7315,7 +8354,7 @@
           <p:cNvPr id="7" name="Rectangle 6">
             <a:extLst>
               <a:ext uri="{FF2B5EF4-FFF2-40B4-BE49-F238E27FC236}">
-                <a16:creationId xmlns:a16="http://schemas.microsoft.com/office/drawing/2014/main" id="{D8353889-8CD6-92FD-6E13-FB7E6351BE45}"/>
+                <a16:creationId xmlns:a16="http://schemas.microsoft.com/office/drawing/2014/main" id="{59364785-1256-60E4-B1B7-89702A03CCD5}"/>
               </a:ext>
             </a:extLst>
           </p:cNvPr>
@@ -7365,7 +8404,7 @@
           <p:cNvPr id="8" name="Rectangle 7">
             <a:extLst>
               <a:ext uri="{FF2B5EF4-FFF2-40B4-BE49-F238E27FC236}">
-                <a16:creationId xmlns:a16="http://schemas.microsoft.com/office/drawing/2014/main" id="{FDEF7D57-5232-4364-E40C-FC032705EC12}"/>
+                <a16:creationId xmlns:a16="http://schemas.microsoft.com/office/drawing/2014/main" id="{86E2608F-B1E2-5B93-91AE-364C2B7E4A95}"/>
               </a:ext>
             </a:extLst>
           </p:cNvPr>
@@ -7415,7 +8454,7 @@
           <p:cNvPr id="9" name="Rectangle 8">
             <a:extLst>
               <a:ext uri="{FF2B5EF4-FFF2-40B4-BE49-F238E27FC236}">
-                <a16:creationId xmlns:a16="http://schemas.microsoft.com/office/drawing/2014/main" id="{7574E446-9363-A185-ED4E-DEF0AD8199B1}"/>
+                <a16:creationId xmlns:a16="http://schemas.microsoft.com/office/drawing/2014/main" id="{2A6AD031-6CCA-40D8-1B1F-19E14E81391D}"/>
               </a:ext>
             </a:extLst>
           </p:cNvPr>
@@ -7464,7 +8503,7 @@
           <p:cNvPr id="10" name="Rectangle 9">
             <a:extLst>
               <a:ext uri="{FF2B5EF4-FFF2-40B4-BE49-F238E27FC236}">
-                <a16:creationId xmlns:a16="http://schemas.microsoft.com/office/drawing/2014/main" id="{BB544520-D638-3933-9F8C-F98B593ED672}"/>
+                <a16:creationId xmlns:a16="http://schemas.microsoft.com/office/drawing/2014/main" id="{379E98F0-119B-062E-82FC-99F6093AC172}"/>
               </a:ext>
             </a:extLst>
           </p:cNvPr>
@@ -7512,7 +8551,7 @@
           <p:cNvPr id="12" name="Rectangle 11">
             <a:extLst>
               <a:ext uri="{FF2B5EF4-FFF2-40B4-BE49-F238E27FC236}">
-                <a16:creationId xmlns:a16="http://schemas.microsoft.com/office/drawing/2014/main" id="{928EF2D4-6E59-11A6-A3CF-5D42879B3498}"/>
+                <a16:creationId xmlns:a16="http://schemas.microsoft.com/office/drawing/2014/main" id="{F9236038-6BA2-1565-E3BA-73C65CD707F3}"/>
               </a:ext>
             </a:extLst>
           </p:cNvPr>
@@ -7560,7 +8599,7 @@
           <p:cNvPr id="3" name="Rectangle 2">
             <a:extLst>
               <a:ext uri="{FF2B5EF4-FFF2-40B4-BE49-F238E27FC236}">
-                <a16:creationId xmlns:a16="http://schemas.microsoft.com/office/drawing/2014/main" id="{82BCACB3-8D58-DB12-A3BE-538A876652C8}"/>
+                <a16:creationId xmlns:a16="http://schemas.microsoft.com/office/drawing/2014/main" id="{DB7A722C-D842-3971-C452-564BD9F30E50}"/>
               </a:ext>
             </a:extLst>
           </p:cNvPr>
@@ -7570,7 +8609,7 @@
         <p:spPr>
           <a:xfrm>
             <a:off x="446694" y="1537918"/>
-            <a:ext cx="5290010" cy="5509200"/>
+            <a:ext cx="5290010" cy="6309420"/>
           </a:xfrm>
           <a:prstGeom prst="rect">
             <a:avLst/>
@@ -7611,7 +8650,7 @@
                   <a:srgbClr val="385D8A"/>
                 </a:solidFill>
               </a:rPr>
-              <a:t>21/10/2024 – JavaScript Day 1 started , session focused on  		                 variables , functions , scop , etc. And task submission.</a:t>
+              <a:t>28/10/2024 – Final task of JavaScript assigned.</a:t>
             </a:r>
           </a:p>
           <a:p>
@@ -7642,7 +8681,7 @@
                   <a:srgbClr val="385D8A"/>
                 </a:solidFill>
               </a:rPr>
-              <a:t>22/10/2024 – Session focused Array and Object methods , and task submission.</a:t>
+              <a:t>29/10/2024 – Completed and submitted the final task .</a:t>
             </a:r>
           </a:p>
           <a:p>
@@ -7673,22 +8712,8 @@
                   <a:srgbClr val="385D8A"/>
                 </a:solidFill>
               </a:rPr>
-              <a:t>23/10/2024 – Session is about error handling and debugging , Also Task submission.</a:t>
-            </a:r>
-          </a:p>
-          <a:p>
-            <a:pPr marL="534987" lvl="2" defTabSz="839694">
-              <a:buClr>
-                <a:srgbClr val="00B0F0"/>
-              </a:buClr>
-              <a:buSzPct val="75000"/>
-              <a:defRPr/>
-            </a:pPr>
-            <a:endParaRPr lang="en-US" sz="1300" dirty="0">
-              <a:solidFill>
-                <a:srgbClr val="385D8A"/>
-              </a:solidFill>
-            </a:endParaRPr>
+              <a:t>30/10/2024 – Session is about the correction and modifications in</a:t>
+            </a:r>
           </a:p>
           <a:p>
             <a:pPr marL="534987" lvl="2" defTabSz="839694">
@@ -7704,7 +8729,7 @@
                   <a:srgbClr val="385D8A"/>
                 </a:solidFill>
               </a:rPr>
-              <a:t>24/10/2024 – Session is about DOM and Task submission.</a:t>
+              <a:t>the submitted task , and updated task submission.</a:t>
             </a:r>
           </a:p>
           <a:p>
@@ -7735,8 +8760,95 @@
                   <a:srgbClr val="385D8A"/>
                 </a:solidFill>
               </a:rPr>
-              <a:t>25/10/2024 – Session is about Event handling and Task submission.</a:t>
-            </a:r>
+              <a:t>31/10/2024 – Session is about Angular project setup and task submission.</a:t>
+            </a:r>
+          </a:p>
+          <a:p>
+            <a:pPr marL="534987" lvl="2" defTabSz="839694">
+              <a:buClr>
+                <a:srgbClr val="00B0F0"/>
+              </a:buClr>
+              <a:buSzPct val="75000"/>
+              <a:defRPr/>
+            </a:pPr>
+            <a:endParaRPr lang="en-US" sz="1300" dirty="0">
+              <a:solidFill>
+                <a:srgbClr val="385D8A"/>
+              </a:solidFill>
+            </a:endParaRPr>
+          </a:p>
+          <a:p>
+            <a:pPr marL="534987" lvl="2" defTabSz="839694">
+              <a:buClr>
+                <a:srgbClr val="00B0F0"/>
+              </a:buClr>
+              <a:buSzPct val="75000"/>
+              <a:defRPr/>
+            </a:pPr>
+            <a:r>
+              <a:rPr lang="en-US" sz="1300" dirty="0">
+                <a:solidFill>
+                  <a:srgbClr val="385D8A"/>
+                </a:solidFill>
+              </a:rPr>
+              <a:t>01/11/2024 – Session is about Angular fundamentals and task submission.</a:t>
+            </a:r>
+          </a:p>
+          <a:p>
+            <a:pPr marL="534987" lvl="2" defTabSz="839694">
+              <a:buClr>
+                <a:srgbClr val="00B0F0"/>
+              </a:buClr>
+              <a:buSzPct val="75000"/>
+              <a:defRPr/>
+            </a:pPr>
+            <a:endParaRPr lang="en-US" sz="1300" dirty="0">
+              <a:solidFill>
+                <a:srgbClr val="385D8A"/>
+              </a:solidFill>
+            </a:endParaRPr>
+          </a:p>
+          <a:p>
+            <a:pPr marL="534987" lvl="2" defTabSz="839694">
+              <a:buClr>
+                <a:srgbClr val="00B0F0"/>
+              </a:buClr>
+              <a:buSzPct val="75000"/>
+              <a:defRPr/>
+            </a:pPr>
+            <a:endParaRPr lang="en-US" sz="1300" dirty="0">
+              <a:solidFill>
+                <a:srgbClr val="385D8A"/>
+              </a:solidFill>
+            </a:endParaRPr>
+          </a:p>
+          <a:p>
+            <a:pPr marL="534987" lvl="2" defTabSz="839694">
+              <a:buClr>
+                <a:srgbClr val="00B0F0"/>
+              </a:buClr>
+              <a:buSzPct val="75000"/>
+              <a:defRPr/>
+            </a:pPr>
+            <a:endParaRPr lang="en-US" sz="1300" dirty="0">
+              <a:solidFill>
+                <a:srgbClr val="385D8A"/>
+              </a:solidFill>
+            </a:endParaRPr>
+          </a:p>
+          <a:p>
+            <a:pPr marL="534987" lvl="2" defTabSz="839694">
+              <a:buClr>
+                <a:srgbClr val="00B0F0"/>
+              </a:buClr>
+              <a:buSzPct val="75000"/>
+              <a:defRPr/>
+            </a:pPr>
+            <a:endParaRPr lang="en-US" sz="1300" dirty="0">
+              <a:solidFill>
+                <a:srgbClr val="385D8A"/>
+              </a:solidFill>
+            </a:endParaRPr>
           </a:p>
           <a:p>
             <a:pPr marL="534987" lvl="2" defTabSz="839694">
@@ -7943,7 +9055,7 @@
           <p:cNvPr id="14" name="Rectangle 13">
             <a:extLst>
               <a:ext uri="{FF2B5EF4-FFF2-40B4-BE49-F238E27FC236}">
-                <a16:creationId xmlns:a16="http://schemas.microsoft.com/office/drawing/2014/main" id="{A271BEAF-6E80-B875-821C-CB4FF884A759}"/>
+                <a16:creationId xmlns:a16="http://schemas.microsoft.com/office/drawing/2014/main" id="{68036BB1-9345-8DE3-ADE6-00994DAA0CE7}"/>
               </a:ext>
             </a:extLst>
           </p:cNvPr>
@@ -7953,7 +9065,7 @@
         <p:spPr>
           <a:xfrm>
             <a:off x="6286894" y="1273660"/>
-            <a:ext cx="5290010" cy="1692771"/>
+            <a:ext cx="5290010" cy="1892826"/>
           </a:xfrm>
           <a:prstGeom prst="rect">
             <a:avLst/>
@@ -7994,7 +9106,7 @@
                   <a:srgbClr val="385D8A"/>
                 </a:solidFill>
               </a:rPr>
-              <a:t>21/10/2024 – </a:t>
+              <a:t>28/10/2024 - Madhu </a:t>
             </a:r>
             <a:r>
               <a:rPr lang="en-US" sz="1300" dirty="0" err="1">
@@ -8002,23 +9114,7 @@
                   <a:srgbClr val="385D8A"/>
                 </a:solidFill>
               </a:rPr>
-              <a:t>Dhanya</a:t>
-            </a:r>
-            <a:r>
-              <a:rPr lang="en-US" sz="1300" dirty="0">
-                <a:solidFill>
-                  <a:srgbClr val="385D8A"/>
-                </a:solidFill>
-              </a:rPr>
-              <a:t> </a:t>
-            </a:r>
-            <a:r>
-              <a:rPr lang="en-US" sz="1300" dirty="0" err="1">
-                <a:solidFill>
-                  <a:srgbClr val="385D8A"/>
-                </a:solidFill>
-              </a:rPr>
-              <a:t>Sethu</a:t>
+              <a:t>Pandikkadu</a:t>
             </a:r>
             <a:endParaRPr lang="en-US" sz="1300" dirty="0">
               <a:solidFill>
@@ -8042,7 +9138,23 @@
                   <a:srgbClr val="385D8A"/>
                 </a:solidFill>
               </a:rPr>
-              <a:t>22/10/2024 – Ajay K J</a:t>
+              <a:t>30/10/2024 - Madhu </a:t>
+            </a:r>
+            <a:r>
+              <a:rPr lang="en-US" sz="1300" dirty="0" err="1">
+                <a:solidFill>
+                  <a:srgbClr val="385D8A"/>
+                </a:solidFill>
+              </a:rPr>
+              <a:t>Pandikkadu</a:t>
+            </a:r>
+            <a:r>
+              <a:rPr lang="en-US" sz="1300" dirty="0">
+                <a:solidFill>
+                  <a:srgbClr val="385D8A"/>
+                </a:solidFill>
+              </a:rPr>
+              <a:t> &amp; Ajay K J</a:t>
             </a:r>
           </a:p>
           <a:p>
@@ -8061,7 +9173,7 @@
                   <a:srgbClr val="385D8A"/>
                 </a:solidFill>
               </a:rPr>
-              <a:t>23/10/2024 – Ajay K J</a:t>
+              <a:t>31/10/2024 – Basil Kurian</a:t>
             </a:r>
           </a:p>
           <a:p>
@@ -8080,7 +9192,7 @@
                   <a:srgbClr val="385D8A"/>
                 </a:solidFill>
               </a:rPr>
-              <a:t>24/10/2024 - Madhu </a:t>
+              <a:t>01/11/2024 - </a:t>
             </a:r>
             <a:r>
               <a:rPr lang="en-US" sz="1300" dirty="0" err="1">
@@ -8088,13 +9200,16 @@
                   <a:srgbClr val="385D8A"/>
                 </a:solidFill>
               </a:rPr>
-              <a:t>Pandikkadu</a:t>
-            </a:r>
-            <a:endParaRPr lang="en-US" sz="1300" dirty="0">
-              <a:solidFill>
-                <a:srgbClr val="385D8A"/>
-              </a:solidFill>
-            </a:endParaRPr>
+              <a:t>Ushanandini</a:t>
+            </a:r>
+            <a:r>
+              <a:rPr lang="en-US" sz="1300" dirty="0">
+                <a:solidFill>
+                  <a:srgbClr val="385D8A"/>
+                </a:solidFill>
+              </a:rPr>
+              <a:t> A</a:t>
+            </a:r>
           </a:p>
           <a:p>
             <a:pPr marL="723900" lvl="2" indent="-188913" defTabSz="839694">
@@ -8106,22 +9221,22 @@
               <a:buChar char="u"/>
               <a:defRPr/>
             </a:pPr>
-            <a:r>
-              <a:rPr lang="en-US" sz="1300" dirty="0">
-                <a:solidFill>
-                  <a:srgbClr val="385D8A"/>
-                </a:solidFill>
-              </a:rPr>
-              <a:t>25/10/2024 - Madhu </a:t>
-            </a:r>
-            <a:r>
-              <a:rPr lang="en-US" sz="1300" dirty="0" err="1">
-                <a:solidFill>
-                  <a:srgbClr val="385D8A"/>
-                </a:solidFill>
-              </a:rPr>
-              <a:t>Pandikkadu</a:t>
-            </a:r>
+            <a:endParaRPr lang="en-US" sz="1300" dirty="0">
+              <a:solidFill>
+                <a:srgbClr val="385D8A"/>
+              </a:solidFill>
+            </a:endParaRPr>
+          </a:p>
+          <a:p>
+            <a:pPr marL="723900" lvl="2" indent="-188913" defTabSz="839694">
+              <a:buClr>
+                <a:srgbClr val="00B0F0"/>
+              </a:buClr>
+              <a:buSzPct val="75000"/>
+              <a:buFont typeface="Wingdings 3" panose="05040102010807070707" pitchFamily="18" charset="2"/>
+              <a:buChar char="u"/>
+              <a:defRPr/>
+            </a:pPr>
             <a:endParaRPr lang="en-US" sz="1300" dirty="0">
               <a:solidFill>
                 <a:srgbClr val="385D8A"/>
@@ -8168,7 +9283,7 @@
           <p:cNvPr id="13" name="Rectangle 12">
             <a:extLst>
               <a:ext uri="{FF2B5EF4-FFF2-40B4-BE49-F238E27FC236}">
-                <a16:creationId xmlns:a16="http://schemas.microsoft.com/office/drawing/2014/main" id="{B0244096-1A82-1000-1901-2EC149673E14}"/>
+                <a16:creationId xmlns:a16="http://schemas.microsoft.com/office/drawing/2014/main" id="{059B3EAD-B410-FCF9-B20F-7925647B43ED}"/>
               </a:ext>
             </a:extLst>
           </p:cNvPr>
@@ -8178,7 +9293,7 @@
         <p:spPr>
           <a:xfrm>
             <a:off x="6076649" y="3672218"/>
-            <a:ext cx="5480904" cy="3200876"/>
+            <a:ext cx="5480904" cy="3693319"/>
           </a:xfrm>
           <a:prstGeom prst="rect">
             <a:avLst/>
@@ -8214,15 +9329,15 @@
               <a:defRPr/>
             </a:pPr>
             <a:r>
-              <a:rPr lang="en-US" sz="1100" dirty="0">
+              <a:rPr lang="en-US" sz="1300" dirty="0">
                 <a:solidFill>
                   <a:srgbClr val="385D8A"/>
                 </a:solidFill>
                 <a:hlinkClick r:id="rId3"/>
               </a:rPr>
-              <a:t>https://beinexmicrosoft-my.sharepoint.com/:f:/g/personal/dilna_dileep_beinex_com/EpqrAuMGTr5CvcrEcRoj9GkB7QcXzc80P2bPL1ZvzAAEAg?e=BmCYCx</a:t>
-            </a:r>
-            <a:endParaRPr lang="en-US" sz="1100" dirty="0">
+              <a:t>https://beinexmicrosoft-my.sharepoint.com/:u:/g/personal/dilna_dileep_beinex_com/EcQMjYcWxOlCgZte8cMaEN0Bfp6vSWbdG0nYGe0IMhREGQ?e=hHCmbo</a:t>
+            </a:r>
+            <a:endParaRPr lang="en-US" sz="1300" dirty="0">
               <a:solidFill>
                 <a:srgbClr val="385D8A"/>
               </a:solidFill>
@@ -8239,15 +9354,15 @@
               <a:defRPr/>
             </a:pPr>
             <a:r>
-              <a:rPr lang="en-US" sz="1100" dirty="0">
+              <a:rPr lang="en-US" sz="1300" dirty="0">
                 <a:solidFill>
                   <a:srgbClr val="385D8A"/>
                 </a:solidFill>
                 <a:hlinkClick r:id="rId4"/>
               </a:rPr>
-              <a:t>https://beinexmicrosoft-my.sharepoint.com/:f:/g/personal/dilna_dileep_beinex_com/Ep0OrBrDQ0ZKuut92vMCcDgBr0-CdmQPKsDT_Xn3kgX8jg?e=2Gdtlz</a:t>
-            </a:r>
-            <a:endParaRPr lang="en-US" sz="1100" dirty="0">
+              <a:t>https://beinexmicrosoft-my.sharepoint.com/:f:/g/personal/dilna_dileep_beinex_com/EjW45S8sYVFBiVIHgWSE4h0BH33VmBc5NG_cluq5cWSF8g?e=F8UjtT</a:t>
+            </a:r>
+            <a:endParaRPr lang="en-US" sz="1300" dirty="0">
               <a:solidFill>
                 <a:srgbClr val="385D8A"/>
               </a:solidFill>
@@ -8264,15 +9379,15 @@
               <a:defRPr/>
             </a:pPr>
             <a:r>
-              <a:rPr lang="en-US" sz="1100" dirty="0">
+              <a:rPr lang="en-US" sz="1300" dirty="0">
                 <a:solidFill>
                   <a:srgbClr val="385D8A"/>
                 </a:solidFill>
                 <a:hlinkClick r:id="rId5"/>
               </a:rPr>
-              <a:t>https://beinexmicrosoft-my.sharepoint.com/:f:/g/personal/dilna_dileep_beinex_com/Eosxe-kRRR5FkUrdpaP2oH0Bq8xI7FiiyiqzGYtYo5ajeg?e=1p2aTJ</a:t>
-            </a:r>
-            <a:endParaRPr lang="en-US" sz="1100" dirty="0">
+              <a:t>https://beinexmicrosoft-my.sharepoint.com/:u:/g/personal/dilna_dileep_beinex_com/EVwRV3NfhSVEkW19yPjmSIEBNN8wt039v2xn11K5q1dtFA?e=ctWgzp</a:t>
+            </a:r>
+            <a:endParaRPr lang="en-US" sz="1300" dirty="0">
               <a:solidFill>
                 <a:srgbClr val="385D8A"/>
               </a:solidFill>
@@ -8289,15 +9404,15 @@
               <a:defRPr/>
             </a:pPr>
             <a:r>
-              <a:rPr lang="en-US" sz="1100" dirty="0">
+              <a:rPr lang="en-US" sz="1300" dirty="0">
                 <a:solidFill>
                   <a:srgbClr val="385D8A"/>
                 </a:solidFill>
                 <a:hlinkClick r:id="rId6"/>
               </a:rPr>
-              <a:t>https://beinexmicrosoft-my.sharepoint.com/:f:/g/personal/dilna_dileep_beinex_com/EvLPe2oDjQpBr9Ens_t7LHAB_sleWrBE_c6KK3-9EWMuOQ?e=bka3Nm</a:t>
-            </a:r>
-            <a:endParaRPr lang="en-US" sz="1100" dirty="0">
+              <a:t>https://beinexmicrosoft-my.sharepoint.com/:u:/g/personal/dilna_dileep_beinex_com/EQ9A9RE8nwRAmo7qM3BU-doBjfdhPgz2xdHKy6u2fZlxpw?e=xeSSmI</a:t>
+            </a:r>
+            <a:endParaRPr lang="en-US" sz="1300" dirty="0">
               <a:solidFill>
                 <a:srgbClr val="385D8A"/>
               </a:solidFill>
@@ -8313,16 +9428,7 @@
               <a:buChar char="u"/>
               <a:defRPr/>
             </a:pPr>
-            <a:r>
-              <a:rPr lang="en-US" sz="1100" dirty="0">
-                <a:solidFill>
-                  <a:srgbClr val="385D8A"/>
-                </a:solidFill>
-                <a:hlinkClick r:id="rId7"/>
-              </a:rPr>
-              <a:t>https://beinexmicrosoft-my.sharepoint.com/:f:/g/personal/dilna_dileep_beinex_com/EpZJJHoAIrROtBbwoh6CoA4B6TUVM86eqPISJcoVxkqKAQ?e=DbS70r</a:t>
-            </a:r>
-            <a:endParaRPr lang="en-US" sz="1100" dirty="0">
+            <a:endParaRPr lang="en-US" sz="1300" dirty="0">
               <a:solidFill>
                 <a:srgbClr val="385D8A"/>
               </a:solidFill>
@@ -8338,7 +9444,39 @@
               <a:buChar char="u"/>
               <a:defRPr/>
             </a:pPr>
-            <a:endParaRPr lang="en-US" sz="1100" dirty="0">
+            <a:endParaRPr lang="en-US" sz="1300" dirty="0">
+              <a:solidFill>
+                <a:srgbClr val="385D8A"/>
+              </a:solidFill>
+            </a:endParaRPr>
+          </a:p>
+          <a:p>
+            <a:pPr marL="723900" lvl="2" indent="-188913" defTabSz="839694">
+              <a:buClr>
+                <a:srgbClr val="00B0F0"/>
+              </a:buClr>
+              <a:buSzPct val="75000"/>
+              <a:buFont typeface="Wingdings 3" panose="05040102010807070707" pitchFamily="18" charset="2"/>
+              <a:buChar char="u"/>
+              <a:defRPr/>
+            </a:pPr>
+            <a:endParaRPr lang="en-US" sz="1300" dirty="0">
+              <a:solidFill>
+                <a:srgbClr val="385D8A"/>
+              </a:solidFill>
+            </a:endParaRPr>
+          </a:p>
+          <a:p>
+            <a:pPr marL="723900" lvl="2" indent="-188913" defTabSz="839694">
+              <a:buClr>
+                <a:srgbClr val="00B0F0"/>
+              </a:buClr>
+              <a:buSzPct val="75000"/>
+              <a:buFont typeface="Wingdings 3" panose="05040102010807070707" pitchFamily="18" charset="2"/>
+              <a:buChar char="u"/>
+              <a:defRPr/>
+            </a:pPr>
+            <a:endParaRPr lang="en-US" sz="1300" dirty="0">
               <a:solidFill>
                 <a:srgbClr val="385D8A"/>
               </a:solidFill>
@@ -8365,7 +9503,7 @@
     </p:spTree>
     <p:extLst>
       <p:ext uri="{BB962C8B-B14F-4D97-AF65-F5344CB8AC3E}">
-        <p14:creationId xmlns:p14="http://schemas.microsoft.com/office/powerpoint/2010/main" val="184590398"/>
+        <p14:creationId xmlns:p14="http://schemas.microsoft.com/office/powerpoint/2010/main" val="580528904"/>
       </p:ext>
     </p:extLst>
   </p:cSld>
@@ -8380,7 +9518,13 @@
   <p:cSld>
     <p:spTree>
       <p:nvGrpSpPr>
-        <p:cNvPr id="1" name=""/>
+        <p:cNvPr id="1" name="">
+          <a:extLst>
+            <a:ext uri="{FF2B5EF4-FFF2-40B4-BE49-F238E27FC236}">
+              <a16:creationId xmlns:a16="http://schemas.microsoft.com/office/drawing/2014/main" id="{B8042BD5-A187-BCA5-F7BB-B386A1D012F7}"/>
+            </a:ext>
+          </a:extLst>
+        </p:cNvPr>
         <p:cNvGrpSpPr/>
         <p:nvPr/>
       </p:nvGrpSpPr>
@@ -8397,7 +9541,7 @@
           <p:cNvPr id="33" name="Rectangle 32">
             <a:extLst>
               <a:ext uri="{FF2B5EF4-FFF2-40B4-BE49-F238E27FC236}">
-                <a16:creationId xmlns:a16="http://schemas.microsoft.com/office/drawing/2014/main" id="{C68FF623-D71A-4998-A0DD-5D9D1ECA5392}"/>
+                <a16:creationId xmlns:a16="http://schemas.microsoft.com/office/drawing/2014/main" id="{C7EC8853-607B-7BDD-301B-CB7875F6176D}"/>
               </a:ext>
             </a:extLst>
           </p:cNvPr>
@@ -8449,7 +9593,7 @@
           <p:cNvPr id="34" name="Rectangle 33">
             <a:extLst>
               <a:ext uri="{FF2B5EF4-FFF2-40B4-BE49-F238E27FC236}">
-                <a16:creationId xmlns:a16="http://schemas.microsoft.com/office/drawing/2014/main" id="{FA5D2B1F-E64F-41DE-924D-BA542C34ED06}"/>
+                <a16:creationId xmlns:a16="http://schemas.microsoft.com/office/drawing/2014/main" id="{355B5F52-545F-A391-38FA-B2EDB9BCD106}"/>
               </a:ext>
             </a:extLst>
           </p:cNvPr>
@@ -8501,7 +9645,7 @@
           <p:cNvPr id="35" name="TextBox 34">
             <a:extLst>
               <a:ext uri="{FF2B5EF4-FFF2-40B4-BE49-F238E27FC236}">
-                <a16:creationId xmlns:a16="http://schemas.microsoft.com/office/drawing/2014/main" id="{0D30C5B4-C1E9-4B87-9CE1-D2BCD6B05072}"/>
+                <a16:creationId xmlns:a16="http://schemas.microsoft.com/office/drawing/2014/main" id="{5C866996-36BD-4A53-1F60-826D753F55F3}"/>
               </a:ext>
             </a:extLst>
           </p:cNvPr>
@@ -8538,23 +9682,7 @@
                   <a:srgbClr val="0070C0"/>
                 </a:solidFill>
               </a:rPr>
-              <a:t>Week 2 </a:t>
-            </a:r>
-            <a:r>
-              <a:rPr lang="en-US" sz="2600" b="1">
-                <a:solidFill>
-                  <a:srgbClr val="0070C0"/>
-                </a:solidFill>
-              </a:rPr>
-              <a:t>(14/10/2024-18/10/2024</a:t>
-            </a:r>
-            <a:r>
-              <a:rPr lang="en-US" sz="2600" b="1" dirty="0">
-                <a:solidFill>
-                  <a:srgbClr val="0070C0"/>
-                </a:solidFill>
-              </a:rPr>
-              <a:t>)</a:t>
+              <a:t>Week 3 (21/10/2024 - 25/10/2024)</a:t>
             </a:r>
           </a:p>
           <a:p>
@@ -8571,7 +9699,7 @@
           <p:cNvPr id="36" name="Picture 35" descr="A picture containing clipart&#10;&#10;Description generated with very high confidence">
             <a:extLst>
               <a:ext uri="{FF2B5EF4-FFF2-40B4-BE49-F238E27FC236}">
-                <a16:creationId xmlns:a16="http://schemas.microsoft.com/office/drawing/2014/main" id="{53078F35-D806-4F0F-98B6-75FEDA3F69BA}"/>
+                <a16:creationId xmlns:a16="http://schemas.microsoft.com/office/drawing/2014/main" id="{3C76CB36-49AA-99A2-FC8A-1D0CB8488EDF}"/>
               </a:ext>
             </a:extLst>
           </p:cNvPr>
@@ -8607,7 +9735,7 @@
           <p:cNvPr id="2" name="Rectangle 1">
             <a:extLst>
               <a:ext uri="{FF2B5EF4-FFF2-40B4-BE49-F238E27FC236}">
-                <a16:creationId xmlns:a16="http://schemas.microsoft.com/office/drawing/2014/main" id="{E9981416-A2BD-4F6F-A16A-599D44127AF2}"/>
+                <a16:creationId xmlns:a16="http://schemas.microsoft.com/office/drawing/2014/main" id="{1D1850F5-5074-9BD3-8DFD-4F6BC1BDFD7D}"/>
               </a:ext>
             </a:extLst>
           </p:cNvPr>
@@ -8657,7 +9785,7 @@
           <p:cNvPr id="7" name="Rectangle 6">
             <a:extLst>
               <a:ext uri="{FF2B5EF4-FFF2-40B4-BE49-F238E27FC236}">
-                <a16:creationId xmlns:a16="http://schemas.microsoft.com/office/drawing/2014/main" id="{CF883A6F-EBA0-4DB7-B4B3-DACE4E381459}"/>
+                <a16:creationId xmlns:a16="http://schemas.microsoft.com/office/drawing/2014/main" id="{D8353889-8CD6-92FD-6E13-FB7E6351BE45}"/>
               </a:ext>
             </a:extLst>
           </p:cNvPr>
@@ -8707,7 +9835,7 @@
           <p:cNvPr id="8" name="Rectangle 7">
             <a:extLst>
               <a:ext uri="{FF2B5EF4-FFF2-40B4-BE49-F238E27FC236}">
-                <a16:creationId xmlns:a16="http://schemas.microsoft.com/office/drawing/2014/main" id="{4EDEB4CC-B0DE-4A69-BBA1-6BA60FBCB711}"/>
+                <a16:creationId xmlns:a16="http://schemas.microsoft.com/office/drawing/2014/main" id="{FDEF7D57-5232-4364-E40C-FC032705EC12}"/>
               </a:ext>
             </a:extLst>
           </p:cNvPr>
@@ -8757,6 +9885,1348 @@
           <p:cNvPr id="9" name="Rectangle 8">
             <a:extLst>
               <a:ext uri="{FF2B5EF4-FFF2-40B4-BE49-F238E27FC236}">
+                <a16:creationId xmlns:a16="http://schemas.microsoft.com/office/drawing/2014/main" id="{7574E446-9363-A185-ED4E-DEF0AD8199B1}"/>
+              </a:ext>
+            </a:extLst>
+          </p:cNvPr>
+          <p:cNvSpPr/>
+          <p:nvPr/>
+        </p:nvSpPr>
+        <p:spPr>
+          <a:xfrm>
+            <a:off x="601742" y="1010075"/>
+            <a:ext cx="981961" cy="276999"/>
+          </a:xfrm>
+          <a:prstGeom prst="rect">
+            <a:avLst/>
+          </a:prstGeom>
+          <a:solidFill>
+            <a:schemeClr val="bg1"/>
+          </a:solidFill>
+        </p:spPr>
+        <p:txBody>
+          <a:bodyPr wrap="square">
+            <a:spAutoFit/>
+          </a:bodyPr>
+          <a:lstStyle/>
+          <a:p>
+            <a:pPr algn="ctr"/>
+            <a:r>
+              <a:rPr lang="en-AU" sz="1200" b="1" dirty="0">
+                <a:solidFill>
+                  <a:srgbClr val="0070C0"/>
+                </a:solidFill>
+                <a:latin typeface="+mj-lt"/>
+              </a:rPr>
+              <a:t>Updates</a:t>
+            </a:r>
+            <a:endParaRPr lang="en-GB" sz="1200" b="1" dirty="0">
+              <a:solidFill>
+                <a:srgbClr val="0070C0"/>
+              </a:solidFill>
+              <a:latin typeface="+mj-lt"/>
+            </a:endParaRPr>
+          </a:p>
+        </p:txBody>
+      </p:sp>
+      <p:sp>
+        <p:nvSpPr>
+          <p:cNvPr id="10" name="Rectangle 9">
+            <a:extLst>
+              <a:ext uri="{FF2B5EF4-FFF2-40B4-BE49-F238E27FC236}">
+                <a16:creationId xmlns:a16="http://schemas.microsoft.com/office/drawing/2014/main" id="{BB544520-D638-3933-9F8C-F98B593ED672}"/>
+              </a:ext>
+            </a:extLst>
+          </p:cNvPr>
+          <p:cNvSpPr/>
+          <p:nvPr/>
+        </p:nvSpPr>
+        <p:spPr>
+          <a:xfrm>
+            <a:off x="6372518" y="996661"/>
+            <a:ext cx="1918042" cy="276999"/>
+          </a:xfrm>
+          <a:prstGeom prst="rect">
+            <a:avLst/>
+          </a:prstGeom>
+          <a:solidFill>
+            <a:schemeClr val="bg1"/>
+          </a:solidFill>
+        </p:spPr>
+        <p:txBody>
+          <a:bodyPr wrap="square">
+            <a:spAutoFit/>
+          </a:bodyPr>
+          <a:lstStyle/>
+          <a:p>
+            <a:r>
+              <a:rPr lang="en-AU" sz="1200" b="1" dirty="0">
+                <a:solidFill>
+                  <a:srgbClr val="0070C0"/>
+                </a:solidFill>
+                <a:latin typeface="+mj-lt"/>
+              </a:rPr>
+              <a:t>Action Items – Trainers</a:t>
+            </a:r>
+            <a:endParaRPr lang="en-GB" sz="1200" b="1" dirty="0">
+              <a:solidFill>
+                <a:srgbClr val="0070C0"/>
+              </a:solidFill>
+              <a:latin typeface="+mj-lt"/>
+            </a:endParaRPr>
+          </a:p>
+        </p:txBody>
+      </p:sp>
+      <p:sp>
+        <p:nvSpPr>
+          <p:cNvPr id="12" name="Rectangle 11">
+            <a:extLst>
+              <a:ext uri="{FF2B5EF4-FFF2-40B4-BE49-F238E27FC236}">
+                <a16:creationId xmlns:a16="http://schemas.microsoft.com/office/drawing/2014/main" id="{928EF2D4-6E59-11A6-A3CF-5D42879B3498}"/>
+              </a:ext>
+            </a:extLst>
+          </p:cNvPr>
+          <p:cNvSpPr/>
+          <p:nvPr/>
+        </p:nvSpPr>
+        <p:spPr>
+          <a:xfrm>
+            <a:off x="6372516" y="3742296"/>
+            <a:ext cx="1918043" cy="276999"/>
+          </a:xfrm>
+          <a:prstGeom prst="rect">
+            <a:avLst/>
+          </a:prstGeom>
+          <a:solidFill>
+            <a:schemeClr val="bg1"/>
+          </a:solidFill>
+        </p:spPr>
+        <p:txBody>
+          <a:bodyPr wrap="square">
+            <a:spAutoFit/>
+          </a:bodyPr>
+          <a:lstStyle/>
+          <a:p>
+            <a:r>
+              <a:rPr lang="en-AU" sz="1200" b="1" dirty="0">
+                <a:solidFill>
+                  <a:srgbClr val="0070C0"/>
+                </a:solidFill>
+                <a:latin typeface="+mj-lt"/>
+              </a:rPr>
+              <a:t>Action Items – Interns</a:t>
+            </a:r>
+            <a:endParaRPr lang="en-GB" sz="1200" b="1" dirty="0">
+              <a:solidFill>
+                <a:srgbClr val="0070C0"/>
+              </a:solidFill>
+              <a:latin typeface="+mj-lt"/>
+            </a:endParaRPr>
+          </a:p>
+        </p:txBody>
+      </p:sp>
+      <p:sp>
+        <p:nvSpPr>
+          <p:cNvPr id="3" name="Rectangle 2">
+            <a:extLst>
+              <a:ext uri="{FF2B5EF4-FFF2-40B4-BE49-F238E27FC236}">
+                <a16:creationId xmlns:a16="http://schemas.microsoft.com/office/drawing/2014/main" id="{82BCACB3-8D58-DB12-A3BE-538A876652C8}"/>
+              </a:ext>
+            </a:extLst>
+          </p:cNvPr>
+          <p:cNvSpPr/>
+          <p:nvPr/>
+        </p:nvSpPr>
+        <p:spPr>
+          <a:xfrm>
+            <a:off x="446694" y="1537918"/>
+            <a:ext cx="5290010" cy="5509200"/>
+          </a:xfrm>
+          <a:prstGeom prst="rect">
+            <a:avLst/>
+          </a:prstGeom>
+        </p:spPr>
+        <p:txBody>
+          <a:bodyPr wrap="square">
+            <a:spAutoFit/>
+          </a:bodyPr>
+          <a:lstStyle/>
+          <a:p>
+            <a:pPr marL="266700" lvl="1" indent="-188913" defTabSz="839694">
+              <a:buClr>
+                <a:srgbClr val="00B0F0"/>
+              </a:buClr>
+              <a:buSzPct val="75000"/>
+              <a:buFont typeface="Wingdings 3" panose="05040102010807070707" pitchFamily="18" charset="2"/>
+              <a:buChar char="u"/>
+              <a:defRPr/>
+            </a:pPr>
+            <a:endParaRPr lang="en-US" sz="1400" b="1" dirty="0">
+              <a:solidFill>
+                <a:srgbClr val="385D8A"/>
+              </a:solidFill>
+            </a:endParaRPr>
+          </a:p>
+          <a:p>
+            <a:pPr marL="534987" lvl="2" defTabSz="839694">
+              <a:buClr>
+                <a:srgbClr val="00B0F0"/>
+              </a:buClr>
+              <a:buSzPct val="75000"/>
+              <a:defRPr/>
+            </a:pPr>
+            <a:r>
+              <a:rPr lang="en-US" sz="1300" dirty="0">
+                <a:solidFill>
+                  <a:srgbClr val="385D8A"/>
+                </a:solidFill>
+              </a:rPr>
+              <a:t>21/10/2024 – JavaScript Day 1 started , session focused on  		                 variables , functions , scop , etc. And task submission.</a:t>
+            </a:r>
+          </a:p>
+          <a:p>
+            <a:pPr marL="534987" lvl="2" defTabSz="839694">
+              <a:buClr>
+                <a:srgbClr val="00B0F0"/>
+              </a:buClr>
+              <a:buSzPct val="75000"/>
+              <a:defRPr/>
+            </a:pPr>
+            <a:endParaRPr lang="en-US" sz="1300" dirty="0">
+              <a:solidFill>
+                <a:srgbClr val="385D8A"/>
+              </a:solidFill>
+            </a:endParaRPr>
+          </a:p>
+          <a:p>
+            <a:pPr marL="534987" lvl="2" defTabSz="839694">
+              <a:buClr>
+                <a:srgbClr val="00B0F0"/>
+              </a:buClr>
+              <a:buSzPct val="75000"/>
+              <a:defRPr/>
+            </a:pPr>
+            <a:r>
+              <a:rPr lang="en-US" sz="1300" dirty="0">
+                <a:solidFill>
+                  <a:srgbClr val="385D8A"/>
+                </a:solidFill>
+              </a:rPr>
+              <a:t>22/10/2024 – Session focused Array and Object methods , and task submission.</a:t>
+            </a:r>
+          </a:p>
+          <a:p>
+            <a:pPr marL="534987" lvl="2" defTabSz="839694">
+              <a:buClr>
+                <a:srgbClr val="00B0F0"/>
+              </a:buClr>
+              <a:buSzPct val="75000"/>
+              <a:defRPr/>
+            </a:pPr>
+            <a:endParaRPr lang="en-US" sz="1300" dirty="0">
+              <a:solidFill>
+                <a:srgbClr val="385D8A"/>
+              </a:solidFill>
+            </a:endParaRPr>
+          </a:p>
+          <a:p>
+            <a:pPr marL="534987" lvl="2" defTabSz="839694">
+              <a:buClr>
+                <a:srgbClr val="00B0F0"/>
+              </a:buClr>
+              <a:buSzPct val="75000"/>
+              <a:defRPr/>
+            </a:pPr>
+            <a:r>
+              <a:rPr lang="en-US" sz="1300" dirty="0">
+                <a:solidFill>
+                  <a:srgbClr val="385D8A"/>
+                </a:solidFill>
+              </a:rPr>
+              <a:t>23/10/2024 – Session is about error handling and debugging , Also Task submission.</a:t>
+            </a:r>
+          </a:p>
+          <a:p>
+            <a:pPr marL="534987" lvl="2" defTabSz="839694">
+              <a:buClr>
+                <a:srgbClr val="00B0F0"/>
+              </a:buClr>
+              <a:buSzPct val="75000"/>
+              <a:defRPr/>
+            </a:pPr>
+            <a:endParaRPr lang="en-US" sz="1300" dirty="0">
+              <a:solidFill>
+                <a:srgbClr val="385D8A"/>
+              </a:solidFill>
+            </a:endParaRPr>
+          </a:p>
+          <a:p>
+            <a:pPr marL="534987" lvl="2" defTabSz="839694">
+              <a:buClr>
+                <a:srgbClr val="00B0F0"/>
+              </a:buClr>
+              <a:buSzPct val="75000"/>
+              <a:defRPr/>
+            </a:pPr>
+            <a:r>
+              <a:rPr lang="en-US" sz="1300" dirty="0">
+                <a:solidFill>
+                  <a:srgbClr val="385D8A"/>
+                </a:solidFill>
+              </a:rPr>
+              <a:t>24/10/2024 – Session is about DOM and Task submission.</a:t>
+            </a:r>
+          </a:p>
+          <a:p>
+            <a:pPr marL="534987" lvl="2" defTabSz="839694">
+              <a:buClr>
+                <a:srgbClr val="00B0F0"/>
+              </a:buClr>
+              <a:buSzPct val="75000"/>
+              <a:defRPr/>
+            </a:pPr>
+            <a:endParaRPr lang="en-US" sz="1300" dirty="0">
+              <a:solidFill>
+                <a:srgbClr val="385D8A"/>
+              </a:solidFill>
+            </a:endParaRPr>
+          </a:p>
+          <a:p>
+            <a:pPr marL="534987" lvl="2" defTabSz="839694">
+              <a:buClr>
+                <a:srgbClr val="00B0F0"/>
+              </a:buClr>
+              <a:buSzPct val="75000"/>
+              <a:defRPr/>
+            </a:pPr>
+            <a:r>
+              <a:rPr lang="en-US" sz="1300" dirty="0">
+                <a:solidFill>
+                  <a:srgbClr val="385D8A"/>
+                </a:solidFill>
+              </a:rPr>
+              <a:t>25/10/2024 – Session is about Event handling and Task submission.</a:t>
+            </a:r>
+          </a:p>
+          <a:p>
+            <a:pPr marL="534987" lvl="2" defTabSz="839694">
+              <a:buClr>
+                <a:srgbClr val="00B0F0"/>
+              </a:buClr>
+              <a:buSzPct val="75000"/>
+              <a:defRPr/>
+            </a:pPr>
+            <a:endParaRPr lang="en-US" sz="1300" dirty="0">
+              <a:solidFill>
+                <a:srgbClr val="385D8A"/>
+              </a:solidFill>
+            </a:endParaRPr>
+          </a:p>
+          <a:p>
+            <a:pPr marL="534987" lvl="2" defTabSz="839694">
+              <a:buClr>
+                <a:srgbClr val="00B0F0"/>
+              </a:buClr>
+              <a:buSzPct val="75000"/>
+              <a:defRPr/>
+            </a:pPr>
+            <a:endParaRPr lang="en-US" sz="1300" dirty="0">
+              <a:solidFill>
+                <a:srgbClr val="385D8A"/>
+              </a:solidFill>
+            </a:endParaRPr>
+          </a:p>
+          <a:p>
+            <a:pPr marL="534987" lvl="2" defTabSz="839694">
+              <a:buClr>
+                <a:srgbClr val="00B0F0"/>
+              </a:buClr>
+              <a:buSzPct val="75000"/>
+              <a:defRPr/>
+            </a:pPr>
+            <a:endParaRPr lang="en-US" sz="1300" dirty="0">
+              <a:solidFill>
+                <a:srgbClr val="385D8A"/>
+              </a:solidFill>
+            </a:endParaRPr>
+          </a:p>
+          <a:p>
+            <a:pPr marL="534987" lvl="2" defTabSz="839694">
+              <a:buClr>
+                <a:srgbClr val="00B0F0"/>
+              </a:buClr>
+              <a:buSzPct val="75000"/>
+              <a:defRPr/>
+            </a:pPr>
+            <a:endParaRPr lang="en-US" sz="1300" dirty="0">
+              <a:solidFill>
+                <a:srgbClr val="385D8A"/>
+              </a:solidFill>
+            </a:endParaRPr>
+          </a:p>
+          <a:p>
+            <a:pPr marL="534987" lvl="2" defTabSz="839694">
+              <a:buClr>
+                <a:srgbClr val="00B0F0"/>
+              </a:buClr>
+              <a:buSzPct val="75000"/>
+              <a:defRPr/>
+            </a:pPr>
+            <a:endParaRPr lang="en-US" sz="1300" dirty="0">
+              <a:solidFill>
+                <a:srgbClr val="385D8A"/>
+              </a:solidFill>
+            </a:endParaRPr>
+          </a:p>
+          <a:p>
+            <a:pPr marL="534987" lvl="2" defTabSz="839694">
+              <a:buClr>
+                <a:srgbClr val="00B0F0"/>
+              </a:buClr>
+              <a:buSzPct val="75000"/>
+              <a:defRPr/>
+            </a:pPr>
+            <a:endParaRPr lang="en-US" sz="1300" dirty="0">
+              <a:solidFill>
+                <a:srgbClr val="385D8A"/>
+              </a:solidFill>
+            </a:endParaRPr>
+          </a:p>
+          <a:p>
+            <a:pPr marL="534987" lvl="2" defTabSz="839694">
+              <a:buClr>
+                <a:srgbClr val="00B0F0"/>
+              </a:buClr>
+              <a:buSzPct val="75000"/>
+              <a:defRPr/>
+            </a:pPr>
+            <a:endParaRPr lang="en-US" sz="1300" dirty="0">
+              <a:solidFill>
+                <a:srgbClr val="385D8A"/>
+              </a:solidFill>
+            </a:endParaRPr>
+          </a:p>
+          <a:p>
+            <a:pPr marL="534987" lvl="2" defTabSz="839694">
+              <a:buClr>
+                <a:srgbClr val="00B0F0"/>
+              </a:buClr>
+              <a:buSzPct val="75000"/>
+              <a:defRPr/>
+            </a:pPr>
+            <a:endParaRPr lang="en-US" sz="1300" dirty="0">
+              <a:solidFill>
+                <a:srgbClr val="385D8A"/>
+              </a:solidFill>
+            </a:endParaRPr>
+          </a:p>
+          <a:p>
+            <a:pPr marL="534987" lvl="2" defTabSz="839694">
+              <a:buClr>
+                <a:srgbClr val="00B0F0"/>
+              </a:buClr>
+              <a:buSzPct val="75000"/>
+              <a:defRPr/>
+            </a:pPr>
+            <a:endParaRPr lang="en-US" sz="1300" dirty="0">
+              <a:solidFill>
+                <a:srgbClr val="385D8A"/>
+              </a:solidFill>
+            </a:endParaRPr>
+          </a:p>
+          <a:p>
+            <a:pPr marL="534987" lvl="2" defTabSz="839694">
+              <a:buClr>
+                <a:srgbClr val="00B0F0"/>
+              </a:buClr>
+              <a:buSzPct val="75000"/>
+              <a:defRPr/>
+            </a:pPr>
+            <a:endParaRPr lang="en-US" sz="1300" dirty="0">
+              <a:solidFill>
+                <a:srgbClr val="385D8A"/>
+              </a:solidFill>
+            </a:endParaRPr>
+          </a:p>
+          <a:p>
+            <a:pPr marL="534987" lvl="2" defTabSz="839694">
+              <a:buClr>
+                <a:srgbClr val="00B0F0"/>
+              </a:buClr>
+              <a:buSzPct val="75000"/>
+              <a:defRPr/>
+            </a:pPr>
+            <a:endParaRPr lang="en-US" sz="1300" dirty="0">
+              <a:solidFill>
+                <a:srgbClr val="385D8A"/>
+              </a:solidFill>
+            </a:endParaRPr>
+          </a:p>
+          <a:p>
+            <a:pPr marL="534987" lvl="2" defTabSz="839694">
+              <a:buClr>
+                <a:srgbClr val="00B0F0"/>
+              </a:buClr>
+              <a:buSzPct val="75000"/>
+              <a:defRPr/>
+            </a:pPr>
+            <a:endParaRPr lang="en-US" sz="1300" dirty="0">
+              <a:solidFill>
+                <a:srgbClr val="385D8A"/>
+              </a:solidFill>
+            </a:endParaRPr>
+          </a:p>
+          <a:p>
+            <a:pPr marL="534987" lvl="2" defTabSz="839694">
+              <a:buClr>
+                <a:srgbClr val="00B0F0"/>
+              </a:buClr>
+              <a:buSzPct val="75000"/>
+              <a:defRPr/>
+            </a:pPr>
+            <a:endParaRPr lang="en-US" sz="1300" dirty="0">
+              <a:solidFill>
+                <a:srgbClr val="385D8A"/>
+              </a:solidFill>
+            </a:endParaRPr>
+          </a:p>
+          <a:p>
+            <a:pPr marL="266700" lvl="1" indent="-188913" defTabSz="839694">
+              <a:buClr>
+                <a:srgbClr val="00B0F0"/>
+              </a:buClr>
+              <a:buSzPct val="75000"/>
+              <a:buFont typeface="Wingdings 3" panose="05040102010807070707" pitchFamily="18" charset="2"/>
+              <a:buChar char="u"/>
+              <a:defRPr/>
+            </a:pPr>
+            <a:endParaRPr lang="en-US" sz="1300" dirty="0">
+              <a:solidFill>
+                <a:srgbClr val="385D8A"/>
+              </a:solidFill>
+            </a:endParaRPr>
+          </a:p>
+        </p:txBody>
+      </p:sp>
+      <p:sp>
+        <p:nvSpPr>
+          <p:cNvPr id="14" name="Rectangle 13">
+            <a:extLst>
+              <a:ext uri="{FF2B5EF4-FFF2-40B4-BE49-F238E27FC236}">
+                <a16:creationId xmlns:a16="http://schemas.microsoft.com/office/drawing/2014/main" id="{A271BEAF-6E80-B875-821C-CB4FF884A759}"/>
+              </a:ext>
+            </a:extLst>
+          </p:cNvPr>
+          <p:cNvSpPr/>
+          <p:nvPr/>
+        </p:nvSpPr>
+        <p:spPr>
+          <a:xfrm>
+            <a:off x="6286894" y="1273660"/>
+            <a:ext cx="5290010" cy="1692771"/>
+          </a:xfrm>
+          <a:prstGeom prst="rect">
+            <a:avLst/>
+          </a:prstGeom>
+        </p:spPr>
+        <p:txBody>
+          <a:bodyPr wrap="square">
+            <a:spAutoFit/>
+          </a:bodyPr>
+          <a:lstStyle/>
+          <a:p>
+            <a:pPr marL="534987" lvl="2" defTabSz="839694">
+              <a:buClr>
+                <a:srgbClr val="00B0F0"/>
+              </a:buClr>
+              <a:buSzPct val="75000"/>
+              <a:defRPr/>
+            </a:pPr>
+            <a:endParaRPr lang="en-US" sz="1300" dirty="0">
+              <a:solidFill>
+                <a:srgbClr val="385D8A"/>
+              </a:solidFill>
+            </a:endParaRPr>
+          </a:p>
+          <a:p>
+            <a:pPr marL="723900" lvl="2" indent="-188913" defTabSz="839694">
+              <a:buClr>
+                <a:srgbClr val="00B0F0"/>
+              </a:buClr>
+              <a:buSzPct val="75000"/>
+              <a:buFont typeface="Wingdings 3" panose="05040102010807070707" pitchFamily="18" charset="2"/>
+              <a:buChar char="u"/>
+              <a:defRPr/>
+            </a:pPr>
+            <a:r>
+              <a:rPr lang="en-US" sz="1300" dirty="0">
+                <a:solidFill>
+                  <a:srgbClr val="385D8A"/>
+                </a:solidFill>
+              </a:rPr>
+              <a:t>21/10/2024 – </a:t>
+            </a:r>
+            <a:r>
+              <a:rPr lang="en-US" sz="1300" dirty="0" err="1">
+                <a:solidFill>
+                  <a:srgbClr val="385D8A"/>
+                </a:solidFill>
+              </a:rPr>
+              <a:t>Dhanya</a:t>
+            </a:r>
+            <a:r>
+              <a:rPr lang="en-US" sz="1300" dirty="0">
+                <a:solidFill>
+                  <a:srgbClr val="385D8A"/>
+                </a:solidFill>
+              </a:rPr>
+              <a:t> </a:t>
+            </a:r>
+            <a:r>
+              <a:rPr lang="en-US" sz="1300" dirty="0" err="1">
+                <a:solidFill>
+                  <a:srgbClr val="385D8A"/>
+                </a:solidFill>
+              </a:rPr>
+              <a:t>Sethu</a:t>
+            </a:r>
+            <a:endParaRPr lang="en-US" sz="1300" dirty="0">
+              <a:solidFill>
+                <a:srgbClr val="385D8A"/>
+              </a:solidFill>
+            </a:endParaRPr>
+          </a:p>
+          <a:p>
+            <a:pPr marL="723900" lvl="2" indent="-188913" defTabSz="839694">
+              <a:buClr>
+                <a:srgbClr val="00B0F0"/>
+              </a:buClr>
+              <a:buSzPct val="75000"/>
+              <a:buFont typeface="Wingdings 3" panose="05040102010807070707" pitchFamily="18" charset="2"/>
+              <a:buChar char="u"/>
+              <a:defRPr/>
+            </a:pPr>
+            <a:r>
+              <a:rPr lang="en-US" sz="1300" dirty="0">
+                <a:solidFill>
+                  <a:srgbClr val="385D8A"/>
+                </a:solidFill>
+              </a:rPr>
+              <a:t>22/10/2024 – Ajay K J</a:t>
+            </a:r>
+          </a:p>
+          <a:p>
+            <a:pPr marL="723900" lvl="2" indent="-188913" defTabSz="839694">
+              <a:buClr>
+                <a:srgbClr val="00B0F0"/>
+              </a:buClr>
+              <a:buSzPct val="75000"/>
+              <a:buFont typeface="Wingdings 3" panose="05040102010807070707" pitchFamily="18" charset="2"/>
+              <a:buChar char="u"/>
+              <a:defRPr/>
+            </a:pPr>
+            <a:r>
+              <a:rPr lang="en-US" sz="1300" dirty="0">
+                <a:solidFill>
+                  <a:srgbClr val="385D8A"/>
+                </a:solidFill>
+              </a:rPr>
+              <a:t>23/10/2024 – Ajay K J</a:t>
+            </a:r>
+          </a:p>
+          <a:p>
+            <a:pPr marL="723900" lvl="2" indent="-188913" defTabSz="839694">
+              <a:buClr>
+                <a:srgbClr val="00B0F0"/>
+              </a:buClr>
+              <a:buSzPct val="75000"/>
+              <a:buFont typeface="Wingdings 3" panose="05040102010807070707" pitchFamily="18" charset="2"/>
+              <a:buChar char="u"/>
+              <a:defRPr/>
+            </a:pPr>
+            <a:r>
+              <a:rPr lang="en-US" sz="1300" dirty="0">
+                <a:solidFill>
+                  <a:srgbClr val="385D8A"/>
+                </a:solidFill>
+              </a:rPr>
+              <a:t>24/10/2024 - Madhu </a:t>
+            </a:r>
+            <a:r>
+              <a:rPr lang="en-US" sz="1300" dirty="0" err="1">
+                <a:solidFill>
+                  <a:srgbClr val="385D8A"/>
+                </a:solidFill>
+              </a:rPr>
+              <a:t>Pandikkadu</a:t>
+            </a:r>
+            <a:endParaRPr lang="en-US" sz="1300" dirty="0">
+              <a:solidFill>
+                <a:srgbClr val="385D8A"/>
+              </a:solidFill>
+            </a:endParaRPr>
+          </a:p>
+          <a:p>
+            <a:pPr marL="723900" lvl="2" indent="-188913" defTabSz="839694">
+              <a:buClr>
+                <a:srgbClr val="00B0F0"/>
+              </a:buClr>
+              <a:buSzPct val="75000"/>
+              <a:buFont typeface="Wingdings 3" panose="05040102010807070707" pitchFamily="18" charset="2"/>
+              <a:buChar char="u"/>
+              <a:defRPr/>
+            </a:pPr>
+            <a:r>
+              <a:rPr lang="en-US" sz="1300" dirty="0">
+                <a:solidFill>
+                  <a:srgbClr val="385D8A"/>
+                </a:solidFill>
+              </a:rPr>
+              <a:t>25/10/2024 - Madhu </a:t>
+            </a:r>
+            <a:r>
+              <a:rPr lang="en-US" sz="1300" dirty="0" err="1">
+                <a:solidFill>
+                  <a:srgbClr val="385D8A"/>
+                </a:solidFill>
+              </a:rPr>
+              <a:t>Pandikkadu</a:t>
+            </a:r>
+            <a:endParaRPr lang="en-US" sz="1300" dirty="0">
+              <a:solidFill>
+                <a:srgbClr val="385D8A"/>
+              </a:solidFill>
+            </a:endParaRPr>
+          </a:p>
+          <a:p>
+            <a:pPr marL="723900" lvl="2" indent="-188913" defTabSz="839694">
+              <a:buClr>
+                <a:srgbClr val="00B0F0"/>
+              </a:buClr>
+              <a:buSzPct val="75000"/>
+              <a:buFont typeface="Wingdings 3" panose="05040102010807070707" pitchFamily="18" charset="2"/>
+              <a:buChar char="u"/>
+              <a:defRPr/>
+            </a:pPr>
+            <a:endParaRPr lang="en-US" sz="1300" dirty="0">
+              <a:solidFill>
+                <a:srgbClr val="385D8A"/>
+              </a:solidFill>
+            </a:endParaRPr>
+          </a:p>
+          <a:p>
+            <a:pPr marL="77787" lvl="1" defTabSz="839694">
+              <a:spcBef>
+                <a:spcPts val="0"/>
+              </a:spcBef>
+              <a:buClr>
+                <a:srgbClr val="00B0F0"/>
+              </a:buClr>
+              <a:buSzPct val="75000"/>
+              <a:defRPr/>
+            </a:pPr>
+            <a:endParaRPr lang="en-US" sz="1300" dirty="0">
+              <a:solidFill>
+                <a:srgbClr val="385D8A"/>
+              </a:solidFill>
+            </a:endParaRPr>
+          </a:p>
+        </p:txBody>
+      </p:sp>
+      <p:sp>
+        <p:nvSpPr>
+          <p:cNvPr id="13" name="Rectangle 12">
+            <a:extLst>
+              <a:ext uri="{FF2B5EF4-FFF2-40B4-BE49-F238E27FC236}">
+                <a16:creationId xmlns:a16="http://schemas.microsoft.com/office/drawing/2014/main" id="{B0244096-1A82-1000-1901-2EC149673E14}"/>
+              </a:ext>
+            </a:extLst>
+          </p:cNvPr>
+          <p:cNvSpPr/>
+          <p:nvPr/>
+        </p:nvSpPr>
+        <p:spPr>
+          <a:xfrm>
+            <a:off x="6076649" y="3672218"/>
+            <a:ext cx="5480904" cy="3200876"/>
+          </a:xfrm>
+          <a:prstGeom prst="rect">
+            <a:avLst/>
+          </a:prstGeom>
+        </p:spPr>
+        <p:txBody>
+          <a:bodyPr wrap="square">
+            <a:spAutoFit/>
+          </a:bodyPr>
+          <a:lstStyle/>
+          <a:p>
+            <a:pPr marL="534987" lvl="2" defTabSz="839694">
+              <a:buClr>
+                <a:srgbClr val="00B0F0"/>
+              </a:buClr>
+              <a:buSzPct val="75000"/>
+              <a:defRPr/>
+            </a:pPr>
+            <a:endParaRPr lang="en-US" sz="1300" dirty="0">
+              <a:solidFill>
+                <a:srgbClr val="385D8A"/>
+              </a:solidFill>
+            </a:endParaRPr>
+          </a:p>
+          <a:p>
+            <a:pPr marL="723900" lvl="2" indent="-188913" defTabSz="839694">
+              <a:buClr>
+                <a:srgbClr val="00B0F0"/>
+              </a:buClr>
+              <a:buSzPct val="75000"/>
+              <a:buFont typeface="Wingdings 3" panose="05040102010807070707" pitchFamily="18" charset="2"/>
+              <a:buChar char="u"/>
+              <a:defRPr/>
+            </a:pPr>
+            <a:r>
+              <a:rPr lang="en-US" sz="1100" dirty="0">
+                <a:solidFill>
+                  <a:srgbClr val="385D8A"/>
+                </a:solidFill>
+                <a:hlinkClick r:id="rId3"/>
+              </a:rPr>
+              <a:t>https://beinexmicrosoft-my.sharepoint.com/:f:/g/personal/dilna_dileep_beinex_com/EpqrAuMGTr5CvcrEcRoj9GkB7QcXzc80P2bPL1ZvzAAEAg?e=BmCYCx</a:t>
+            </a:r>
+            <a:endParaRPr lang="en-US" sz="1100" dirty="0">
+              <a:solidFill>
+                <a:srgbClr val="385D8A"/>
+              </a:solidFill>
+            </a:endParaRPr>
+          </a:p>
+          <a:p>
+            <a:pPr marL="723900" lvl="2" indent="-188913" defTabSz="839694">
+              <a:buClr>
+                <a:srgbClr val="00B0F0"/>
+              </a:buClr>
+              <a:buSzPct val="75000"/>
+              <a:buFont typeface="Wingdings 3" panose="05040102010807070707" pitchFamily="18" charset="2"/>
+              <a:buChar char="u"/>
+              <a:defRPr/>
+            </a:pPr>
+            <a:r>
+              <a:rPr lang="en-US" sz="1100" dirty="0">
+                <a:solidFill>
+                  <a:srgbClr val="385D8A"/>
+                </a:solidFill>
+                <a:hlinkClick r:id="rId4"/>
+              </a:rPr>
+              <a:t>https://beinexmicrosoft-my.sharepoint.com/:f:/g/personal/dilna_dileep_beinex_com/Ep0OrBrDQ0ZKuut92vMCcDgBr0-CdmQPKsDT_Xn3kgX8jg?e=2Gdtlz</a:t>
+            </a:r>
+            <a:endParaRPr lang="en-US" sz="1100" dirty="0">
+              <a:solidFill>
+                <a:srgbClr val="385D8A"/>
+              </a:solidFill>
+            </a:endParaRPr>
+          </a:p>
+          <a:p>
+            <a:pPr marL="723900" lvl="2" indent="-188913" defTabSz="839694">
+              <a:buClr>
+                <a:srgbClr val="00B0F0"/>
+              </a:buClr>
+              <a:buSzPct val="75000"/>
+              <a:buFont typeface="Wingdings 3" panose="05040102010807070707" pitchFamily="18" charset="2"/>
+              <a:buChar char="u"/>
+              <a:defRPr/>
+            </a:pPr>
+            <a:r>
+              <a:rPr lang="en-US" sz="1100" dirty="0">
+                <a:solidFill>
+                  <a:srgbClr val="385D8A"/>
+                </a:solidFill>
+                <a:hlinkClick r:id="rId5"/>
+              </a:rPr>
+              <a:t>https://beinexmicrosoft-my.sharepoint.com/:f:/g/personal/dilna_dileep_beinex_com/Eosxe-kRRR5FkUrdpaP2oH0Bq8xI7FiiyiqzGYtYo5ajeg?e=1p2aTJ</a:t>
+            </a:r>
+            <a:endParaRPr lang="en-US" sz="1100" dirty="0">
+              <a:solidFill>
+                <a:srgbClr val="385D8A"/>
+              </a:solidFill>
+            </a:endParaRPr>
+          </a:p>
+          <a:p>
+            <a:pPr marL="723900" lvl="2" indent="-188913" defTabSz="839694">
+              <a:buClr>
+                <a:srgbClr val="00B0F0"/>
+              </a:buClr>
+              <a:buSzPct val="75000"/>
+              <a:buFont typeface="Wingdings 3" panose="05040102010807070707" pitchFamily="18" charset="2"/>
+              <a:buChar char="u"/>
+              <a:defRPr/>
+            </a:pPr>
+            <a:r>
+              <a:rPr lang="en-US" sz="1100" dirty="0">
+                <a:solidFill>
+                  <a:srgbClr val="385D8A"/>
+                </a:solidFill>
+                <a:hlinkClick r:id="rId6"/>
+              </a:rPr>
+              <a:t>https://beinexmicrosoft-my.sharepoint.com/:f:/g/personal/dilna_dileep_beinex_com/EvLPe2oDjQpBr9Ens_t7LHAB_sleWrBE_c6KK3-9EWMuOQ?e=bka3Nm</a:t>
+            </a:r>
+            <a:endParaRPr lang="en-US" sz="1100" dirty="0">
+              <a:solidFill>
+                <a:srgbClr val="385D8A"/>
+              </a:solidFill>
+            </a:endParaRPr>
+          </a:p>
+          <a:p>
+            <a:pPr marL="723900" lvl="2" indent="-188913" defTabSz="839694">
+              <a:buClr>
+                <a:srgbClr val="00B0F0"/>
+              </a:buClr>
+              <a:buSzPct val="75000"/>
+              <a:buFont typeface="Wingdings 3" panose="05040102010807070707" pitchFamily="18" charset="2"/>
+              <a:buChar char="u"/>
+              <a:defRPr/>
+            </a:pPr>
+            <a:r>
+              <a:rPr lang="en-US" sz="1100" dirty="0">
+                <a:solidFill>
+                  <a:srgbClr val="385D8A"/>
+                </a:solidFill>
+                <a:hlinkClick r:id="rId7"/>
+              </a:rPr>
+              <a:t>https://beinexmicrosoft-my.sharepoint.com/:f:/g/personal/dilna_dileep_beinex_com/EpZJJHoAIrROtBbwoh6CoA4B6TUVM86eqPISJcoVxkqKAQ?e=DbS70r</a:t>
+            </a:r>
+            <a:endParaRPr lang="en-US" sz="1100" dirty="0">
+              <a:solidFill>
+                <a:srgbClr val="385D8A"/>
+              </a:solidFill>
+            </a:endParaRPr>
+          </a:p>
+          <a:p>
+            <a:pPr marL="723900" lvl="2" indent="-188913" defTabSz="839694">
+              <a:buClr>
+                <a:srgbClr val="00B0F0"/>
+              </a:buClr>
+              <a:buSzPct val="75000"/>
+              <a:buFont typeface="Wingdings 3" panose="05040102010807070707" pitchFamily="18" charset="2"/>
+              <a:buChar char="u"/>
+              <a:defRPr/>
+            </a:pPr>
+            <a:endParaRPr lang="en-US" sz="1100" dirty="0">
+              <a:solidFill>
+                <a:srgbClr val="385D8A"/>
+              </a:solidFill>
+            </a:endParaRPr>
+          </a:p>
+          <a:p>
+            <a:pPr marL="723900" lvl="2" indent="-188913" defTabSz="839694">
+              <a:buClr>
+                <a:srgbClr val="00B0F0"/>
+              </a:buClr>
+              <a:buSzPct val="75000"/>
+              <a:buFont typeface="Wingdings 3" panose="05040102010807070707" pitchFamily="18" charset="2"/>
+              <a:buChar char="u"/>
+              <a:defRPr/>
+            </a:pPr>
+            <a:endParaRPr lang="en-US" sz="1300" dirty="0">
+              <a:solidFill>
+                <a:srgbClr val="385D8A"/>
+              </a:solidFill>
+            </a:endParaRPr>
+          </a:p>
+        </p:txBody>
+      </p:sp>
+    </p:spTree>
+    <p:extLst>
+      <p:ext uri="{BB962C8B-B14F-4D97-AF65-F5344CB8AC3E}">
+        <p14:creationId xmlns:p14="http://schemas.microsoft.com/office/powerpoint/2010/main" val="184590398"/>
+      </p:ext>
+    </p:extLst>
+  </p:cSld>
+  <p:clrMapOvr>
+    <a:masterClrMapping/>
+  </p:clrMapOvr>
+</p:sld>
+</file>
+
+<file path=ppt/slides/slide7.xml><?xml version="1.0" encoding="utf-8"?>
+<p:sld xmlns:a="http://schemas.openxmlformats.org/drawingml/2006/main" xmlns:r="http://schemas.openxmlformats.org/officeDocument/2006/relationships" xmlns:p="http://schemas.openxmlformats.org/presentationml/2006/main">
+  <p:cSld>
+    <p:spTree>
+      <p:nvGrpSpPr>
+        <p:cNvPr id="1" name=""/>
+        <p:cNvGrpSpPr/>
+        <p:nvPr/>
+      </p:nvGrpSpPr>
+      <p:grpSpPr>
+        <a:xfrm>
+          <a:off x="0" y="0"/>
+          <a:ext cx="0" cy="0"/>
+          <a:chOff x="0" y="0"/>
+          <a:chExt cx="0" cy="0"/>
+        </a:xfrm>
+      </p:grpSpPr>
+      <p:sp>
+        <p:nvSpPr>
+          <p:cNvPr id="33" name="Rectangle 32">
+            <a:extLst>
+              <a:ext uri="{FF2B5EF4-FFF2-40B4-BE49-F238E27FC236}">
+                <a16:creationId xmlns:a16="http://schemas.microsoft.com/office/drawing/2014/main" id="{C68FF623-D71A-4998-A0DD-5D9D1ECA5392}"/>
+              </a:ext>
+            </a:extLst>
+          </p:cNvPr>
+          <p:cNvSpPr/>
+          <p:nvPr/>
+        </p:nvSpPr>
+        <p:spPr>
+          <a:xfrm>
+            <a:off x="0" y="6644608"/>
+            <a:ext cx="12192000" cy="213392"/>
+          </a:xfrm>
+          <a:prstGeom prst="rect">
+            <a:avLst/>
+          </a:prstGeom>
+          <a:solidFill>
+            <a:srgbClr val="00B0F0"/>
+          </a:solidFill>
+          <a:ln>
+            <a:noFill/>
+          </a:ln>
+        </p:spPr>
+        <p:style>
+          <a:lnRef idx="2">
+            <a:schemeClr val="accent1">
+              <a:shade val="50000"/>
+            </a:schemeClr>
+          </a:lnRef>
+          <a:fillRef idx="1">
+            <a:schemeClr val="accent1"/>
+          </a:fillRef>
+          <a:effectRef idx="0">
+            <a:schemeClr val="accent1"/>
+          </a:effectRef>
+          <a:fontRef idx="minor">
+            <a:schemeClr val="lt1"/>
+          </a:fontRef>
+        </p:style>
+        <p:txBody>
+          <a:bodyPr rtlCol="0" anchor="ctr"/>
+          <a:lstStyle/>
+          <a:p>
+            <a:pPr algn="ctr"/>
+            <a:endParaRPr lang="en-GB"/>
+          </a:p>
+        </p:txBody>
+      </p:sp>
+      <p:sp>
+        <p:nvSpPr>
+          <p:cNvPr id="34" name="Rectangle 33">
+            <a:extLst>
+              <a:ext uri="{FF2B5EF4-FFF2-40B4-BE49-F238E27FC236}">
+                <a16:creationId xmlns:a16="http://schemas.microsoft.com/office/drawing/2014/main" id="{FA5D2B1F-E64F-41DE-924D-BA542C34ED06}"/>
+              </a:ext>
+            </a:extLst>
+          </p:cNvPr>
+          <p:cNvSpPr/>
+          <p:nvPr/>
+        </p:nvSpPr>
+        <p:spPr>
+          <a:xfrm>
+            <a:off x="0" y="871319"/>
+            <a:ext cx="12192000" cy="18288"/>
+          </a:xfrm>
+          <a:prstGeom prst="rect">
+            <a:avLst/>
+          </a:prstGeom>
+          <a:solidFill>
+            <a:srgbClr val="00B0F0"/>
+          </a:solidFill>
+          <a:ln>
+            <a:noFill/>
+          </a:ln>
+        </p:spPr>
+        <p:style>
+          <a:lnRef idx="2">
+            <a:schemeClr val="accent1">
+              <a:shade val="50000"/>
+            </a:schemeClr>
+          </a:lnRef>
+          <a:fillRef idx="1">
+            <a:schemeClr val="accent1"/>
+          </a:fillRef>
+          <a:effectRef idx="0">
+            <a:schemeClr val="accent1"/>
+          </a:effectRef>
+          <a:fontRef idx="minor">
+            <a:schemeClr val="lt1"/>
+          </a:fontRef>
+        </p:style>
+        <p:txBody>
+          <a:bodyPr rtlCol="0" anchor="ctr"/>
+          <a:lstStyle/>
+          <a:p>
+            <a:pPr algn="ctr"/>
+            <a:endParaRPr lang="en-GB"/>
+          </a:p>
+        </p:txBody>
+      </p:sp>
+      <p:sp>
+        <p:nvSpPr>
+          <p:cNvPr id="35" name="TextBox 34">
+            <a:extLst>
+              <a:ext uri="{FF2B5EF4-FFF2-40B4-BE49-F238E27FC236}">
+                <a16:creationId xmlns:a16="http://schemas.microsoft.com/office/drawing/2014/main" id="{0D30C5B4-C1E9-4B87-9CE1-D2BCD6B05072}"/>
+              </a:ext>
+            </a:extLst>
+          </p:cNvPr>
+          <p:cNvSpPr txBox="1"/>
+          <p:nvPr/>
+        </p:nvSpPr>
+        <p:spPr>
+          <a:xfrm>
+            <a:off x="330926" y="254342"/>
+            <a:ext cx="10811556" cy="892552"/>
+          </a:xfrm>
+          <a:prstGeom prst="rect">
+            <a:avLst/>
+          </a:prstGeom>
+          <a:noFill/>
+        </p:spPr>
+        <p:txBody>
+          <a:bodyPr wrap="square" rtlCol="0">
+            <a:spAutoFit/>
+          </a:bodyPr>
+          <a:lstStyle/>
+          <a:p>
+            <a:r>
+              <a:rPr lang="en-IN" sz="2600" b="1" dirty="0">
+                <a:solidFill>
+                  <a:srgbClr val="0070C0"/>
+                </a:solidFill>
+              </a:rPr>
+              <a:t>Project Updates – </a:t>
+            </a:r>
+            <a:r>
+              <a:rPr lang="en-US" sz="2600" b="1" dirty="0">
+                <a:solidFill>
+                  <a:srgbClr val="0070C0"/>
+                </a:solidFill>
+              </a:rPr>
+              <a:t>Week 2 </a:t>
+            </a:r>
+            <a:r>
+              <a:rPr lang="en-US" sz="2600" b="1">
+                <a:solidFill>
+                  <a:srgbClr val="0070C0"/>
+                </a:solidFill>
+              </a:rPr>
+              <a:t>(14/10/2024-18/10/2024</a:t>
+            </a:r>
+            <a:r>
+              <a:rPr lang="en-US" sz="2600" b="1" dirty="0">
+                <a:solidFill>
+                  <a:srgbClr val="0070C0"/>
+                </a:solidFill>
+              </a:rPr>
+              <a:t>)</a:t>
+            </a:r>
+          </a:p>
+          <a:p>
+            <a:endParaRPr lang="en-US" sz="2600" b="1" dirty="0">
+              <a:solidFill>
+                <a:srgbClr val="0070C0"/>
+              </a:solidFill>
+            </a:endParaRPr>
+          </a:p>
+        </p:txBody>
+      </p:sp>
+      <p:pic>
+        <p:nvPicPr>
+          <p:cNvPr id="36" name="Picture 35" descr="A picture containing clipart&#10;&#10;Description generated with very high confidence">
+            <a:extLst>
+              <a:ext uri="{FF2B5EF4-FFF2-40B4-BE49-F238E27FC236}">
+                <a16:creationId xmlns:a16="http://schemas.microsoft.com/office/drawing/2014/main" id="{53078F35-D806-4F0F-98B6-75FEDA3F69BA}"/>
+              </a:ext>
+            </a:extLst>
+          </p:cNvPr>
+          <p:cNvPicPr>
+            <a:picLocks noChangeAspect="1"/>
+          </p:cNvPicPr>
+          <p:nvPr/>
+        </p:nvPicPr>
+        <p:blipFill>
+          <a:blip r:embed="rId2">
+            <a:extLst>
+              <a:ext uri="{28A0092B-C50C-407E-A947-70E740481C1C}">
+                <a14:useLocalDpi xmlns:a14="http://schemas.microsoft.com/office/drawing/2010/main" val="0"/>
+              </a:ext>
+            </a:extLst>
+          </a:blip>
+          <a:stretch>
+            <a:fillRect/>
+          </a:stretch>
+        </p:blipFill>
+        <p:spPr>
+          <a:xfrm>
+            <a:off x="10502537" y="589742"/>
+            <a:ext cx="1689463" cy="563154"/>
+          </a:xfrm>
+          <a:prstGeom prst="rect">
+            <a:avLst/>
+          </a:prstGeom>
+        </p:spPr>
+      </p:pic>
+      <p:sp>
+        <p:nvSpPr>
+          <p:cNvPr id="2" name="Rectangle 1">
+            <a:extLst>
+              <a:ext uri="{FF2B5EF4-FFF2-40B4-BE49-F238E27FC236}">
+                <a16:creationId xmlns:a16="http://schemas.microsoft.com/office/drawing/2014/main" id="{E9981416-A2BD-4F6F-A16A-599D44127AF2}"/>
+              </a:ext>
+            </a:extLst>
+          </p:cNvPr>
+          <p:cNvSpPr/>
+          <p:nvPr/>
+        </p:nvSpPr>
+        <p:spPr>
+          <a:xfrm>
+            <a:off x="433633" y="1152896"/>
+            <a:ext cx="5561814" cy="5228423"/>
+          </a:xfrm>
+          <a:prstGeom prst="rect">
+            <a:avLst/>
+          </a:prstGeom>
+          <a:noFill/>
+          <a:ln>
+            <a:prstDash val="dash"/>
+          </a:ln>
+        </p:spPr>
+        <p:style>
+          <a:lnRef idx="2">
+            <a:schemeClr val="accent1">
+              <a:shade val="50000"/>
+            </a:schemeClr>
+          </a:lnRef>
+          <a:fillRef idx="1">
+            <a:schemeClr val="accent1"/>
+          </a:fillRef>
+          <a:effectRef idx="0">
+            <a:schemeClr val="accent1"/>
+          </a:effectRef>
+          <a:fontRef idx="minor">
+            <a:schemeClr val="lt1"/>
+          </a:fontRef>
+        </p:style>
+        <p:txBody>
+          <a:bodyPr rtlCol="0" anchor="ctr"/>
+          <a:lstStyle/>
+          <a:p>
+            <a:pPr algn="ctr"/>
+            <a:endParaRPr lang="en-IN"/>
+          </a:p>
+        </p:txBody>
+      </p:sp>
+      <p:sp>
+        <p:nvSpPr>
+          <p:cNvPr id="7" name="Rectangle 6">
+            <a:extLst>
+              <a:ext uri="{FF2B5EF4-FFF2-40B4-BE49-F238E27FC236}">
+                <a16:creationId xmlns:a16="http://schemas.microsoft.com/office/drawing/2014/main" id="{CF883A6F-EBA0-4DB7-B4B3-DACE4E381459}"/>
+              </a:ext>
+            </a:extLst>
+          </p:cNvPr>
+          <p:cNvSpPr/>
+          <p:nvPr/>
+        </p:nvSpPr>
+        <p:spPr>
+          <a:xfrm>
+            <a:off x="6150992" y="3845323"/>
+            <a:ext cx="5561814" cy="2487483"/>
+          </a:xfrm>
+          <a:prstGeom prst="rect">
+            <a:avLst/>
+          </a:prstGeom>
+          <a:noFill/>
+          <a:ln>
+            <a:prstDash val="dash"/>
+          </a:ln>
+        </p:spPr>
+        <p:style>
+          <a:lnRef idx="2">
+            <a:schemeClr val="accent1">
+              <a:shade val="50000"/>
+            </a:schemeClr>
+          </a:lnRef>
+          <a:fillRef idx="1">
+            <a:schemeClr val="accent1"/>
+          </a:fillRef>
+          <a:effectRef idx="0">
+            <a:schemeClr val="accent1"/>
+          </a:effectRef>
+          <a:fontRef idx="minor">
+            <a:schemeClr val="lt1"/>
+          </a:fontRef>
+        </p:style>
+        <p:txBody>
+          <a:bodyPr rtlCol="0" anchor="ctr"/>
+          <a:lstStyle/>
+          <a:p>
+            <a:pPr algn="ctr"/>
+            <a:endParaRPr lang="en-IN"/>
+          </a:p>
+        </p:txBody>
+      </p:sp>
+      <p:sp>
+        <p:nvSpPr>
+          <p:cNvPr id="8" name="Rectangle 7">
+            <a:extLst>
+              <a:ext uri="{FF2B5EF4-FFF2-40B4-BE49-F238E27FC236}">
+                <a16:creationId xmlns:a16="http://schemas.microsoft.com/office/drawing/2014/main" id="{4EDEB4CC-B0DE-4A69-BBA1-6BA60FBCB711}"/>
+              </a:ext>
+            </a:extLst>
+          </p:cNvPr>
+          <p:cNvSpPr/>
+          <p:nvPr/>
+        </p:nvSpPr>
+        <p:spPr>
+          <a:xfrm>
+            <a:off x="6150992" y="1152897"/>
+            <a:ext cx="5561814" cy="2571663"/>
+          </a:xfrm>
+          <a:prstGeom prst="rect">
+            <a:avLst/>
+          </a:prstGeom>
+          <a:noFill/>
+          <a:ln>
+            <a:prstDash val="dash"/>
+          </a:ln>
+        </p:spPr>
+        <p:style>
+          <a:lnRef idx="2">
+            <a:schemeClr val="accent1">
+              <a:shade val="50000"/>
+            </a:schemeClr>
+          </a:lnRef>
+          <a:fillRef idx="1">
+            <a:schemeClr val="accent1"/>
+          </a:fillRef>
+          <a:effectRef idx="0">
+            <a:schemeClr val="accent1"/>
+          </a:effectRef>
+          <a:fontRef idx="minor">
+            <a:schemeClr val="lt1"/>
+          </a:fontRef>
+        </p:style>
+        <p:txBody>
+          <a:bodyPr rtlCol="0" anchor="ctr"/>
+          <a:lstStyle/>
+          <a:p>
+            <a:pPr algn="ctr"/>
+            <a:endParaRPr lang="en-IN"/>
+          </a:p>
+        </p:txBody>
+      </p:sp>
+      <p:sp>
+        <p:nvSpPr>
+          <p:cNvPr id="9" name="Rectangle 8">
+            <a:extLst>
+              <a:ext uri="{FF2B5EF4-FFF2-40B4-BE49-F238E27FC236}">
                 <a16:creationId xmlns:a16="http://schemas.microsoft.com/office/drawing/2014/main" id="{82C2B6F0-1ED9-4562-8A8A-86A6C3F98988}"/>
               </a:ext>
             </a:extLst>
@@ -9601,7 +12071,7 @@
 </p:sld>
 </file>
 
-<file path=ppt/slides/slide7.xml><?xml version="1.0" encoding="utf-8"?>
+<file path=ppt/slides/slide8.xml><?xml version="1.0" encoding="utf-8"?>
 <p:sld xmlns:a="http://schemas.openxmlformats.org/drawingml/2006/main" xmlns:r="http://schemas.openxmlformats.org/officeDocument/2006/relationships" xmlns:p="http://schemas.openxmlformats.org/presentationml/2006/main">
   <p:cSld>
     <p:spTree>

</xml_diff>